<commit_message>
added draftb sim results component
</commit_message>
<xml_diff>
--- a/WellDetailDialog.pptx
+++ b/WellDetailDialog.pptx
@@ -6,6 +6,10 @@
   </p:sldMasterIdLst>
   <p:sldIdLst>
     <p:sldId id="256" r:id="rId2"/>
+    <p:sldId id="257" r:id="rId3"/>
+    <p:sldId id="259" r:id="rId4"/>
+    <p:sldId id="258" r:id="rId5"/>
+    <p:sldId id="260" r:id="rId6"/>
   </p:sldIdLst>
   <p:sldSz cx="12192000" cy="6858000"/>
   <p:notesSz cx="6858000" cy="9144000"/>
@@ -104,6 +108,11 @@
       </a:defRPr>
     </a:lvl9pPr>
   </p:defaultTextStyle>
+  <p:extLst>
+    <p:ext uri="{EFAFB233-063F-42B5-8137-9DF3F51BA10A}">
+      <p15:sldGuideLst xmlns:p15="http://schemas.microsoft.com/office/powerpoint/2012/main"/>
+    </p:ext>
+  </p:extLst>
 </p:presentation>
 </file>
 
@@ -256,7 +265,7 @@
           <a:p>
             <a:fld id="{ECF8B273-0B2B-4199-B6F0-058FC251F2E7}" type="datetimeFigureOut">
               <a:rPr lang="en-GB" smtClean="0"/>
-              <a:t>31/03/2025</a:t>
+              <a:t>01/04/2025</a:t>
             </a:fld>
             <a:endParaRPr lang="en-GB"/>
           </a:p>
@@ -456,7 +465,7 @@
           <a:p>
             <a:fld id="{ECF8B273-0B2B-4199-B6F0-058FC251F2E7}" type="datetimeFigureOut">
               <a:rPr lang="en-GB" smtClean="0"/>
-              <a:t>31/03/2025</a:t>
+              <a:t>01/04/2025</a:t>
             </a:fld>
             <a:endParaRPr lang="en-GB"/>
           </a:p>
@@ -666,7 +675,7 @@
           <a:p>
             <a:fld id="{ECF8B273-0B2B-4199-B6F0-058FC251F2E7}" type="datetimeFigureOut">
               <a:rPr lang="en-GB" smtClean="0"/>
-              <a:t>31/03/2025</a:t>
+              <a:t>01/04/2025</a:t>
             </a:fld>
             <a:endParaRPr lang="en-GB"/>
           </a:p>
@@ -866,7 +875,7 @@
           <a:p>
             <a:fld id="{ECF8B273-0B2B-4199-B6F0-058FC251F2E7}" type="datetimeFigureOut">
               <a:rPr lang="en-GB" smtClean="0"/>
-              <a:t>31/03/2025</a:t>
+              <a:t>01/04/2025</a:t>
             </a:fld>
             <a:endParaRPr lang="en-GB"/>
           </a:p>
@@ -1142,7 +1151,7 @@
           <a:p>
             <a:fld id="{ECF8B273-0B2B-4199-B6F0-058FC251F2E7}" type="datetimeFigureOut">
               <a:rPr lang="en-GB" smtClean="0"/>
-              <a:t>31/03/2025</a:t>
+              <a:t>01/04/2025</a:t>
             </a:fld>
             <a:endParaRPr lang="en-GB"/>
           </a:p>
@@ -1410,7 +1419,7 @@
           <a:p>
             <a:fld id="{ECF8B273-0B2B-4199-B6F0-058FC251F2E7}" type="datetimeFigureOut">
               <a:rPr lang="en-GB" smtClean="0"/>
-              <a:t>31/03/2025</a:t>
+              <a:t>01/04/2025</a:t>
             </a:fld>
             <a:endParaRPr lang="en-GB"/>
           </a:p>
@@ -1825,7 +1834,7 @@
           <a:p>
             <a:fld id="{ECF8B273-0B2B-4199-B6F0-058FC251F2E7}" type="datetimeFigureOut">
               <a:rPr lang="en-GB" smtClean="0"/>
-              <a:t>31/03/2025</a:t>
+              <a:t>01/04/2025</a:t>
             </a:fld>
             <a:endParaRPr lang="en-GB"/>
           </a:p>
@@ -1967,7 +1976,7 @@
           <a:p>
             <a:fld id="{ECF8B273-0B2B-4199-B6F0-058FC251F2E7}" type="datetimeFigureOut">
               <a:rPr lang="en-GB" smtClean="0"/>
-              <a:t>31/03/2025</a:t>
+              <a:t>01/04/2025</a:t>
             </a:fld>
             <a:endParaRPr lang="en-GB"/>
           </a:p>
@@ -2080,7 +2089,7 @@
           <a:p>
             <a:fld id="{ECF8B273-0B2B-4199-B6F0-058FC251F2E7}" type="datetimeFigureOut">
               <a:rPr lang="en-GB" smtClean="0"/>
-              <a:t>31/03/2025</a:t>
+              <a:t>01/04/2025</a:t>
             </a:fld>
             <a:endParaRPr lang="en-GB"/>
           </a:p>
@@ -2393,7 +2402,7 @@
           <a:p>
             <a:fld id="{ECF8B273-0B2B-4199-B6F0-058FC251F2E7}" type="datetimeFigureOut">
               <a:rPr lang="en-GB" smtClean="0"/>
-              <a:t>31/03/2025</a:t>
+              <a:t>01/04/2025</a:t>
             </a:fld>
             <a:endParaRPr lang="en-GB"/>
           </a:p>
@@ -2682,7 +2691,7 @@
           <a:p>
             <a:fld id="{ECF8B273-0B2B-4199-B6F0-058FC251F2E7}" type="datetimeFigureOut">
               <a:rPr lang="en-GB" smtClean="0"/>
-              <a:t>31/03/2025</a:t>
+              <a:t>01/04/2025</a:t>
             </a:fld>
             <a:endParaRPr lang="en-GB"/>
           </a:p>
@@ -2925,7 +2934,7 @@
           <a:p>
             <a:fld id="{ECF8B273-0B2B-4199-B6F0-058FC251F2E7}" type="datetimeFigureOut">
               <a:rPr lang="en-GB" smtClean="0"/>
-              <a:t>31/03/2025</a:t>
+              <a:t>01/04/2025</a:t>
             </a:fld>
             <a:endParaRPr lang="en-GB"/>
           </a:p>
@@ -5565,6 +5574,3699 @@
     <p:extLst>
       <p:ext uri="{BB962C8B-B14F-4D97-AF65-F5344CB8AC3E}">
         <p14:creationId xmlns:p14="http://schemas.microsoft.com/office/powerpoint/2010/main" val="2838896465"/>
+      </p:ext>
+    </p:extLst>
+  </p:cSld>
+  <p:clrMapOvr>
+    <a:masterClrMapping/>
+  </p:clrMapOvr>
+</p:sld>
+</file>
+
+<file path=ppt/slides/slide2.xml><?xml version="1.0" encoding="utf-8"?>
+<p:sld xmlns:a="http://schemas.openxmlformats.org/drawingml/2006/main" xmlns:r="http://schemas.openxmlformats.org/officeDocument/2006/relationships" xmlns:p="http://schemas.openxmlformats.org/presentationml/2006/main">
+  <p:cSld>
+    <p:spTree>
+      <p:nvGrpSpPr>
+        <p:cNvPr id="1" name=""/>
+        <p:cNvGrpSpPr/>
+        <p:nvPr/>
+      </p:nvGrpSpPr>
+      <p:grpSpPr>
+        <a:xfrm>
+          <a:off x="0" y="0"/>
+          <a:ext cx="0" cy="0"/>
+          <a:chOff x="0" y="0"/>
+          <a:chExt cx="0" cy="0"/>
+        </a:xfrm>
+      </p:grpSpPr>
+      <p:sp>
+        <p:nvSpPr>
+          <p:cNvPr id="4" name="TextBox 3">
+            <a:extLst>
+              <a:ext uri="{FF2B5EF4-FFF2-40B4-BE49-F238E27FC236}">
+                <a16:creationId xmlns:a16="http://schemas.microsoft.com/office/drawing/2014/main" id="{3D1C241C-7678-0D19-1C00-19501AB865A8}"/>
+              </a:ext>
+            </a:extLst>
+          </p:cNvPr>
+          <p:cNvSpPr txBox="1"/>
+          <p:nvPr/>
+        </p:nvSpPr>
+        <p:spPr>
+          <a:xfrm>
+            <a:off x="739536" y="1132732"/>
+            <a:ext cx="1205010" cy="369332"/>
+          </a:xfrm>
+          <a:prstGeom prst="rect">
+            <a:avLst/>
+          </a:prstGeom>
+          <a:noFill/>
+        </p:spPr>
+        <p:txBody>
+          <a:bodyPr wrap="none" rtlCol="0">
+            <a:spAutoFit/>
+          </a:bodyPr>
+          <a:lstStyle/>
+          <a:p>
+            <a:r>
+              <a:rPr lang="en-GB" dirty="0"/>
+              <a:t>Load case</a:t>
+            </a:r>
+          </a:p>
+        </p:txBody>
+      </p:sp>
+      <p:cxnSp>
+        <p:nvCxnSpPr>
+          <p:cNvPr id="6" name="Straight Arrow Connector 5">
+            <a:extLst>
+              <a:ext uri="{FF2B5EF4-FFF2-40B4-BE49-F238E27FC236}">
+                <a16:creationId xmlns:a16="http://schemas.microsoft.com/office/drawing/2014/main" id="{292657EE-A1B7-D0D3-7A1A-3A926CBF452E}"/>
+              </a:ext>
+            </a:extLst>
+          </p:cNvPr>
+          <p:cNvCxnSpPr/>
+          <p:nvPr/>
+        </p:nvCxnSpPr>
+        <p:spPr>
+          <a:xfrm>
+            <a:off x="1944546" y="1317398"/>
+            <a:ext cx="1145894" cy="0"/>
+          </a:xfrm>
+          <a:prstGeom prst="straightConnector1">
+            <a:avLst/>
+          </a:prstGeom>
+          <a:ln>
+            <a:tailEnd type="triangle"/>
+          </a:ln>
+        </p:spPr>
+        <p:style>
+          <a:lnRef idx="2">
+            <a:schemeClr val="accent1"/>
+          </a:lnRef>
+          <a:fillRef idx="0">
+            <a:schemeClr val="accent1"/>
+          </a:fillRef>
+          <a:effectRef idx="1">
+            <a:schemeClr val="accent1"/>
+          </a:effectRef>
+          <a:fontRef idx="minor">
+            <a:schemeClr val="tx1"/>
+          </a:fontRef>
+        </p:style>
+      </p:cxnSp>
+      <p:sp>
+        <p:nvSpPr>
+          <p:cNvPr id="7" name="Rectangle 6">
+            <a:extLst>
+              <a:ext uri="{FF2B5EF4-FFF2-40B4-BE49-F238E27FC236}">
+                <a16:creationId xmlns:a16="http://schemas.microsoft.com/office/drawing/2014/main" id="{EE818169-9183-74B7-5763-262923171776}"/>
+              </a:ext>
+            </a:extLst>
+          </p:cNvPr>
+          <p:cNvSpPr/>
+          <p:nvPr/>
+        </p:nvSpPr>
+        <p:spPr>
+          <a:xfrm>
+            <a:off x="3240911" y="648182"/>
+            <a:ext cx="1205010" cy="1412112"/>
+          </a:xfrm>
+          <a:prstGeom prst="rect">
+            <a:avLst/>
+          </a:prstGeom>
+        </p:spPr>
+        <p:style>
+          <a:lnRef idx="2">
+            <a:schemeClr val="accent1">
+              <a:shade val="15000"/>
+            </a:schemeClr>
+          </a:lnRef>
+          <a:fillRef idx="1">
+            <a:schemeClr val="accent1"/>
+          </a:fillRef>
+          <a:effectRef idx="0">
+            <a:schemeClr val="accent1"/>
+          </a:effectRef>
+          <a:fontRef idx="minor">
+            <a:schemeClr val="lt1"/>
+          </a:fontRef>
+        </p:style>
+        <p:txBody>
+          <a:bodyPr rtlCol="0" anchor="ctr"/>
+          <a:lstStyle/>
+          <a:p>
+            <a:pPr algn="ctr"/>
+            <a:endParaRPr lang="en-GB"/>
+          </a:p>
+        </p:txBody>
+      </p:sp>
+      <p:sp>
+        <p:nvSpPr>
+          <p:cNvPr id="8" name="TextBox 7">
+            <a:extLst>
+              <a:ext uri="{FF2B5EF4-FFF2-40B4-BE49-F238E27FC236}">
+                <a16:creationId xmlns:a16="http://schemas.microsoft.com/office/drawing/2014/main" id="{8351DF45-76D3-89AC-97BE-F24D2C4177D7}"/>
+              </a:ext>
+            </a:extLst>
+          </p:cNvPr>
+          <p:cNvSpPr txBox="1"/>
+          <p:nvPr/>
+        </p:nvSpPr>
+        <p:spPr>
+          <a:xfrm>
+            <a:off x="3525861" y="278850"/>
+            <a:ext cx="635110" cy="369332"/>
+          </a:xfrm>
+          <a:prstGeom prst="rect">
+            <a:avLst/>
+          </a:prstGeom>
+          <a:noFill/>
+        </p:spPr>
+        <p:txBody>
+          <a:bodyPr wrap="none" rtlCol="0">
+            <a:spAutoFit/>
+          </a:bodyPr>
+          <a:lstStyle/>
+          <a:p>
+            <a:r>
+              <a:rPr lang="en-GB" dirty="0"/>
+              <a:t>map</a:t>
+            </a:r>
+          </a:p>
+        </p:txBody>
+      </p:sp>
+      <p:sp>
+        <p:nvSpPr>
+          <p:cNvPr id="9" name="TextBox 8">
+            <a:extLst>
+              <a:ext uri="{FF2B5EF4-FFF2-40B4-BE49-F238E27FC236}">
+                <a16:creationId xmlns:a16="http://schemas.microsoft.com/office/drawing/2014/main" id="{8EA21759-7BF5-C51D-F882-0581351A3ABA}"/>
+              </a:ext>
+            </a:extLst>
+          </p:cNvPr>
+          <p:cNvSpPr txBox="1"/>
+          <p:nvPr/>
+        </p:nvSpPr>
+        <p:spPr>
+          <a:xfrm>
+            <a:off x="4445921" y="1132732"/>
+            <a:ext cx="2737609" cy="369332"/>
+          </a:xfrm>
+          <a:prstGeom prst="rect">
+            <a:avLst/>
+          </a:prstGeom>
+          <a:noFill/>
+        </p:spPr>
+        <p:txBody>
+          <a:bodyPr wrap="none" rtlCol="0">
+            <a:spAutoFit/>
+          </a:bodyPr>
+          <a:lstStyle/>
+          <a:p>
+            <a:r>
+              <a:rPr lang="en-GB" dirty="0"/>
+              <a:t>Show CRM-</a:t>
+            </a:r>
+            <a:r>
+              <a:rPr lang="en-GB" dirty="0" err="1"/>
+              <a:t>connectivities</a:t>
+            </a:r>
+            <a:endParaRPr lang="en-GB" dirty="0"/>
+          </a:p>
+        </p:txBody>
+      </p:sp>
+      <p:sp>
+        <p:nvSpPr>
+          <p:cNvPr id="11" name="Rectangle 10">
+            <a:extLst>
+              <a:ext uri="{FF2B5EF4-FFF2-40B4-BE49-F238E27FC236}">
+                <a16:creationId xmlns:a16="http://schemas.microsoft.com/office/drawing/2014/main" id="{2F186329-6498-59C0-447B-9FED35773B31}"/>
+              </a:ext>
+            </a:extLst>
+          </p:cNvPr>
+          <p:cNvSpPr/>
+          <p:nvPr/>
+        </p:nvSpPr>
+        <p:spPr>
+          <a:xfrm>
+            <a:off x="2005387" y="404306"/>
+            <a:ext cx="1111169" cy="369332"/>
+          </a:xfrm>
+          <a:prstGeom prst="rect">
+            <a:avLst/>
+          </a:prstGeom>
+          <a:solidFill>
+            <a:schemeClr val="bg2">
+              <a:lumMod val="90000"/>
+            </a:schemeClr>
+          </a:solidFill>
+          <a:ln>
+            <a:solidFill>
+              <a:schemeClr val="tx1">
+                <a:lumMod val="50000"/>
+                <a:lumOff val="50000"/>
+              </a:schemeClr>
+            </a:solidFill>
+          </a:ln>
+        </p:spPr>
+        <p:style>
+          <a:lnRef idx="2">
+            <a:schemeClr val="accent1">
+              <a:shade val="15000"/>
+            </a:schemeClr>
+          </a:lnRef>
+          <a:fillRef idx="1">
+            <a:schemeClr val="accent1"/>
+          </a:fillRef>
+          <a:effectRef idx="0">
+            <a:schemeClr val="accent1"/>
+          </a:effectRef>
+          <a:fontRef idx="minor">
+            <a:schemeClr val="lt1"/>
+          </a:fontRef>
+        </p:style>
+        <p:txBody>
+          <a:bodyPr rtlCol="0" anchor="ctr"/>
+          <a:lstStyle/>
+          <a:p>
+            <a:pPr algn="ctr"/>
+            <a:endParaRPr lang="en-GB"/>
+          </a:p>
+        </p:txBody>
+      </p:sp>
+      <p:sp>
+        <p:nvSpPr>
+          <p:cNvPr id="13" name="Rectangle 12">
+            <a:extLst>
+              <a:ext uri="{FF2B5EF4-FFF2-40B4-BE49-F238E27FC236}">
+                <a16:creationId xmlns:a16="http://schemas.microsoft.com/office/drawing/2014/main" id="{2857EE19-AF80-B422-4A17-241CF6449332}"/>
+              </a:ext>
+            </a:extLst>
+          </p:cNvPr>
+          <p:cNvSpPr/>
+          <p:nvPr/>
+        </p:nvSpPr>
+        <p:spPr>
+          <a:xfrm>
+            <a:off x="798652" y="2824223"/>
+            <a:ext cx="10189577" cy="3731774"/>
+          </a:xfrm>
+          <a:prstGeom prst="rect">
+            <a:avLst/>
+          </a:prstGeom>
+          <a:noFill/>
+        </p:spPr>
+        <p:style>
+          <a:lnRef idx="2">
+            <a:schemeClr val="accent1">
+              <a:shade val="15000"/>
+            </a:schemeClr>
+          </a:lnRef>
+          <a:fillRef idx="1">
+            <a:schemeClr val="accent1"/>
+          </a:fillRef>
+          <a:effectRef idx="0">
+            <a:schemeClr val="accent1"/>
+          </a:effectRef>
+          <a:fontRef idx="minor">
+            <a:schemeClr val="lt1"/>
+          </a:fontRef>
+        </p:style>
+        <p:txBody>
+          <a:bodyPr rtlCol="0" anchor="ctr"/>
+          <a:lstStyle/>
+          <a:p>
+            <a:pPr algn="ctr"/>
+            <a:endParaRPr lang="en-GB"/>
+          </a:p>
+        </p:txBody>
+      </p:sp>
+      <p:sp>
+        <p:nvSpPr>
+          <p:cNvPr id="14" name="Rectangle 13">
+            <a:extLst>
+              <a:ext uri="{FF2B5EF4-FFF2-40B4-BE49-F238E27FC236}">
+                <a16:creationId xmlns:a16="http://schemas.microsoft.com/office/drawing/2014/main" id="{5AEDA693-C6AD-77B1-B0E4-FBB7CA584AC9}"/>
+              </a:ext>
+            </a:extLst>
+          </p:cNvPr>
+          <p:cNvSpPr/>
+          <p:nvPr/>
+        </p:nvSpPr>
+        <p:spPr>
+          <a:xfrm>
+            <a:off x="1169046" y="3671134"/>
+            <a:ext cx="1215340" cy="693827"/>
+          </a:xfrm>
+          <a:prstGeom prst="rect">
+            <a:avLst/>
+          </a:prstGeom>
+          <a:solidFill>
+            <a:srgbClr val="FFC000"/>
+          </a:solidFill>
+          <a:ln>
+            <a:solidFill>
+              <a:schemeClr val="bg2">
+                <a:lumMod val="50000"/>
+              </a:schemeClr>
+            </a:solidFill>
+          </a:ln>
+        </p:spPr>
+        <p:style>
+          <a:lnRef idx="2">
+            <a:schemeClr val="accent1">
+              <a:shade val="15000"/>
+            </a:schemeClr>
+          </a:lnRef>
+          <a:fillRef idx="1">
+            <a:schemeClr val="accent1"/>
+          </a:fillRef>
+          <a:effectRef idx="0">
+            <a:schemeClr val="accent1"/>
+          </a:effectRef>
+          <a:fontRef idx="minor">
+            <a:schemeClr val="lt1"/>
+          </a:fontRef>
+        </p:style>
+        <p:txBody>
+          <a:bodyPr rtlCol="0" anchor="ctr"/>
+          <a:lstStyle/>
+          <a:p>
+            <a:pPr algn="ctr"/>
+            <a:endParaRPr lang="en-GB"/>
+          </a:p>
+        </p:txBody>
+      </p:sp>
+      <p:sp>
+        <p:nvSpPr>
+          <p:cNvPr id="15" name="TextBox 14">
+            <a:extLst>
+              <a:ext uri="{FF2B5EF4-FFF2-40B4-BE49-F238E27FC236}">
+                <a16:creationId xmlns:a16="http://schemas.microsoft.com/office/drawing/2014/main" id="{855E13BC-883C-EE65-3562-A9C95B356036}"/>
+              </a:ext>
+            </a:extLst>
+          </p:cNvPr>
+          <p:cNvSpPr txBox="1"/>
+          <p:nvPr/>
+        </p:nvSpPr>
+        <p:spPr>
+          <a:xfrm>
+            <a:off x="1069971" y="3306408"/>
+            <a:ext cx="1610249" cy="369332"/>
+          </a:xfrm>
+          <a:prstGeom prst="rect">
+            <a:avLst/>
+          </a:prstGeom>
+          <a:noFill/>
+        </p:spPr>
+        <p:txBody>
+          <a:bodyPr wrap="none" rtlCol="0">
+            <a:spAutoFit/>
+          </a:bodyPr>
+          <a:lstStyle/>
+          <a:p>
+            <a:r>
+              <a:rPr lang="en-GB" dirty="0"/>
+              <a:t>Overall quality</a:t>
+            </a:r>
+          </a:p>
+        </p:txBody>
+      </p:sp>
+      <p:sp>
+        <p:nvSpPr>
+          <p:cNvPr id="16" name="Rectangle 15">
+            <a:extLst>
+              <a:ext uri="{FF2B5EF4-FFF2-40B4-BE49-F238E27FC236}">
+                <a16:creationId xmlns:a16="http://schemas.microsoft.com/office/drawing/2014/main" id="{454B682B-AA20-6EA2-6039-AEE2DF4A49B7}"/>
+              </a:ext>
+            </a:extLst>
+          </p:cNvPr>
+          <p:cNvSpPr/>
+          <p:nvPr/>
+        </p:nvSpPr>
+        <p:spPr>
+          <a:xfrm>
+            <a:off x="8798691" y="1025139"/>
+            <a:ext cx="1921395" cy="476925"/>
+          </a:xfrm>
+          <a:prstGeom prst="rect">
+            <a:avLst/>
+          </a:prstGeom>
+        </p:spPr>
+        <p:style>
+          <a:lnRef idx="2">
+            <a:schemeClr val="accent1">
+              <a:shade val="15000"/>
+            </a:schemeClr>
+          </a:lnRef>
+          <a:fillRef idx="1">
+            <a:schemeClr val="accent1"/>
+          </a:fillRef>
+          <a:effectRef idx="0">
+            <a:schemeClr val="accent1"/>
+          </a:effectRef>
+          <a:fontRef idx="minor">
+            <a:schemeClr val="lt1"/>
+          </a:fontRef>
+        </p:style>
+        <p:txBody>
+          <a:bodyPr rtlCol="0" anchor="ctr"/>
+          <a:lstStyle/>
+          <a:p>
+            <a:pPr algn="ctr"/>
+            <a:endParaRPr lang="en-GB"/>
+          </a:p>
+        </p:txBody>
+      </p:sp>
+      <p:sp>
+        <p:nvSpPr>
+          <p:cNvPr id="18" name="Rectangle 17">
+            <a:extLst>
+              <a:ext uri="{FF2B5EF4-FFF2-40B4-BE49-F238E27FC236}">
+                <a16:creationId xmlns:a16="http://schemas.microsoft.com/office/drawing/2014/main" id="{AE57E4C9-5184-C848-6C82-25EA60E37AAF}"/>
+              </a:ext>
+            </a:extLst>
+          </p:cNvPr>
+          <p:cNvSpPr/>
+          <p:nvPr/>
+        </p:nvSpPr>
+        <p:spPr>
+          <a:xfrm>
+            <a:off x="804587" y="443511"/>
+            <a:ext cx="1111169" cy="369332"/>
+          </a:xfrm>
+          <a:prstGeom prst="rect">
+            <a:avLst/>
+          </a:prstGeom>
+        </p:spPr>
+        <p:style>
+          <a:lnRef idx="2">
+            <a:schemeClr val="accent1">
+              <a:shade val="15000"/>
+            </a:schemeClr>
+          </a:lnRef>
+          <a:fillRef idx="1">
+            <a:schemeClr val="accent1"/>
+          </a:fillRef>
+          <a:effectRef idx="0">
+            <a:schemeClr val="accent1"/>
+          </a:effectRef>
+          <a:fontRef idx="minor">
+            <a:schemeClr val="lt1"/>
+          </a:fontRef>
+        </p:style>
+        <p:txBody>
+          <a:bodyPr rtlCol="0" anchor="ctr"/>
+          <a:lstStyle/>
+          <a:p>
+            <a:pPr algn="ctr"/>
+            <a:endParaRPr lang="en-GB"/>
+          </a:p>
+        </p:txBody>
+      </p:sp>
+      <p:sp>
+        <p:nvSpPr>
+          <p:cNvPr id="19" name="Rectangle 18">
+            <a:extLst>
+              <a:ext uri="{FF2B5EF4-FFF2-40B4-BE49-F238E27FC236}">
+                <a16:creationId xmlns:a16="http://schemas.microsoft.com/office/drawing/2014/main" id="{221C0887-D0B6-DF58-5E68-F0C55280CD13}"/>
+              </a:ext>
+            </a:extLst>
+          </p:cNvPr>
+          <p:cNvSpPr/>
+          <p:nvPr/>
+        </p:nvSpPr>
+        <p:spPr>
+          <a:xfrm>
+            <a:off x="5457897" y="257917"/>
+            <a:ext cx="1111169" cy="369332"/>
+          </a:xfrm>
+          <a:prstGeom prst="rect">
+            <a:avLst/>
+          </a:prstGeom>
+          <a:solidFill>
+            <a:schemeClr val="bg2">
+              <a:lumMod val="90000"/>
+            </a:schemeClr>
+          </a:solidFill>
+          <a:ln>
+            <a:solidFill>
+              <a:schemeClr val="tx1">
+                <a:lumMod val="50000"/>
+                <a:lumOff val="50000"/>
+              </a:schemeClr>
+            </a:solidFill>
+          </a:ln>
+        </p:spPr>
+        <p:style>
+          <a:lnRef idx="2">
+            <a:schemeClr val="accent1">
+              <a:shade val="15000"/>
+            </a:schemeClr>
+          </a:lnRef>
+          <a:fillRef idx="1">
+            <a:schemeClr val="accent1"/>
+          </a:fillRef>
+          <a:effectRef idx="0">
+            <a:schemeClr val="accent1"/>
+          </a:effectRef>
+          <a:fontRef idx="minor">
+            <a:schemeClr val="lt1"/>
+          </a:fontRef>
+        </p:style>
+        <p:txBody>
+          <a:bodyPr rtlCol="0" anchor="ctr"/>
+          <a:lstStyle/>
+          <a:p>
+            <a:pPr algn="ctr"/>
+            <a:endParaRPr lang="en-GB"/>
+          </a:p>
+        </p:txBody>
+      </p:sp>
+      <p:sp>
+        <p:nvSpPr>
+          <p:cNvPr id="21" name="TextBox 20">
+            <a:extLst>
+              <a:ext uri="{FF2B5EF4-FFF2-40B4-BE49-F238E27FC236}">
+                <a16:creationId xmlns:a16="http://schemas.microsoft.com/office/drawing/2014/main" id="{DC796388-0A18-8643-B862-BB4D7CD2DD86}"/>
+              </a:ext>
+            </a:extLst>
+          </p:cNvPr>
+          <p:cNvSpPr txBox="1"/>
+          <p:nvPr/>
+        </p:nvSpPr>
+        <p:spPr>
+          <a:xfrm>
+            <a:off x="1277220" y="3847179"/>
+            <a:ext cx="998991" cy="369332"/>
+          </a:xfrm>
+          <a:prstGeom prst="rect">
+            <a:avLst/>
+          </a:prstGeom>
+          <a:noFill/>
+        </p:spPr>
+        <p:txBody>
+          <a:bodyPr wrap="none" rtlCol="0">
+            <a:spAutoFit/>
+          </a:bodyPr>
+          <a:lstStyle/>
+          <a:p>
+            <a:r>
+              <a:rPr lang="en-GB" dirty="0"/>
+              <a:t>Medium</a:t>
+            </a:r>
+          </a:p>
+        </p:txBody>
+      </p:sp>
+      <p:sp>
+        <p:nvSpPr>
+          <p:cNvPr id="24" name="TextBox 23">
+            <a:extLst>
+              <a:ext uri="{FF2B5EF4-FFF2-40B4-BE49-F238E27FC236}">
+                <a16:creationId xmlns:a16="http://schemas.microsoft.com/office/drawing/2014/main" id="{B00379CA-806D-2B98-D5CD-4A4BE0ADDF8A}"/>
+              </a:ext>
+            </a:extLst>
+          </p:cNvPr>
+          <p:cNvSpPr txBox="1"/>
+          <p:nvPr/>
+        </p:nvSpPr>
+        <p:spPr>
+          <a:xfrm>
+            <a:off x="1069971" y="4591508"/>
+            <a:ext cx="1456809" cy="369332"/>
+          </a:xfrm>
+          <a:prstGeom prst="rect">
+            <a:avLst/>
+          </a:prstGeom>
+          <a:noFill/>
+        </p:spPr>
+        <p:txBody>
+          <a:bodyPr wrap="none" rtlCol="0">
+            <a:spAutoFit/>
+          </a:bodyPr>
+          <a:lstStyle/>
+          <a:p>
+            <a:r>
+              <a:rPr lang="en-GB" dirty="0"/>
+              <a:t>Show in map</a:t>
+            </a:r>
+          </a:p>
+        </p:txBody>
+      </p:sp>
+      <p:sp>
+        <p:nvSpPr>
+          <p:cNvPr id="22" name="TextBox 21">
+            <a:extLst>
+              <a:ext uri="{FF2B5EF4-FFF2-40B4-BE49-F238E27FC236}">
+                <a16:creationId xmlns:a16="http://schemas.microsoft.com/office/drawing/2014/main" id="{44D3B37D-50F8-0AB7-13F6-0B91A3897FBE}"/>
+              </a:ext>
+            </a:extLst>
+          </p:cNvPr>
+          <p:cNvSpPr txBox="1"/>
+          <p:nvPr/>
+        </p:nvSpPr>
+        <p:spPr>
+          <a:xfrm>
+            <a:off x="1385533" y="5048677"/>
+            <a:ext cx="2121093" cy="369332"/>
+          </a:xfrm>
+          <a:prstGeom prst="rect">
+            <a:avLst/>
+          </a:prstGeom>
+          <a:noFill/>
+        </p:spPr>
+        <p:txBody>
+          <a:bodyPr wrap="none" rtlCol="0">
+            <a:spAutoFit/>
+          </a:bodyPr>
+          <a:lstStyle/>
+          <a:p>
+            <a:r>
+              <a:rPr lang="en-GB" dirty="0"/>
+              <a:t>Individual fit quality</a:t>
+            </a:r>
+          </a:p>
+        </p:txBody>
+      </p:sp>
+      <p:sp>
+        <p:nvSpPr>
+          <p:cNvPr id="26" name="TextBox 25">
+            <a:extLst>
+              <a:ext uri="{FF2B5EF4-FFF2-40B4-BE49-F238E27FC236}">
+                <a16:creationId xmlns:a16="http://schemas.microsoft.com/office/drawing/2014/main" id="{BEAB0A87-B4AD-CC67-9427-A2CE3B9590D8}"/>
+              </a:ext>
+            </a:extLst>
+          </p:cNvPr>
+          <p:cNvSpPr txBox="1"/>
+          <p:nvPr/>
+        </p:nvSpPr>
+        <p:spPr>
+          <a:xfrm>
+            <a:off x="1385533" y="5543057"/>
+            <a:ext cx="1436612" cy="369332"/>
+          </a:xfrm>
+          <a:prstGeom prst="rect">
+            <a:avLst/>
+          </a:prstGeom>
+          <a:noFill/>
+        </p:spPr>
+        <p:txBody>
+          <a:bodyPr wrap="none" rtlCol="0">
+            <a:spAutoFit/>
+          </a:bodyPr>
+          <a:lstStyle/>
+          <a:p>
+            <a:r>
+              <a:rPr lang="en-GB" dirty="0"/>
+              <a:t>Connectivity</a:t>
+            </a:r>
+          </a:p>
+        </p:txBody>
+      </p:sp>
+      <p:sp>
+        <p:nvSpPr>
+          <p:cNvPr id="30" name="TextBox 29">
+            <a:extLst>
+              <a:ext uri="{FF2B5EF4-FFF2-40B4-BE49-F238E27FC236}">
+                <a16:creationId xmlns:a16="http://schemas.microsoft.com/office/drawing/2014/main" id="{2E7BA006-6986-B581-8784-A12687B9E5F8}"/>
+              </a:ext>
+            </a:extLst>
+          </p:cNvPr>
+          <p:cNvSpPr txBox="1"/>
+          <p:nvPr/>
+        </p:nvSpPr>
+        <p:spPr>
+          <a:xfrm>
+            <a:off x="1385533" y="6037437"/>
+            <a:ext cx="1971565" cy="369332"/>
+          </a:xfrm>
+          <a:prstGeom prst="rect">
+            <a:avLst/>
+          </a:prstGeom>
+          <a:noFill/>
+        </p:spPr>
+        <p:txBody>
+          <a:bodyPr wrap="none" rtlCol="0">
+            <a:spAutoFit/>
+          </a:bodyPr>
+          <a:lstStyle/>
+          <a:p>
+            <a:r>
+              <a:rPr lang="en-GB" dirty="0"/>
+              <a:t>Recommendation</a:t>
+            </a:r>
+          </a:p>
+        </p:txBody>
+      </p:sp>
+      <p:sp>
+        <p:nvSpPr>
+          <p:cNvPr id="41" name="Rectangle 40">
+            <a:extLst>
+              <a:ext uri="{FF2B5EF4-FFF2-40B4-BE49-F238E27FC236}">
+                <a16:creationId xmlns:a16="http://schemas.microsoft.com/office/drawing/2014/main" id="{5C243E3D-74D9-B9B0-E7C2-D07C62D7A5DE}"/>
+              </a:ext>
+            </a:extLst>
+          </p:cNvPr>
+          <p:cNvSpPr/>
+          <p:nvPr/>
+        </p:nvSpPr>
+        <p:spPr>
+          <a:xfrm>
+            <a:off x="4592068" y="3861555"/>
+            <a:ext cx="1828800" cy="364726"/>
+          </a:xfrm>
+          <a:prstGeom prst="rect">
+            <a:avLst/>
+          </a:prstGeom>
+          <a:solidFill>
+            <a:schemeClr val="accent2"/>
+          </a:solidFill>
+        </p:spPr>
+        <p:style>
+          <a:lnRef idx="2">
+            <a:schemeClr val="accent1">
+              <a:shade val="15000"/>
+            </a:schemeClr>
+          </a:lnRef>
+          <a:fillRef idx="1">
+            <a:schemeClr val="accent1"/>
+          </a:fillRef>
+          <a:effectRef idx="0">
+            <a:schemeClr val="accent1"/>
+          </a:effectRef>
+          <a:fontRef idx="minor">
+            <a:schemeClr val="lt1"/>
+          </a:fontRef>
+        </p:style>
+        <p:txBody>
+          <a:bodyPr rtlCol="0" anchor="ctr"/>
+          <a:lstStyle/>
+          <a:p>
+            <a:pPr algn="ctr"/>
+            <a:r>
+              <a:rPr lang="en-GB" dirty="0"/>
+              <a:t>Name 1</a:t>
+            </a:r>
+          </a:p>
+        </p:txBody>
+      </p:sp>
+      <p:sp>
+        <p:nvSpPr>
+          <p:cNvPr id="42" name="Rectangle 41">
+            <a:extLst>
+              <a:ext uri="{FF2B5EF4-FFF2-40B4-BE49-F238E27FC236}">
+                <a16:creationId xmlns:a16="http://schemas.microsoft.com/office/drawing/2014/main" id="{6121491E-00B0-55DE-2F83-9D7E92A2F88D}"/>
+              </a:ext>
+            </a:extLst>
+          </p:cNvPr>
+          <p:cNvSpPr/>
+          <p:nvPr/>
+        </p:nvSpPr>
+        <p:spPr>
+          <a:xfrm>
+            <a:off x="4592068" y="4274539"/>
+            <a:ext cx="1828800" cy="364726"/>
+          </a:xfrm>
+          <a:prstGeom prst="rect">
+            <a:avLst/>
+          </a:prstGeom>
+          <a:solidFill>
+            <a:schemeClr val="accent6"/>
+          </a:solidFill>
+        </p:spPr>
+        <p:style>
+          <a:lnRef idx="2">
+            <a:schemeClr val="accent1">
+              <a:shade val="15000"/>
+            </a:schemeClr>
+          </a:lnRef>
+          <a:fillRef idx="1">
+            <a:schemeClr val="accent1"/>
+          </a:fillRef>
+          <a:effectRef idx="0">
+            <a:schemeClr val="accent1"/>
+          </a:effectRef>
+          <a:fontRef idx="minor">
+            <a:schemeClr val="lt1"/>
+          </a:fontRef>
+        </p:style>
+        <p:txBody>
+          <a:bodyPr rtlCol="0" anchor="ctr"/>
+          <a:lstStyle/>
+          <a:p>
+            <a:pPr algn="ctr"/>
+            <a:r>
+              <a:rPr lang="en-GB" dirty="0"/>
+              <a:t>Name 2</a:t>
+            </a:r>
+          </a:p>
+        </p:txBody>
+      </p:sp>
+      <p:sp>
+        <p:nvSpPr>
+          <p:cNvPr id="44" name="Rectangle 43">
+            <a:extLst>
+              <a:ext uri="{FF2B5EF4-FFF2-40B4-BE49-F238E27FC236}">
+                <a16:creationId xmlns:a16="http://schemas.microsoft.com/office/drawing/2014/main" id="{D9629A88-C6ED-E900-7981-EC58A01102F0}"/>
+              </a:ext>
+            </a:extLst>
+          </p:cNvPr>
+          <p:cNvSpPr/>
+          <p:nvPr/>
+        </p:nvSpPr>
+        <p:spPr>
+          <a:xfrm>
+            <a:off x="4592068" y="5104961"/>
+            <a:ext cx="1828800" cy="364726"/>
+          </a:xfrm>
+          <a:prstGeom prst="rect">
+            <a:avLst/>
+          </a:prstGeom>
+          <a:solidFill>
+            <a:srgbClr val="C00000"/>
+          </a:solidFill>
+        </p:spPr>
+        <p:style>
+          <a:lnRef idx="2">
+            <a:schemeClr val="accent1">
+              <a:shade val="15000"/>
+            </a:schemeClr>
+          </a:lnRef>
+          <a:fillRef idx="1">
+            <a:schemeClr val="accent1"/>
+          </a:fillRef>
+          <a:effectRef idx="0">
+            <a:schemeClr val="accent1"/>
+          </a:effectRef>
+          <a:fontRef idx="minor">
+            <a:schemeClr val="lt1"/>
+          </a:fontRef>
+        </p:style>
+        <p:txBody>
+          <a:bodyPr rtlCol="0" anchor="ctr"/>
+          <a:lstStyle/>
+          <a:p>
+            <a:pPr algn="ctr"/>
+            <a:r>
+              <a:rPr lang="en-GB" dirty="0"/>
+              <a:t>Name 4</a:t>
+            </a:r>
+          </a:p>
+        </p:txBody>
+      </p:sp>
+      <p:sp>
+        <p:nvSpPr>
+          <p:cNvPr id="51" name="TextBox 50">
+            <a:extLst>
+              <a:ext uri="{FF2B5EF4-FFF2-40B4-BE49-F238E27FC236}">
+                <a16:creationId xmlns:a16="http://schemas.microsoft.com/office/drawing/2014/main" id="{EFBD92F0-791B-8973-B500-8F52696D9D8B}"/>
+              </a:ext>
+            </a:extLst>
+          </p:cNvPr>
+          <p:cNvSpPr txBox="1"/>
+          <p:nvPr/>
+        </p:nvSpPr>
+        <p:spPr>
+          <a:xfrm>
+            <a:off x="4385714" y="3393945"/>
+            <a:ext cx="1481496" cy="276999"/>
+          </a:xfrm>
+          <a:prstGeom prst="rect">
+            <a:avLst/>
+          </a:prstGeom>
+          <a:noFill/>
+        </p:spPr>
+        <p:txBody>
+          <a:bodyPr wrap="none" rtlCol="0">
+            <a:spAutoFit/>
+          </a:bodyPr>
+          <a:lstStyle/>
+          <a:p>
+            <a:r>
+              <a:rPr lang="en-GB" sz="1200" dirty="0"/>
+              <a:t>Individual fit quality</a:t>
+            </a:r>
+          </a:p>
+        </p:txBody>
+      </p:sp>
+      <p:grpSp>
+        <p:nvGrpSpPr>
+          <p:cNvPr id="67" name="Group 66">
+            <a:extLst>
+              <a:ext uri="{FF2B5EF4-FFF2-40B4-BE49-F238E27FC236}">
+                <a16:creationId xmlns:a16="http://schemas.microsoft.com/office/drawing/2014/main" id="{37E4984B-ED81-86C2-1D26-123683DB1F95}"/>
+              </a:ext>
+            </a:extLst>
+          </p:cNvPr>
+          <p:cNvGrpSpPr/>
+          <p:nvPr/>
+        </p:nvGrpSpPr>
+        <p:grpSpPr>
+          <a:xfrm>
+            <a:off x="10417215" y="3840151"/>
+            <a:ext cx="302871" cy="2501992"/>
+            <a:chOff x="10417215" y="3840151"/>
+            <a:chExt cx="302871" cy="2501992"/>
+          </a:xfrm>
+        </p:grpSpPr>
+        <p:sp>
+          <p:nvSpPr>
+            <p:cNvPr id="52" name="Rectangle 51">
+              <a:extLst>
+                <a:ext uri="{FF2B5EF4-FFF2-40B4-BE49-F238E27FC236}">
+                  <a16:creationId xmlns:a16="http://schemas.microsoft.com/office/drawing/2014/main" id="{EFCCAC4F-3B7E-B995-A8E4-8F89C0EBAC25}"/>
+                </a:ext>
+              </a:extLst>
+            </p:cNvPr>
+            <p:cNvSpPr/>
+            <p:nvPr/>
+          </p:nvSpPr>
+          <p:spPr>
+            <a:xfrm>
+              <a:off x="10417215" y="3840151"/>
+              <a:ext cx="302871" cy="2501992"/>
+            </a:xfrm>
+            <a:prstGeom prst="rect">
+              <a:avLst/>
+            </a:prstGeom>
+            <a:solidFill>
+              <a:schemeClr val="tx1">
+                <a:lumMod val="50000"/>
+                <a:lumOff val="50000"/>
+              </a:schemeClr>
+            </a:solidFill>
+          </p:spPr>
+          <p:style>
+            <a:lnRef idx="2">
+              <a:schemeClr val="accent1">
+                <a:shade val="15000"/>
+              </a:schemeClr>
+            </a:lnRef>
+            <a:fillRef idx="1">
+              <a:schemeClr val="accent1"/>
+            </a:fillRef>
+            <a:effectRef idx="0">
+              <a:schemeClr val="accent1"/>
+            </a:effectRef>
+            <a:fontRef idx="minor">
+              <a:schemeClr val="lt1"/>
+            </a:fontRef>
+          </p:style>
+          <p:txBody>
+            <a:bodyPr rtlCol="0" anchor="ctr"/>
+            <a:lstStyle/>
+            <a:p>
+              <a:pPr algn="ctr"/>
+              <a:endParaRPr lang="en-GB"/>
+            </a:p>
+          </p:txBody>
+        </p:sp>
+        <p:sp>
+          <p:nvSpPr>
+            <p:cNvPr id="53" name="Isosceles Triangle 52">
+              <a:extLst>
+                <a:ext uri="{FF2B5EF4-FFF2-40B4-BE49-F238E27FC236}">
+                  <a16:creationId xmlns:a16="http://schemas.microsoft.com/office/drawing/2014/main" id="{DB85DE33-9F57-F700-8F5C-63C1FE97EC53}"/>
+                </a:ext>
+              </a:extLst>
+            </p:cNvPr>
+            <p:cNvSpPr/>
+            <p:nvPr/>
+          </p:nvSpPr>
+          <p:spPr>
+            <a:xfrm>
+              <a:off x="10465692" y="3899265"/>
+              <a:ext cx="247929" cy="265160"/>
+            </a:xfrm>
+            <a:prstGeom prst="triangle">
+              <a:avLst/>
+            </a:prstGeom>
+          </p:spPr>
+          <p:style>
+            <a:lnRef idx="2">
+              <a:schemeClr val="accent1">
+                <a:shade val="15000"/>
+              </a:schemeClr>
+            </a:lnRef>
+            <a:fillRef idx="1">
+              <a:schemeClr val="accent1"/>
+            </a:fillRef>
+            <a:effectRef idx="0">
+              <a:schemeClr val="accent1"/>
+            </a:effectRef>
+            <a:fontRef idx="minor">
+              <a:schemeClr val="lt1"/>
+            </a:fontRef>
+          </p:style>
+          <p:txBody>
+            <a:bodyPr rtlCol="0" anchor="ctr"/>
+            <a:lstStyle/>
+            <a:p>
+              <a:pPr algn="ctr"/>
+              <a:endParaRPr lang="en-GB"/>
+            </a:p>
+          </p:txBody>
+        </p:sp>
+        <p:sp>
+          <p:nvSpPr>
+            <p:cNvPr id="54" name="Isosceles Triangle 53">
+              <a:extLst>
+                <a:ext uri="{FF2B5EF4-FFF2-40B4-BE49-F238E27FC236}">
+                  <a16:creationId xmlns:a16="http://schemas.microsoft.com/office/drawing/2014/main" id="{881058FC-A551-67AB-7783-4017854FD01F}"/>
+                </a:ext>
+              </a:extLst>
+            </p:cNvPr>
+            <p:cNvSpPr/>
+            <p:nvPr/>
+          </p:nvSpPr>
+          <p:spPr>
+            <a:xfrm rot="10800000">
+              <a:off x="10417215" y="5991370"/>
+              <a:ext cx="247929" cy="265160"/>
+            </a:xfrm>
+            <a:prstGeom prst="triangle">
+              <a:avLst/>
+            </a:prstGeom>
+          </p:spPr>
+          <p:style>
+            <a:lnRef idx="2">
+              <a:schemeClr val="accent1">
+                <a:shade val="15000"/>
+              </a:schemeClr>
+            </a:lnRef>
+            <a:fillRef idx="1">
+              <a:schemeClr val="accent1"/>
+            </a:fillRef>
+            <a:effectRef idx="0">
+              <a:schemeClr val="accent1"/>
+            </a:effectRef>
+            <a:fontRef idx="minor">
+              <a:schemeClr val="lt1"/>
+            </a:fontRef>
+          </p:style>
+          <p:txBody>
+            <a:bodyPr rtlCol="0" anchor="ctr"/>
+            <a:lstStyle/>
+            <a:p>
+              <a:pPr algn="ctr"/>
+              <a:endParaRPr lang="en-GB"/>
+            </a:p>
+          </p:txBody>
+        </p:sp>
+      </p:grpSp>
+      <p:sp>
+        <p:nvSpPr>
+          <p:cNvPr id="58" name="Rectangle 57">
+            <a:extLst>
+              <a:ext uri="{FF2B5EF4-FFF2-40B4-BE49-F238E27FC236}">
+                <a16:creationId xmlns:a16="http://schemas.microsoft.com/office/drawing/2014/main" id="{DAD7BB5A-9490-E790-D765-ABED03117FBF}"/>
+              </a:ext>
+            </a:extLst>
+          </p:cNvPr>
+          <p:cNvSpPr/>
+          <p:nvPr/>
+        </p:nvSpPr>
+        <p:spPr>
+          <a:xfrm>
+            <a:off x="4445921" y="3802563"/>
+            <a:ext cx="6360546" cy="2604205"/>
+          </a:xfrm>
+          <a:prstGeom prst="rect">
+            <a:avLst/>
+          </a:prstGeom>
+          <a:noFill/>
+        </p:spPr>
+        <p:style>
+          <a:lnRef idx="2">
+            <a:schemeClr val="accent1">
+              <a:shade val="15000"/>
+            </a:schemeClr>
+          </a:lnRef>
+          <a:fillRef idx="1">
+            <a:schemeClr val="accent1"/>
+          </a:fillRef>
+          <a:effectRef idx="0">
+            <a:schemeClr val="accent1"/>
+          </a:effectRef>
+          <a:fontRef idx="minor">
+            <a:schemeClr val="lt1"/>
+          </a:fontRef>
+        </p:style>
+        <p:txBody>
+          <a:bodyPr rtlCol="0" anchor="ctr"/>
+          <a:lstStyle/>
+          <a:p>
+            <a:pPr algn="ctr"/>
+            <a:endParaRPr lang="en-GB"/>
+          </a:p>
+        </p:txBody>
+      </p:sp>
+      <p:cxnSp>
+        <p:nvCxnSpPr>
+          <p:cNvPr id="60" name="Straight Connector 59">
+            <a:extLst>
+              <a:ext uri="{FF2B5EF4-FFF2-40B4-BE49-F238E27FC236}">
+                <a16:creationId xmlns:a16="http://schemas.microsoft.com/office/drawing/2014/main" id="{E825086F-044C-F997-EDE5-12F14FF5A661}"/>
+              </a:ext>
+            </a:extLst>
+          </p:cNvPr>
+          <p:cNvCxnSpPr>
+            <a:cxnSpLocks/>
+          </p:cNvCxnSpPr>
+          <p:nvPr/>
+        </p:nvCxnSpPr>
+        <p:spPr>
+          <a:xfrm>
+            <a:off x="4445921" y="3678385"/>
+            <a:ext cx="1455578" cy="0"/>
+          </a:xfrm>
+          <a:prstGeom prst="line">
+            <a:avLst/>
+          </a:prstGeom>
+        </p:spPr>
+        <p:style>
+          <a:lnRef idx="2">
+            <a:schemeClr val="accent1"/>
+          </a:lnRef>
+          <a:fillRef idx="0">
+            <a:schemeClr val="accent1"/>
+          </a:fillRef>
+          <a:effectRef idx="1">
+            <a:schemeClr val="accent1"/>
+          </a:effectRef>
+          <a:fontRef idx="minor">
+            <a:schemeClr val="tx1"/>
+          </a:fontRef>
+        </p:style>
+      </p:cxnSp>
+      <p:sp>
+        <p:nvSpPr>
+          <p:cNvPr id="65" name="TextBox 64">
+            <a:extLst>
+              <a:ext uri="{FF2B5EF4-FFF2-40B4-BE49-F238E27FC236}">
+                <a16:creationId xmlns:a16="http://schemas.microsoft.com/office/drawing/2014/main" id="{39780305-F565-7892-9561-E30562EE2AF4}"/>
+              </a:ext>
+            </a:extLst>
+          </p:cNvPr>
+          <p:cNvSpPr txBox="1"/>
+          <p:nvPr/>
+        </p:nvSpPr>
+        <p:spPr>
+          <a:xfrm>
+            <a:off x="6063607" y="3406838"/>
+            <a:ext cx="1010918" cy="276999"/>
+          </a:xfrm>
+          <a:prstGeom prst="rect">
+            <a:avLst/>
+          </a:prstGeom>
+          <a:noFill/>
+        </p:spPr>
+        <p:txBody>
+          <a:bodyPr wrap="none" rtlCol="0">
+            <a:spAutoFit/>
+          </a:bodyPr>
+          <a:lstStyle/>
+          <a:p>
+            <a:r>
+              <a:rPr lang="en-GB" sz="1200" dirty="0"/>
+              <a:t>Well rates fit</a:t>
+            </a:r>
+          </a:p>
+        </p:txBody>
+      </p:sp>
+      <p:sp>
+        <p:nvSpPr>
+          <p:cNvPr id="68" name="TextBox 67">
+            <a:extLst>
+              <a:ext uri="{FF2B5EF4-FFF2-40B4-BE49-F238E27FC236}">
+                <a16:creationId xmlns:a16="http://schemas.microsoft.com/office/drawing/2014/main" id="{A5113085-A461-CAB6-D64A-96ADBAC073F2}"/>
+              </a:ext>
+            </a:extLst>
+          </p:cNvPr>
+          <p:cNvSpPr txBox="1"/>
+          <p:nvPr/>
+        </p:nvSpPr>
+        <p:spPr>
+          <a:xfrm>
+            <a:off x="1079861" y="2832406"/>
+            <a:ext cx="1782667" cy="369332"/>
+          </a:xfrm>
+          <a:prstGeom prst="rect">
+            <a:avLst/>
+          </a:prstGeom>
+          <a:noFill/>
+        </p:spPr>
+        <p:txBody>
+          <a:bodyPr wrap="none" rtlCol="0">
+            <a:spAutoFit/>
+          </a:bodyPr>
+          <a:lstStyle/>
+          <a:p>
+            <a:r>
+              <a:rPr lang="en-GB" dirty="0"/>
+              <a:t>Simulation case</a:t>
+            </a:r>
+          </a:p>
+        </p:txBody>
+      </p:sp>
+      <p:sp>
+        <p:nvSpPr>
+          <p:cNvPr id="69" name="TextBox 68">
+            <a:extLst>
+              <a:ext uri="{FF2B5EF4-FFF2-40B4-BE49-F238E27FC236}">
+                <a16:creationId xmlns:a16="http://schemas.microsoft.com/office/drawing/2014/main" id="{5053C73B-0F1B-BA22-50FC-694B54337A1E}"/>
+              </a:ext>
+            </a:extLst>
+          </p:cNvPr>
+          <p:cNvSpPr txBox="1"/>
+          <p:nvPr/>
+        </p:nvSpPr>
+        <p:spPr>
+          <a:xfrm>
+            <a:off x="2822145" y="2817440"/>
+            <a:ext cx="1279196" cy="369332"/>
+          </a:xfrm>
+          <a:prstGeom prst="rect">
+            <a:avLst/>
+          </a:prstGeom>
+          <a:noFill/>
+        </p:spPr>
+        <p:txBody>
+          <a:bodyPr wrap="none" rtlCol="0">
+            <a:spAutoFit/>
+          </a:bodyPr>
+          <a:lstStyle/>
+          <a:p>
+            <a:r>
+              <a:rPr lang="en-GB" dirty="0"/>
+              <a:t>Test case 1</a:t>
+            </a:r>
+          </a:p>
+        </p:txBody>
+      </p:sp>
+      <p:grpSp>
+        <p:nvGrpSpPr>
+          <p:cNvPr id="79" name="Group 78">
+            <a:extLst>
+              <a:ext uri="{FF2B5EF4-FFF2-40B4-BE49-F238E27FC236}">
+                <a16:creationId xmlns:a16="http://schemas.microsoft.com/office/drawing/2014/main" id="{BD9D842E-8A6D-A096-A70F-E7633F9852E9}"/>
+              </a:ext>
+            </a:extLst>
+          </p:cNvPr>
+          <p:cNvGrpSpPr/>
+          <p:nvPr/>
+        </p:nvGrpSpPr>
+        <p:grpSpPr>
+          <a:xfrm>
+            <a:off x="1137110" y="5635048"/>
+            <a:ext cx="248423" cy="205699"/>
+            <a:chOff x="7191566" y="2214754"/>
+            <a:chExt cx="248423" cy="205699"/>
+          </a:xfrm>
+        </p:grpSpPr>
+        <p:sp>
+          <p:nvSpPr>
+            <p:cNvPr id="70" name="Rectangle 69">
+              <a:extLst>
+                <a:ext uri="{FF2B5EF4-FFF2-40B4-BE49-F238E27FC236}">
+                  <a16:creationId xmlns:a16="http://schemas.microsoft.com/office/drawing/2014/main" id="{8963B098-1CC4-AD8E-5F24-2E9AAD4DFDEB}"/>
+                </a:ext>
+              </a:extLst>
+            </p:cNvPr>
+            <p:cNvSpPr/>
+            <p:nvPr/>
+          </p:nvSpPr>
+          <p:spPr>
+            <a:xfrm>
+              <a:off x="7191566" y="2214754"/>
+              <a:ext cx="248423" cy="205699"/>
+            </a:xfrm>
+            <a:prstGeom prst="rect">
+              <a:avLst/>
+            </a:prstGeom>
+            <a:solidFill>
+              <a:schemeClr val="bg2"/>
+            </a:solidFill>
+          </p:spPr>
+          <p:style>
+            <a:lnRef idx="2">
+              <a:schemeClr val="accent1">
+                <a:shade val="15000"/>
+              </a:schemeClr>
+            </a:lnRef>
+            <a:fillRef idx="1">
+              <a:schemeClr val="accent1"/>
+            </a:fillRef>
+            <a:effectRef idx="0">
+              <a:schemeClr val="accent1"/>
+            </a:effectRef>
+            <a:fontRef idx="minor">
+              <a:schemeClr val="lt1"/>
+            </a:fontRef>
+          </p:style>
+          <p:txBody>
+            <a:bodyPr rtlCol="0" anchor="ctr"/>
+            <a:lstStyle/>
+            <a:p>
+              <a:pPr algn="ctr"/>
+              <a:endParaRPr lang="en-GB"/>
+            </a:p>
+          </p:txBody>
+        </p:sp>
+        <p:grpSp>
+          <p:nvGrpSpPr>
+            <p:cNvPr id="76" name="Group 75">
+              <a:extLst>
+                <a:ext uri="{FF2B5EF4-FFF2-40B4-BE49-F238E27FC236}">
+                  <a16:creationId xmlns:a16="http://schemas.microsoft.com/office/drawing/2014/main" id="{35B0D5BC-7320-47C6-070B-D363A7F31829}"/>
+                </a:ext>
+              </a:extLst>
+            </p:cNvPr>
+            <p:cNvGrpSpPr/>
+            <p:nvPr/>
+          </p:nvGrpSpPr>
+          <p:grpSpPr>
+            <a:xfrm>
+              <a:off x="7247079" y="2259577"/>
+              <a:ext cx="103451" cy="116051"/>
+              <a:chOff x="7074525" y="2134073"/>
+              <a:chExt cx="103451" cy="116051"/>
+            </a:xfrm>
+          </p:grpSpPr>
+          <p:cxnSp>
+            <p:nvCxnSpPr>
+              <p:cNvPr id="72" name="Straight Connector 71">
+                <a:extLst>
+                  <a:ext uri="{FF2B5EF4-FFF2-40B4-BE49-F238E27FC236}">
+                    <a16:creationId xmlns:a16="http://schemas.microsoft.com/office/drawing/2014/main" id="{C1D6227E-B504-542C-C142-6B8D7BBA66BA}"/>
+                  </a:ext>
+                </a:extLst>
+              </p:cNvPr>
+              <p:cNvCxnSpPr>
+                <a:cxnSpLocks/>
+              </p:cNvCxnSpPr>
+              <p:nvPr/>
+            </p:nvCxnSpPr>
+            <p:spPr>
+              <a:xfrm>
+                <a:off x="7074525" y="2134073"/>
+                <a:ext cx="103451" cy="116051"/>
+              </a:xfrm>
+              <a:prstGeom prst="line">
+                <a:avLst/>
+              </a:prstGeom>
+              <a:ln>
+                <a:solidFill>
+                  <a:schemeClr val="tx1"/>
+                </a:solidFill>
+              </a:ln>
+            </p:spPr>
+            <p:style>
+              <a:lnRef idx="2">
+                <a:schemeClr val="accent1"/>
+              </a:lnRef>
+              <a:fillRef idx="0">
+                <a:schemeClr val="accent1"/>
+              </a:fillRef>
+              <a:effectRef idx="1">
+                <a:schemeClr val="accent1"/>
+              </a:effectRef>
+              <a:fontRef idx="minor">
+                <a:schemeClr val="tx1"/>
+              </a:fontRef>
+            </p:style>
+          </p:cxnSp>
+          <p:cxnSp>
+            <p:nvCxnSpPr>
+              <p:cNvPr id="73" name="Straight Connector 72">
+                <a:extLst>
+                  <a:ext uri="{FF2B5EF4-FFF2-40B4-BE49-F238E27FC236}">
+                    <a16:creationId xmlns:a16="http://schemas.microsoft.com/office/drawing/2014/main" id="{346877EC-4E24-C90B-3DAC-3E892975FDEE}"/>
+                  </a:ext>
+                </a:extLst>
+              </p:cNvPr>
+              <p:cNvCxnSpPr>
+                <a:cxnSpLocks/>
+              </p:cNvCxnSpPr>
+              <p:nvPr/>
+            </p:nvCxnSpPr>
+            <p:spPr>
+              <a:xfrm flipH="1">
+                <a:off x="7080078" y="2160298"/>
+                <a:ext cx="97898" cy="89826"/>
+              </a:xfrm>
+              <a:prstGeom prst="line">
+                <a:avLst/>
+              </a:prstGeom>
+              <a:ln>
+                <a:solidFill>
+                  <a:schemeClr val="tx1"/>
+                </a:solidFill>
+              </a:ln>
+            </p:spPr>
+            <p:style>
+              <a:lnRef idx="2">
+                <a:schemeClr val="accent1"/>
+              </a:lnRef>
+              <a:fillRef idx="0">
+                <a:schemeClr val="accent1"/>
+              </a:fillRef>
+              <a:effectRef idx="1">
+                <a:schemeClr val="accent1"/>
+              </a:effectRef>
+              <a:fontRef idx="minor">
+                <a:schemeClr val="tx1"/>
+              </a:fontRef>
+            </p:style>
+          </p:cxnSp>
+        </p:grpSp>
+      </p:grpSp>
+      <p:sp>
+        <p:nvSpPr>
+          <p:cNvPr id="77" name="Rectangle 76">
+            <a:extLst>
+              <a:ext uri="{FF2B5EF4-FFF2-40B4-BE49-F238E27FC236}">
+                <a16:creationId xmlns:a16="http://schemas.microsoft.com/office/drawing/2014/main" id="{3BA950A9-4202-06C5-E941-D9A0BB26997C}"/>
+              </a:ext>
+            </a:extLst>
+          </p:cNvPr>
+          <p:cNvSpPr/>
+          <p:nvPr/>
+        </p:nvSpPr>
+        <p:spPr>
+          <a:xfrm>
+            <a:off x="1153008" y="5111491"/>
+            <a:ext cx="248423" cy="205699"/>
+          </a:xfrm>
+          <a:prstGeom prst="rect">
+            <a:avLst/>
+          </a:prstGeom>
+          <a:solidFill>
+            <a:schemeClr val="bg2"/>
+          </a:solidFill>
+        </p:spPr>
+        <p:style>
+          <a:lnRef idx="2">
+            <a:schemeClr val="accent1">
+              <a:shade val="15000"/>
+            </a:schemeClr>
+          </a:lnRef>
+          <a:fillRef idx="1">
+            <a:schemeClr val="accent1"/>
+          </a:fillRef>
+          <a:effectRef idx="0">
+            <a:schemeClr val="accent1"/>
+          </a:effectRef>
+          <a:fontRef idx="minor">
+            <a:schemeClr val="lt1"/>
+          </a:fontRef>
+        </p:style>
+        <p:txBody>
+          <a:bodyPr rtlCol="0" anchor="ctr"/>
+          <a:lstStyle/>
+          <a:p>
+            <a:pPr algn="ctr"/>
+            <a:endParaRPr lang="en-GB"/>
+          </a:p>
+        </p:txBody>
+      </p:sp>
+      <p:sp>
+        <p:nvSpPr>
+          <p:cNvPr id="78" name="Rectangle 77">
+            <a:extLst>
+              <a:ext uri="{FF2B5EF4-FFF2-40B4-BE49-F238E27FC236}">
+                <a16:creationId xmlns:a16="http://schemas.microsoft.com/office/drawing/2014/main" id="{DD78BAFB-B43F-8CB6-4694-024D81AFC795}"/>
+              </a:ext>
+            </a:extLst>
+          </p:cNvPr>
+          <p:cNvSpPr/>
+          <p:nvPr/>
+        </p:nvSpPr>
+        <p:spPr>
+          <a:xfrm>
+            <a:off x="1165051" y="6119253"/>
+            <a:ext cx="248423" cy="205699"/>
+          </a:xfrm>
+          <a:prstGeom prst="rect">
+            <a:avLst/>
+          </a:prstGeom>
+          <a:solidFill>
+            <a:schemeClr val="bg2"/>
+          </a:solidFill>
+        </p:spPr>
+        <p:style>
+          <a:lnRef idx="2">
+            <a:schemeClr val="accent1">
+              <a:shade val="15000"/>
+            </a:schemeClr>
+          </a:lnRef>
+          <a:fillRef idx="1">
+            <a:schemeClr val="accent1"/>
+          </a:fillRef>
+          <a:effectRef idx="0">
+            <a:schemeClr val="accent1"/>
+          </a:effectRef>
+          <a:fontRef idx="minor">
+            <a:schemeClr val="lt1"/>
+          </a:fontRef>
+        </p:style>
+        <p:txBody>
+          <a:bodyPr rtlCol="0" anchor="ctr"/>
+          <a:lstStyle/>
+          <a:p>
+            <a:pPr algn="ctr"/>
+            <a:endParaRPr lang="en-GB"/>
+          </a:p>
+        </p:txBody>
+      </p:sp>
+      <p:sp>
+        <p:nvSpPr>
+          <p:cNvPr id="80" name="Rectangle 79">
+            <a:extLst>
+              <a:ext uri="{FF2B5EF4-FFF2-40B4-BE49-F238E27FC236}">
+                <a16:creationId xmlns:a16="http://schemas.microsoft.com/office/drawing/2014/main" id="{38B15AAE-4FA2-BCBF-F789-9E1A302276FA}"/>
+              </a:ext>
+            </a:extLst>
+          </p:cNvPr>
+          <p:cNvSpPr/>
+          <p:nvPr/>
+        </p:nvSpPr>
+        <p:spPr>
+          <a:xfrm>
+            <a:off x="4600213" y="4691609"/>
+            <a:ext cx="1828800" cy="364726"/>
+          </a:xfrm>
+          <a:prstGeom prst="rect">
+            <a:avLst/>
+          </a:prstGeom>
+          <a:solidFill>
+            <a:schemeClr val="accent6"/>
+          </a:solidFill>
+        </p:spPr>
+        <p:style>
+          <a:lnRef idx="2">
+            <a:schemeClr val="accent1">
+              <a:shade val="15000"/>
+            </a:schemeClr>
+          </a:lnRef>
+          <a:fillRef idx="1">
+            <a:schemeClr val="accent1"/>
+          </a:fillRef>
+          <a:effectRef idx="0">
+            <a:schemeClr val="accent1"/>
+          </a:effectRef>
+          <a:fontRef idx="minor">
+            <a:schemeClr val="lt1"/>
+          </a:fontRef>
+        </p:style>
+        <p:txBody>
+          <a:bodyPr rtlCol="0" anchor="ctr"/>
+          <a:lstStyle/>
+          <a:p>
+            <a:pPr algn="ctr"/>
+            <a:r>
+              <a:rPr lang="en-GB" dirty="0"/>
+              <a:t>Name 4</a:t>
+            </a:r>
+          </a:p>
+        </p:txBody>
+      </p:sp>
+      <p:sp>
+        <p:nvSpPr>
+          <p:cNvPr id="81" name="Rectangle 80">
+            <a:extLst>
+              <a:ext uri="{FF2B5EF4-FFF2-40B4-BE49-F238E27FC236}">
+                <a16:creationId xmlns:a16="http://schemas.microsoft.com/office/drawing/2014/main" id="{92A499AE-706B-2034-1FCF-2A847B94E884}"/>
+              </a:ext>
+            </a:extLst>
+          </p:cNvPr>
+          <p:cNvSpPr/>
+          <p:nvPr/>
+        </p:nvSpPr>
+        <p:spPr>
+          <a:xfrm>
+            <a:off x="6675117" y="3863344"/>
+            <a:ext cx="1828800" cy="364726"/>
+          </a:xfrm>
+          <a:prstGeom prst="rect">
+            <a:avLst/>
+          </a:prstGeom>
+          <a:solidFill>
+            <a:schemeClr val="accent6"/>
+          </a:solidFill>
+        </p:spPr>
+        <p:style>
+          <a:lnRef idx="2">
+            <a:schemeClr val="accent1">
+              <a:shade val="15000"/>
+            </a:schemeClr>
+          </a:lnRef>
+          <a:fillRef idx="1">
+            <a:schemeClr val="accent1"/>
+          </a:fillRef>
+          <a:effectRef idx="0">
+            <a:schemeClr val="accent1"/>
+          </a:effectRef>
+          <a:fontRef idx="minor">
+            <a:schemeClr val="lt1"/>
+          </a:fontRef>
+        </p:style>
+        <p:txBody>
+          <a:bodyPr rtlCol="0" anchor="ctr"/>
+          <a:lstStyle/>
+          <a:p>
+            <a:pPr algn="ctr"/>
+            <a:r>
+              <a:rPr lang="en-GB" dirty="0"/>
+              <a:t>Name 5</a:t>
+            </a:r>
+          </a:p>
+        </p:txBody>
+      </p:sp>
+      <p:sp>
+        <p:nvSpPr>
+          <p:cNvPr id="82" name="Rectangle 81">
+            <a:extLst>
+              <a:ext uri="{FF2B5EF4-FFF2-40B4-BE49-F238E27FC236}">
+                <a16:creationId xmlns:a16="http://schemas.microsoft.com/office/drawing/2014/main" id="{92DCB13A-C910-8D43-1236-2A022744C3F9}"/>
+              </a:ext>
+            </a:extLst>
+          </p:cNvPr>
+          <p:cNvSpPr/>
+          <p:nvPr/>
+        </p:nvSpPr>
+        <p:spPr>
+          <a:xfrm>
+            <a:off x="6675117" y="4276328"/>
+            <a:ext cx="1828800" cy="364726"/>
+          </a:xfrm>
+          <a:prstGeom prst="rect">
+            <a:avLst/>
+          </a:prstGeom>
+          <a:solidFill>
+            <a:schemeClr val="accent6"/>
+          </a:solidFill>
+        </p:spPr>
+        <p:style>
+          <a:lnRef idx="2">
+            <a:schemeClr val="accent1">
+              <a:shade val="15000"/>
+            </a:schemeClr>
+          </a:lnRef>
+          <a:fillRef idx="1">
+            <a:schemeClr val="accent1"/>
+          </a:fillRef>
+          <a:effectRef idx="0">
+            <a:schemeClr val="accent1"/>
+          </a:effectRef>
+          <a:fontRef idx="minor">
+            <a:schemeClr val="lt1"/>
+          </a:fontRef>
+        </p:style>
+        <p:txBody>
+          <a:bodyPr rtlCol="0" anchor="ctr"/>
+          <a:lstStyle/>
+          <a:p>
+            <a:pPr algn="ctr"/>
+            <a:r>
+              <a:rPr lang="en-GB" dirty="0"/>
+              <a:t>Name 6</a:t>
+            </a:r>
+          </a:p>
+        </p:txBody>
+      </p:sp>
+      <p:sp>
+        <p:nvSpPr>
+          <p:cNvPr id="84" name="Rectangle 83">
+            <a:extLst>
+              <a:ext uri="{FF2B5EF4-FFF2-40B4-BE49-F238E27FC236}">
+                <a16:creationId xmlns:a16="http://schemas.microsoft.com/office/drawing/2014/main" id="{3071CFDB-58ED-6F52-5010-57CB743BFF8A}"/>
+              </a:ext>
+            </a:extLst>
+          </p:cNvPr>
+          <p:cNvSpPr/>
+          <p:nvPr/>
+        </p:nvSpPr>
+        <p:spPr>
+          <a:xfrm>
+            <a:off x="6683262" y="4693398"/>
+            <a:ext cx="1828800" cy="364726"/>
+          </a:xfrm>
+          <a:prstGeom prst="rect">
+            <a:avLst/>
+          </a:prstGeom>
+          <a:solidFill>
+            <a:schemeClr val="accent6"/>
+          </a:solidFill>
+        </p:spPr>
+        <p:style>
+          <a:lnRef idx="2">
+            <a:schemeClr val="accent1">
+              <a:shade val="15000"/>
+            </a:schemeClr>
+          </a:lnRef>
+          <a:fillRef idx="1">
+            <a:schemeClr val="accent1"/>
+          </a:fillRef>
+          <a:effectRef idx="0">
+            <a:schemeClr val="accent1"/>
+          </a:effectRef>
+          <a:fontRef idx="minor">
+            <a:schemeClr val="lt1"/>
+          </a:fontRef>
+        </p:style>
+        <p:txBody>
+          <a:bodyPr rtlCol="0" anchor="ctr"/>
+          <a:lstStyle/>
+          <a:p>
+            <a:pPr algn="ctr"/>
+            <a:r>
+              <a:rPr lang="en-GB" dirty="0"/>
+              <a:t>Name 7</a:t>
+            </a:r>
+          </a:p>
+        </p:txBody>
+      </p:sp>
+      <p:sp>
+        <p:nvSpPr>
+          <p:cNvPr id="85" name="Rectangle 84">
+            <a:extLst>
+              <a:ext uri="{FF2B5EF4-FFF2-40B4-BE49-F238E27FC236}">
+                <a16:creationId xmlns:a16="http://schemas.microsoft.com/office/drawing/2014/main" id="{D819E06E-9067-6B75-A9B7-BBB0FC1A24BD}"/>
+              </a:ext>
+            </a:extLst>
+          </p:cNvPr>
+          <p:cNvSpPr/>
+          <p:nvPr/>
+        </p:nvSpPr>
+        <p:spPr>
+          <a:xfrm>
+            <a:off x="6683262" y="5111491"/>
+            <a:ext cx="1828800" cy="364726"/>
+          </a:xfrm>
+          <a:prstGeom prst="rect">
+            <a:avLst/>
+          </a:prstGeom>
+          <a:solidFill>
+            <a:schemeClr val="accent6"/>
+          </a:solidFill>
+        </p:spPr>
+        <p:style>
+          <a:lnRef idx="2">
+            <a:schemeClr val="accent1">
+              <a:shade val="15000"/>
+            </a:schemeClr>
+          </a:lnRef>
+          <a:fillRef idx="1">
+            <a:schemeClr val="accent1"/>
+          </a:fillRef>
+          <a:effectRef idx="0">
+            <a:schemeClr val="accent1"/>
+          </a:effectRef>
+          <a:fontRef idx="minor">
+            <a:schemeClr val="lt1"/>
+          </a:fontRef>
+        </p:style>
+        <p:txBody>
+          <a:bodyPr rtlCol="0" anchor="ctr"/>
+          <a:lstStyle/>
+          <a:p>
+            <a:pPr algn="ctr"/>
+            <a:r>
+              <a:rPr lang="en-GB" dirty="0"/>
+              <a:t>Name 8</a:t>
+            </a:r>
+          </a:p>
+        </p:txBody>
+      </p:sp>
+      <p:sp>
+        <p:nvSpPr>
+          <p:cNvPr id="86" name="Rectangle 85">
+            <a:extLst>
+              <a:ext uri="{FF2B5EF4-FFF2-40B4-BE49-F238E27FC236}">
+                <a16:creationId xmlns:a16="http://schemas.microsoft.com/office/drawing/2014/main" id="{3FBD0164-C939-8E7F-47CF-A33A350580CA}"/>
+              </a:ext>
+            </a:extLst>
+          </p:cNvPr>
+          <p:cNvSpPr/>
+          <p:nvPr/>
+        </p:nvSpPr>
+        <p:spPr>
+          <a:xfrm>
+            <a:off x="8550239" y="3861814"/>
+            <a:ext cx="1828800" cy="364726"/>
+          </a:xfrm>
+          <a:prstGeom prst="rect">
+            <a:avLst/>
+          </a:prstGeom>
+          <a:solidFill>
+            <a:srgbClr val="C00000"/>
+          </a:solidFill>
+        </p:spPr>
+        <p:style>
+          <a:lnRef idx="2">
+            <a:schemeClr val="accent1">
+              <a:shade val="15000"/>
+            </a:schemeClr>
+          </a:lnRef>
+          <a:fillRef idx="1">
+            <a:schemeClr val="accent1"/>
+          </a:fillRef>
+          <a:effectRef idx="0">
+            <a:schemeClr val="accent1"/>
+          </a:effectRef>
+          <a:fontRef idx="minor">
+            <a:schemeClr val="lt1"/>
+          </a:fontRef>
+        </p:style>
+        <p:txBody>
+          <a:bodyPr rtlCol="0" anchor="ctr"/>
+          <a:lstStyle/>
+          <a:p>
+            <a:pPr algn="ctr"/>
+            <a:r>
+              <a:rPr lang="en-GB" dirty="0"/>
+              <a:t>Name 9</a:t>
+            </a:r>
+          </a:p>
+        </p:txBody>
+      </p:sp>
+    </p:spTree>
+    <p:extLst>
+      <p:ext uri="{BB962C8B-B14F-4D97-AF65-F5344CB8AC3E}">
+        <p14:creationId xmlns:p14="http://schemas.microsoft.com/office/powerpoint/2010/main" val="897551230"/>
+      </p:ext>
+    </p:extLst>
+  </p:cSld>
+  <p:clrMapOvr>
+    <a:masterClrMapping/>
+  </p:clrMapOvr>
+</p:sld>
+</file>
+
+<file path=ppt/slides/slide3.xml><?xml version="1.0" encoding="utf-8"?>
+<p:sld xmlns:a="http://schemas.openxmlformats.org/drawingml/2006/main" xmlns:r="http://schemas.openxmlformats.org/officeDocument/2006/relationships" xmlns:p="http://schemas.openxmlformats.org/presentationml/2006/main">
+  <p:cSld>
+    <p:spTree>
+      <p:nvGrpSpPr>
+        <p:cNvPr id="1" name=""/>
+        <p:cNvGrpSpPr/>
+        <p:nvPr/>
+      </p:nvGrpSpPr>
+      <p:grpSpPr>
+        <a:xfrm>
+          <a:off x="0" y="0"/>
+          <a:ext cx="0" cy="0"/>
+          <a:chOff x="0" y="0"/>
+          <a:chExt cx="0" cy="0"/>
+        </a:xfrm>
+      </p:grpSpPr>
+      <p:sp>
+        <p:nvSpPr>
+          <p:cNvPr id="4" name="TextBox 3">
+            <a:extLst>
+              <a:ext uri="{FF2B5EF4-FFF2-40B4-BE49-F238E27FC236}">
+                <a16:creationId xmlns:a16="http://schemas.microsoft.com/office/drawing/2014/main" id="{C24493BC-E3E4-7717-9383-5A9326F46504}"/>
+              </a:ext>
+            </a:extLst>
+          </p:cNvPr>
+          <p:cNvSpPr txBox="1"/>
+          <p:nvPr/>
+        </p:nvSpPr>
+        <p:spPr>
+          <a:xfrm>
+            <a:off x="983848" y="1030147"/>
+            <a:ext cx="2808526" cy="369332"/>
+          </a:xfrm>
+          <a:prstGeom prst="rect">
+            <a:avLst/>
+          </a:prstGeom>
+          <a:noFill/>
+        </p:spPr>
+        <p:txBody>
+          <a:bodyPr wrap="none" rtlCol="0">
+            <a:spAutoFit/>
+          </a:bodyPr>
+          <a:lstStyle/>
+          <a:p>
+            <a:r>
+              <a:rPr lang="en-GB" dirty="0"/>
+              <a:t>Well: BG-1011AB (injector)</a:t>
+            </a:r>
+          </a:p>
+        </p:txBody>
+      </p:sp>
+      <p:sp>
+        <p:nvSpPr>
+          <p:cNvPr id="5" name="Rectangle 4">
+            <a:extLst>
+              <a:ext uri="{FF2B5EF4-FFF2-40B4-BE49-F238E27FC236}">
+                <a16:creationId xmlns:a16="http://schemas.microsoft.com/office/drawing/2014/main" id="{0E1C2031-A191-6E52-DB97-4DCCEE8924E2}"/>
+              </a:ext>
+            </a:extLst>
+          </p:cNvPr>
+          <p:cNvSpPr/>
+          <p:nvPr/>
+        </p:nvSpPr>
+        <p:spPr>
+          <a:xfrm>
+            <a:off x="2071869" y="1655180"/>
+            <a:ext cx="266218" cy="2257063"/>
+          </a:xfrm>
+          <a:prstGeom prst="rect">
+            <a:avLst/>
+          </a:prstGeom>
+        </p:spPr>
+        <p:style>
+          <a:lnRef idx="2">
+            <a:schemeClr val="accent1">
+              <a:shade val="15000"/>
+            </a:schemeClr>
+          </a:lnRef>
+          <a:fillRef idx="1">
+            <a:schemeClr val="accent1"/>
+          </a:fillRef>
+          <a:effectRef idx="0">
+            <a:schemeClr val="accent1"/>
+          </a:effectRef>
+          <a:fontRef idx="minor">
+            <a:schemeClr val="lt1"/>
+          </a:fontRef>
+        </p:style>
+        <p:txBody>
+          <a:bodyPr rtlCol="0" anchor="ctr"/>
+          <a:lstStyle/>
+          <a:p>
+            <a:pPr algn="ctr"/>
+            <a:endParaRPr lang="en-GB"/>
+          </a:p>
+        </p:txBody>
+      </p:sp>
+      <p:sp>
+        <p:nvSpPr>
+          <p:cNvPr id="6" name="Rectangle 5">
+            <a:extLst>
+              <a:ext uri="{FF2B5EF4-FFF2-40B4-BE49-F238E27FC236}">
+                <a16:creationId xmlns:a16="http://schemas.microsoft.com/office/drawing/2014/main" id="{C1E3E5D3-35D9-F5CF-60D6-252AFD1FDA0A}"/>
+              </a:ext>
+            </a:extLst>
+          </p:cNvPr>
+          <p:cNvSpPr/>
+          <p:nvPr/>
+        </p:nvSpPr>
+        <p:spPr>
+          <a:xfrm>
+            <a:off x="3792374" y="1655180"/>
+            <a:ext cx="266218" cy="2257063"/>
+          </a:xfrm>
+          <a:prstGeom prst="rect">
+            <a:avLst/>
+          </a:prstGeom>
+        </p:spPr>
+        <p:style>
+          <a:lnRef idx="2">
+            <a:schemeClr val="accent1">
+              <a:shade val="15000"/>
+            </a:schemeClr>
+          </a:lnRef>
+          <a:fillRef idx="1">
+            <a:schemeClr val="accent1"/>
+          </a:fillRef>
+          <a:effectRef idx="0">
+            <a:schemeClr val="accent1"/>
+          </a:effectRef>
+          <a:fontRef idx="minor">
+            <a:schemeClr val="lt1"/>
+          </a:fontRef>
+        </p:style>
+        <p:txBody>
+          <a:bodyPr rtlCol="0" anchor="ctr"/>
+          <a:lstStyle/>
+          <a:p>
+            <a:pPr algn="ctr"/>
+            <a:endParaRPr lang="en-GB"/>
+          </a:p>
+        </p:txBody>
+      </p:sp>
+      <p:sp>
+        <p:nvSpPr>
+          <p:cNvPr id="7" name="Rectangle 6">
+            <a:extLst>
+              <a:ext uri="{FF2B5EF4-FFF2-40B4-BE49-F238E27FC236}">
+                <a16:creationId xmlns:a16="http://schemas.microsoft.com/office/drawing/2014/main" id="{A96C3505-A47B-C899-A918-741F2F956A9E}"/>
+              </a:ext>
+            </a:extLst>
+          </p:cNvPr>
+          <p:cNvSpPr/>
+          <p:nvPr/>
+        </p:nvSpPr>
+        <p:spPr>
+          <a:xfrm>
+            <a:off x="5379770" y="1655179"/>
+            <a:ext cx="266218" cy="2257063"/>
+          </a:xfrm>
+          <a:prstGeom prst="rect">
+            <a:avLst/>
+          </a:prstGeom>
+        </p:spPr>
+        <p:style>
+          <a:lnRef idx="2">
+            <a:schemeClr val="accent1">
+              <a:shade val="15000"/>
+            </a:schemeClr>
+          </a:lnRef>
+          <a:fillRef idx="1">
+            <a:schemeClr val="accent1"/>
+          </a:fillRef>
+          <a:effectRef idx="0">
+            <a:schemeClr val="accent1"/>
+          </a:effectRef>
+          <a:fontRef idx="minor">
+            <a:schemeClr val="lt1"/>
+          </a:fontRef>
+        </p:style>
+        <p:txBody>
+          <a:bodyPr rtlCol="0" anchor="ctr"/>
+          <a:lstStyle/>
+          <a:p>
+            <a:pPr algn="ctr"/>
+            <a:endParaRPr lang="en-GB"/>
+          </a:p>
+        </p:txBody>
+      </p:sp>
+      <p:sp>
+        <p:nvSpPr>
+          <p:cNvPr id="8" name="TextBox 7">
+            <a:extLst>
+              <a:ext uri="{FF2B5EF4-FFF2-40B4-BE49-F238E27FC236}">
+                <a16:creationId xmlns:a16="http://schemas.microsoft.com/office/drawing/2014/main" id="{AE837F5B-63AE-4441-1870-381B4F260255}"/>
+              </a:ext>
+            </a:extLst>
+          </p:cNvPr>
+          <p:cNvSpPr txBox="1"/>
+          <p:nvPr/>
+        </p:nvSpPr>
+        <p:spPr>
+          <a:xfrm>
+            <a:off x="1319514" y="4907666"/>
+            <a:ext cx="5214376" cy="369332"/>
+          </a:xfrm>
+          <a:prstGeom prst="rect">
+            <a:avLst/>
+          </a:prstGeom>
+          <a:noFill/>
+        </p:spPr>
+        <p:txBody>
+          <a:bodyPr wrap="none" rtlCol="0">
+            <a:spAutoFit/>
+          </a:bodyPr>
+          <a:lstStyle/>
+          <a:p>
+            <a:r>
+              <a:rPr lang="en-GB" dirty="0" err="1"/>
+              <a:t>add_connectivities</a:t>
+            </a:r>
+            <a:r>
+              <a:rPr lang="en-GB" dirty="0"/>
+              <a:t>( </a:t>
+            </a:r>
+            <a:r>
+              <a:rPr lang="en-GB" dirty="0" err="1"/>
+              <a:t>simulation_case_name</a:t>
+            </a:r>
+            <a:r>
+              <a:rPr lang="en-GB" dirty="0"/>
+              <a:t>, data ) </a:t>
+            </a:r>
+          </a:p>
+        </p:txBody>
+      </p:sp>
+    </p:spTree>
+    <p:extLst>
+      <p:ext uri="{BB962C8B-B14F-4D97-AF65-F5344CB8AC3E}">
+        <p14:creationId xmlns:p14="http://schemas.microsoft.com/office/powerpoint/2010/main" val="234539514"/>
+      </p:ext>
+    </p:extLst>
+  </p:cSld>
+  <p:clrMapOvr>
+    <a:masterClrMapping/>
+  </p:clrMapOvr>
+</p:sld>
+</file>
+
+<file path=ppt/slides/slide4.xml><?xml version="1.0" encoding="utf-8"?>
+<p:sld xmlns:a="http://schemas.openxmlformats.org/drawingml/2006/main" xmlns:r="http://schemas.openxmlformats.org/officeDocument/2006/relationships" xmlns:p="http://schemas.openxmlformats.org/presentationml/2006/main">
+  <p:cSld>
+    <p:spTree>
+      <p:nvGrpSpPr>
+        <p:cNvPr id="1" name=""/>
+        <p:cNvGrpSpPr/>
+        <p:nvPr/>
+      </p:nvGrpSpPr>
+      <p:grpSpPr>
+        <a:xfrm>
+          <a:off x="0" y="0"/>
+          <a:ext cx="0" cy="0"/>
+          <a:chOff x="0" y="0"/>
+          <a:chExt cx="0" cy="0"/>
+        </a:xfrm>
+      </p:grpSpPr>
+      <p:sp>
+        <p:nvSpPr>
+          <p:cNvPr id="10" name="Rectangle 9">
+            <a:extLst>
+              <a:ext uri="{FF2B5EF4-FFF2-40B4-BE49-F238E27FC236}">
+                <a16:creationId xmlns:a16="http://schemas.microsoft.com/office/drawing/2014/main" id="{6DA03C3E-70C1-28F3-F304-98F3E442838B}"/>
+              </a:ext>
+            </a:extLst>
+          </p:cNvPr>
+          <p:cNvSpPr/>
+          <p:nvPr/>
+        </p:nvSpPr>
+        <p:spPr>
+          <a:xfrm>
+            <a:off x="7183530" y="2811590"/>
+            <a:ext cx="1111169" cy="369332"/>
+          </a:xfrm>
+          <a:prstGeom prst="rect">
+            <a:avLst/>
+          </a:prstGeom>
+        </p:spPr>
+        <p:style>
+          <a:lnRef idx="2">
+            <a:schemeClr val="accent1">
+              <a:shade val="15000"/>
+            </a:schemeClr>
+          </a:lnRef>
+          <a:fillRef idx="1">
+            <a:schemeClr val="accent1"/>
+          </a:fillRef>
+          <a:effectRef idx="0">
+            <a:schemeClr val="accent1"/>
+          </a:effectRef>
+          <a:fontRef idx="minor">
+            <a:schemeClr val="lt1"/>
+          </a:fontRef>
+        </p:style>
+        <p:txBody>
+          <a:bodyPr rtlCol="0" anchor="ctr"/>
+          <a:lstStyle/>
+          <a:p>
+            <a:pPr algn="ctr"/>
+            <a:endParaRPr lang="en-GB"/>
+          </a:p>
+        </p:txBody>
+      </p:sp>
+      <p:sp>
+        <p:nvSpPr>
+          <p:cNvPr id="12" name="Rectangle 11">
+            <a:extLst>
+              <a:ext uri="{FF2B5EF4-FFF2-40B4-BE49-F238E27FC236}">
+                <a16:creationId xmlns:a16="http://schemas.microsoft.com/office/drawing/2014/main" id="{1AF73F5F-A9B4-AB21-00B7-663A130355FD}"/>
+              </a:ext>
+            </a:extLst>
+          </p:cNvPr>
+          <p:cNvSpPr/>
+          <p:nvPr/>
+        </p:nvSpPr>
+        <p:spPr>
+          <a:xfrm>
+            <a:off x="4782273" y="2840013"/>
+            <a:ext cx="1111169" cy="369332"/>
+          </a:xfrm>
+          <a:prstGeom prst="rect">
+            <a:avLst/>
+          </a:prstGeom>
+          <a:solidFill>
+            <a:schemeClr val="bg2">
+              <a:lumMod val="90000"/>
+            </a:schemeClr>
+          </a:solidFill>
+          <a:ln>
+            <a:solidFill>
+              <a:schemeClr val="tx1">
+                <a:lumMod val="50000"/>
+                <a:lumOff val="50000"/>
+              </a:schemeClr>
+            </a:solidFill>
+          </a:ln>
+        </p:spPr>
+        <p:style>
+          <a:lnRef idx="2">
+            <a:schemeClr val="accent1">
+              <a:shade val="15000"/>
+            </a:schemeClr>
+          </a:lnRef>
+          <a:fillRef idx="1">
+            <a:schemeClr val="accent1"/>
+          </a:fillRef>
+          <a:effectRef idx="0">
+            <a:schemeClr val="accent1"/>
+          </a:effectRef>
+          <a:fontRef idx="minor">
+            <a:schemeClr val="lt1"/>
+          </a:fontRef>
+        </p:style>
+        <p:txBody>
+          <a:bodyPr rtlCol="0" anchor="ctr"/>
+          <a:lstStyle/>
+          <a:p>
+            <a:pPr algn="ctr"/>
+            <a:endParaRPr lang="en-GB"/>
+          </a:p>
+        </p:txBody>
+      </p:sp>
+      <p:sp>
+        <p:nvSpPr>
+          <p:cNvPr id="20" name="Rectangle 19">
+            <a:extLst>
+              <a:ext uri="{FF2B5EF4-FFF2-40B4-BE49-F238E27FC236}">
+                <a16:creationId xmlns:a16="http://schemas.microsoft.com/office/drawing/2014/main" id="{64E09BD7-E07C-579A-799B-2D010459DA6F}"/>
+              </a:ext>
+            </a:extLst>
+          </p:cNvPr>
+          <p:cNvSpPr/>
+          <p:nvPr/>
+        </p:nvSpPr>
+        <p:spPr>
+          <a:xfrm>
+            <a:off x="5969360" y="2829320"/>
+            <a:ext cx="1111169" cy="369332"/>
+          </a:xfrm>
+          <a:prstGeom prst="rect">
+            <a:avLst/>
+          </a:prstGeom>
+          <a:solidFill>
+            <a:schemeClr val="bg2">
+              <a:lumMod val="90000"/>
+            </a:schemeClr>
+          </a:solidFill>
+          <a:ln>
+            <a:solidFill>
+              <a:schemeClr val="tx1">
+                <a:lumMod val="50000"/>
+                <a:lumOff val="50000"/>
+              </a:schemeClr>
+            </a:solidFill>
+          </a:ln>
+        </p:spPr>
+        <p:style>
+          <a:lnRef idx="2">
+            <a:schemeClr val="accent1">
+              <a:shade val="15000"/>
+            </a:schemeClr>
+          </a:lnRef>
+          <a:fillRef idx="1">
+            <a:schemeClr val="accent1"/>
+          </a:fillRef>
+          <a:effectRef idx="0">
+            <a:schemeClr val="accent1"/>
+          </a:effectRef>
+          <a:fontRef idx="minor">
+            <a:schemeClr val="lt1"/>
+          </a:fontRef>
+        </p:style>
+        <p:txBody>
+          <a:bodyPr rtlCol="0" anchor="ctr"/>
+          <a:lstStyle/>
+          <a:p>
+            <a:pPr algn="ctr"/>
+            <a:endParaRPr lang="en-GB"/>
+          </a:p>
+        </p:txBody>
+      </p:sp>
+      <p:grpSp>
+        <p:nvGrpSpPr>
+          <p:cNvPr id="40" name="Group 39">
+            <a:extLst>
+              <a:ext uri="{FF2B5EF4-FFF2-40B4-BE49-F238E27FC236}">
+                <a16:creationId xmlns:a16="http://schemas.microsoft.com/office/drawing/2014/main" id="{442C593D-7751-D889-A492-23334B90B97F}"/>
+              </a:ext>
+            </a:extLst>
+          </p:cNvPr>
+          <p:cNvGrpSpPr/>
+          <p:nvPr/>
+        </p:nvGrpSpPr>
+        <p:grpSpPr>
+          <a:xfrm>
+            <a:off x="4479404" y="3244333"/>
+            <a:ext cx="6240682" cy="3334813"/>
+            <a:chOff x="4479404" y="3244333"/>
+            <a:chExt cx="6240682" cy="3334813"/>
+          </a:xfrm>
+        </p:grpSpPr>
+        <p:sp>
+          <p:nvSpPr>
+            <p:cNvPr id="17" name="Rectangle 16">
+              <a:extLst>
+                <a:ext uri="{FF2B5EF4-FFF2-40B4-BE49-F238E27FC236}">
+                  <a16:creationId xmlns:a16="http://schemas.microsoft.com/office/drawing/2014/main" id="{F45D2606-ECA2-9C50-2E73-766178F3AA6D}"/>
+                </a:ext>
+              </a:extLst>
+            </p:cNvPr>
+            <p:cNvSpPr/>
+            <p:nvPr/>
+          </p:nvSpPr>
+          <p:spPr>
+            <a:xfrm>
+              <a:off x="4479404" y="3244333"/>
+              <a:ext cx="6240682" cy="3334813"/>
+            </a:xfrm>
+            <a:prstGeom prst="rect">
+              <a:avLst/>
+            </a:prstGeom>
+            <a:noFill/>
+          </p:spPr>
+          <p:style>
+            <a:lnRef idx="2">
+              <a:schemeClr val="accent1">
+                <a:shade val="15000"/>
+              </a:schemeClr>
+            </a:lnRef>
+            <a:fillRef idx="1">
+              <a:schemeClr val="accent1"/>
+            </a:fillRef>
+            <a:effectRef idx="0">
+              <a:schemeClr val="accent1"/>
+            </a:effectRef>
+            <a:fontRef idx="minor">
+              <a:schemeClr val="lt1"/>
+            </a:fontRef>
+          </p:style>
+          <p:txBody>
+            <a:bodyPr rtlCol="0" anchor="ctr"/>
+            <a:lstStyle/>
+            <a:p>
+              <a:pPr algn="ctr"/>
+              <a:endParaRPr lang="en-GB"/>
+            </a:p>
+          </p:txBody>
+        </p:sp>
+        <p:sp>
+          <p:nvSpPr>
+            <p:cNvPr id="33" name="TextBox 32">
+              <a:extLst>
+                <a:ext uri="{FF2B5EF4-FFF2-40B4-BE49-F238E27FC236}">
+                  <a16:creationId xmlns:a16="http://schemas.microsoft.com/office/drawing/2014/main" id="{88512C9A-FECE-DF07-0E02-87DEBCCFE1B8}"/>
+                </a:ext>
+              </a:extLst>
+            </p:cNvPr>
+            <p:cNvSpPr txBox="1"/>
+            <p:nvPr/>
+          </p:nvSpPr>
+          <p:spPr>
+            <a:xfrm>
+              <a:off x="4532732" y="3306408"/>
+              <a:ext cx="1745606" cy="369332"/>
+            </a:xfrm>
+            <a:prstGeom prst="rect">
+              <a:avLst/>
+            </a:prstGeom>
+            <a:noFill/>
+          </p:spPr>
+          <p:txBody>
+            <a:bodyPr wrap="none" rtlCol="0">
+              <a:spAutoFit/>
+            </a:bodyPr>
+            <a:lstStyle/>
+            <a:p>
+              <a:r>
+                <a:rPr lang="en-GB" dirty="0"/>
+                <a:t>Fetch well rates</a:t>
+              </a:r>
+            </a:p>
+          </p:txBody>
+        </p:sp>
+        <p:cxnSp>
+          <p:nvCxnSpPr>
+            <p:cNvPr id="35" name="Straight Arrow Connector 34">
+              <a:extLst>
+                <a:ext uri="{FF2B5EF4-FFF2-40B4-BE49-F238E27FC236}">
+                  <a16:creationId xmlns:a16="http://schemas.microsoft.com/office/drawing/2014/main" id="{0437848C-F67A-22C8-06D2-AD354EC7928D}"/>
+                </a:ext>
+              </a:extLst>
+            </p:cNvPr>
+            <p:cNvCxnSpPr/>
+            <p:nvPr/>
+          </p:nvCxnSpPr>
+          <p:spPr>
+            <a:xfrm flipV="1">
+              <a:off x="4676172" y="3671134"/>
+              <a:ext cx="0" cy="2689943"/>
+            </a:xfrm>
+            <a:prstGeom prst="straightConnector1">
+              <a:avLst/>
+            </a:prstGeom>
+            <a:ln>
+              <a:tailEnd type="triangle"/>
+            </a:ln>
+          </p:spPr>
+          <p:style>
+            <a:lnRef idx="2">
+              <a:schemeClr val="accent1"/>
+            </a:lnRef>
+            <a:fillRef idx="0">
+              <a:schemeClr val="accent1"/>
+            </a:fillRef>
+            <a:effectRef idx="1">
+              <a:schemeClr val="accent1"/>
+            </a:effectRef>
+            <a:fontRef idx="minor">
+              <a:schemeClr val="tx1"/>
+            </a:fontRef>
+          </p:style>
+        </p:cxnSp>
+        <p:cxnSp>
+          <p:nvCxnSpPr>
+            <p:cNvPr id="36" name="Straight Arrow Connector 35">
+              <a:extLst>
+                <a:ext uri="{FF2B5EF4-FFF2-40B4-BE49-F238E27FC236}">
+                  <a16:creationId xmlns:a16="http://schemas.microsoft.com/office/drawing/2014/main" id="{E4ED54A5-A895-D7F5-7F33-FB697BDD3922}"/>
+                </a:ext>
+              </a:extLst>
+            </p:cNvPr>
+            <p:cNvCxnSpPr>
+              <a:cxnSpLocks/>
+            </p:cNvCxnSpPr>
+            <p:nvPr/>
+          </p:nvCxnSpPr>
+          <p:spPr>
+            <a:xfrm>
+              <a:off x="4584327" y="6164132"/>
+              <a:ext cx="5844463" cy="0"/>
+            </a:xfrm>
+            <a:prstGeom prst="straightConnector1">
+              <a:avLst/>
+            </a:prstGeom>
+            <a:ln>
+              <a:tailEnd type="triangle"/>
+            </a:ln>
+          </p:spPr>
+          <p:style>
+            <a:lnRef idx="2">
+              <a:schemeClr val="accent1"/>
+            </a:lnRef>
+            <a:fillRef idx="0">
+              <a:schemeClr val="accent1"/>
+            </a:fillRef>
+            <a:effectRef idx="1">
+              <a:schemeClr val="accent1"/>
+            </a:effectRef>
+            <a:fontRef idx="minor">
+              <a:schemeClr val="tx1"/>
+            </a:fontRef>
+          </p:style>
+        </p:cxnSp>
+        <p:sp>
+          <p:nvSpPr>
+            <p:cNvPr id="39" name="Freeform: Shape 38">
+              <a:extLst>
+                <a:ext uri="{FF2B5EF4-FFF2-40B4-BE49-F238E27FC236}">
+                  <a16:creationId xmlns:a16="http://schemas.microsoft.com/office/drawing/2014/main" id="{F88A89CB-5AC1-F078-90EF-41E60A442449}"/>
+                </a:ext>
+              </a:extLst>
+            </p:cNvPr>
+            <p:cNvSpPr/>
+            <p:nvPr/>
+          </p:nvSpPr>
+          <p:spPr>
+            <a:xfrm>
+              <a:off x="4884516" y="3553428"/>
+              <a:ext cx="5370654" cy="2671072"/>
+            </a:xfrm>
+            <a:custGeom>
+              <a:avLst/>
+              <a:gdLst>
+                <a:gd name="connsiteX0" fmla="*/ 0 w 5370654"/>
+                <a:gd name="connsiteY0" fmla="*/ 1481559 h 2671072"/>
+                <a:gd name="connsiteX1" fmla="*/ 104173 w 5370654"/>
+                <a:gd name="connsiteY1" fmla="*/ 1388962 h 2671072"/>
+                <a:gd name="connsiteX2" fmla="*/ 1041722 w 5370654"/>
+                <a:gd name="connsiteY2" fmla="*/ 1979271 h 2671072"/>
+                <a:gd name="connsiteX3" fmla="*/ 1400537 w 5370654"/>
+                <a:gd name="connsiteY3" fmla="*/ 1481559 h 2671072"/>
+                <a:gd name="connsiteX4" fmla="*/ 1585732 w 5370654"/>
+                <a:gd name="connsiteY4" fmla="*/ 1319514 h 2671072"/>
+                <a:gd name="connsiteX5" fmla="*/ 1782502 w 5370654"/>
+                <a:gd name="connsiteY5" fmla="*/ 1655180 h 2671072"/>
+                <a:gd name="connsiteX6" fmla="*/ 2071869 w 5370654"/>
+                <a:gd name="connsiteY6" fmla="*/ 1562582 h 2671072"/>
+                <a:gd name="connsiteX7" fmla="*/ 2731626 w 5370654"/>
+                <a:gd name="connsiteY7" fmla="*/ 1238491 h 2671072"/>
+                <a:gd name="connsiteX8" fmla="*/ 3761773 w 5370654"/>
+                <a:gd name="connsiteY8" fmla="*/ 1296364 h 2671072"/>
+                <a:gd name="connsiteX9" fmla="*/ 3865945 w 5370654"/>
+                <a:gd name="connsiteY9" fmla="*/ 1169043 h 2671072"/>
+                <a:gd name="connsiteX10" fmla="*/ 4676173 w 5370654"/>
+                <a:gd name="connsiteY10" fmla="*/ 914400 h 2671072"/>
+                <a:gd name="connsiteX11" fmla="*/ 4734046 w 5370654"/>
+                <a:gd name="connsiteY11" fmla="*/ 891250 h 2671072"/>
+                <a:gd name="connsiteX12" fmla="*/ 4687747 w 5370654"/>
+                <a:gd name="connsiteY12" fmla="*/ 1169043 h 2671072"/>
+                <a:gd name="connsiteX13" fmla="*/ 4872942 w 5370654"/>
+                <a:gd name="connsiteY13" fmla="*/ 960699 h 2671072"/>
+                <a:gd name="connsiteX14" fmla="*/ 4907666 w 5370654"/>
+                <a:gd name="connsiteY14" fmla="*/ 983848 h 2671072"/>
+                <a:gd name="connsiteX15" fmla="*/ 4861368 w 5370654"/>
+                <a:gd name="connsiteY15" fmla="*/ 1296364 h 2671072"/>
+                <a:gd name="connsiteX16" fmla="*/ 4826643 w 5370654"/>
+                <a:gd name="connsiteY16" fmla="*/ 1331088 h 2671072"/>
+                <a:gd name="connsiteX17" fmla="*/ 3622876 w 5370654"/>
+                <a:gd name="connsiteY17" fmla="*/ 1979271 h 2671072"/>
+                <a:gd name="connsiteX18" fmla="*/ 3437681 w 5370654"/>
+                <a:gd name="connsiteY18" fmla="*/ 2187615 h 2671072"/>
+                <a:gd name="connsiteX19" fmla="*/ 3518704 w 5370654"/>
+                <a:gd name="connsiteY19" fmla="*/ 1979271 h 2671072"/>
+                <a:gd name="connsiteX20" fmla="*/ 3194613 w 5370654"/>
+                <a:gd name="connsiteY20" fmla="*/ 1469985 h 2671072"/>
+                <a:gd name="connsiteX21" fmla="*/ 3159889 w 5370654"/>
+                <a:gd name="connsiteY21" fmla="*/ 1331088 h 2671072"/>
+                <a:gd name="connsiteX22" fmla="*/ 2650603 w 5370654"/>
+                <a:gd name="connsiteY22" fmla="*/ 1655180 h 2671072"/>
+                <a:gd name="connsiteX23" fmla="*/ 2511707 w 5370654"/>
+                <a:gd name="connsiteY23" fmla="*/ 1481559 h 2671072"/>
+                <a:gd name="connsiteX24" fmla="*/ 1747778 w 5370654"/>
+                <a:gd name="connsiteY24" fmla="*/ 1759352 h 2671072"/>
+                <a:gd name="connsiteX25" fmla="*/ 1851950 w 5370654"/>
+                <a:gd name="connsiteY25" fmla="*/ 1342663 h 2671072"/>
+                <a:gd name="connsiteX26" fmla="*/ 1632031 w 5370654"/>
+                <a:gd name="connsiteY26" fmla="*/ 1435261 h 2671072"/>
+                <a:gd name="connsiteX27" fmla="*/ 1284790 w 5370654"/>
+                <a:gd name="connsiteY27" fmla="*/ 1840375 h 2671072"/>
+                <a:gd name="connsiteX28" fmla="*/ 1273216 w 5370654"/>
+                <a:gd name="connsiteY28" fmla="*/ 1354238 h 2671072"/>
+                <a:gd name="connsiteX29" fmla="*/ 636608 w 5370654"/>
+                <a:gd name="connsiteY29" fmla="*/ 1516283 h 2671072"/>
+                <a:gd name="connsiteX30" fmla="*/ 590309 w 5370654"/>
+                <a:gd name="connsiteY30" fmla="*/ 1736202 h 2671072"/>
+                <a:gd name="connsiteX31" fmla="*/ 856527 w 5370654"/>
+                <a:gd name="connsiteY31" fmla="*/ 1423686 h 2671072"/>
+                <a:gd name="connsiteX32" fmla="*/ 775504 w 5370654"/>
+                <a:gd name="connsiteY32" fmla="*/ 1365813 h 2671072"/>
+                <a:gd name="connsiteX33" fmla="*/ 578735 w 5370654"/>
+                <a:gd name="connsiteY33" fmla="*/ 1817225 h 2671072"/>
+                <a:gd name="connsiteX34" fmla="*/ 868102 w 5370654"/>
+                <a:gd name="connsiteY34" fmla="*/ 1435261 h 2671072"/>
+                <a:gd name="connsiteX35" fmla="*/ 1145894 w 5370654"/>
+                <a:gd name="connsiteY35" fmla="*/ 1365813 h 2671072"/>
+                <a:gd name="connsiteX36" fmla="*/ 1377388 w 5370654"/>
+                <a:gd name="connsiteY36" fmla="*/ 1064871 h 2671072"/>
+                <a:gd name="connsiteX37" fmla="*/ 2025570 w 5370654"/>
+                <a:gd name="connsiteY37" fmla="*/ 925975 h 2671072"/>
+                <a:gd name="connsiteX38" fmla="*/ 1898249 w 5370654"/>
+                <a:gd name="connsiteY38" fmla="*/ 1689904 h 2671072"/>
+                <a:gd name="connsiteX39" fmla="*/ 2685327 w 5370654"/>
+                <a:gd name="connsiteY39" fmla="*/ 856526 h 2671072"/>
+                <a:gd name="connsiteX40" fmla="*/ 2870522 w 5370654"/>
+                <a:gd name="connsiteY40" fmla="*/ 1134319 h 2671072"/>
+                <a:gd name="connsiteX41" fmla="*/ 3252487 w 5370654"/>
+                <a:gd name="connsiteY41" fmla="*/ 601883 h 2671072"/>
+                <a:gd name="connsiteX42" fmla="*/ 3310360 w 5370654"/>
+                <a:gd name="connsiteY42" fmla="*/ 544010 h 2671072"/>
+                <a:gd name="connsiteX43" fmla="*/ 3368233 w 5370654"/>
+                <a:gd name="connsiteY43" fmla="*/ 1354238 h 2671072"/>
+                <a:gd name="connsiteX44" fmla="*/ 3773347 w 5370654"/>
+                <a:gd name="connsiteY44" fmla="*/ 879676 h 2671072"/>
+                <a:gd name="connsiteX45" fmla="*/ 4340507 w 5370654"/>
+                <a:gd name="connsiteY45" fmla="*/ 0 h 2671072"/>
+                <a:gd name="connsiteX46" fmla="*/ 4409955 w 5370654"/>
+                <a:gd name="connsiteY46" fmla="*/ 335666 h 2671072"/>
+                <a:gd name="connsiteX47" fmla="*/ 4525702 w 5370654"/>
+                <a:gd name="connsiteY47" fmla="*/ 300942 h 2671072"/>
+                <a:gd name="connsiteX48" fmla="*/ 4537276 w 5370654"/>
+                <a:gd name="connsiteY48" fmla="*/ 1064871 h 2671072"/>
+                <a:gd name="connsiteX49" fmla="*/ 4815069 w 5370654"/>
+                <a:gd name="connsiteY49" fmla="*/ 590309 h 2671072"/>
+                <a:gd name="connsiteX50" fmla="*/ 4884517 w 5370654"/>
+                <a:gd name="connsiteY50" fmla="*/ 486137 h 2671072"/>
+                <a:gd name="connsiteX51" fmla="*/ 4815069 w 5370654"/>
+                <a:gd name="connsiteY51" fmla="*/ 1319514 h 2671072"/>
+                <a:gd name="connsiteX52" fmla="*/ 5370654 w 5370654"/>
+                <a:gd name="connsiteY52" fmla="*/ 717630 h 2671072"/>
+                <a:gd name="connsiteX53" fmla="*/ 4583575 w 5370654"/>
+                <a:gd name="connsiteY53" fmla="*/ 2222339 h 2671072"/>
+                <a:gd name="connsiteX54" fmla="*/ 4247909 w 5370654"/>
+                <a:gd name="connsiteY54" fmla="*/ 2500131 h 2671072"/>
+                <a:gd name="connsiteX55" fmla="*/ 4155312 w 5370654"/>
+                <a:gd name="connsiteY55" fmla="*/ 2442258 h 2671072"/>
+                <a:gd name="connsiteX56" fmla="*/ 4027990 w 5370654"/>
+                <a:gd name="connsiteY56" fmla="*/ 1875099 h 2671072"/>
+                <a:gd name="connsiteX57" fmla="*/ 3379808 w 5370654"/>
+                <a:gd name="connsiteY57" fmla="*/ 2048719 h 2671072"/>
+                <a:gd name="connsiteX58" fmla="*/ 2824223 w 5370654"/>
+                <a:gd name="connsiteY58" fmla="*/ 2361235 h 2671072"/>
+                <a:gd name="connsiteX59" fmla="*/ 2905246 w 5370654"/>
+                <a:gd name="connsiteY59" fmla="*/ 2071868 h 2671072"/>
+                <a:gd name="connsiteX60" fmla="*/ 1782502 w 5370654"/>
+                <a:gd name="connsiteY60" fmla="*/ 2419109 h 2671072"/>
+                <a:gd name="connsiteX61" fmla="*/ 1886674 w 5370654"/>
+                <a:gd name="connsiteY61" fmla="*/ 2280213 h 2671072"/>
+                <a:gd name="connsiteX62" fmla="*/ 1909823 w 5370654"/>
+                <a:gd name="connsiteY62" fmla="*/ 2199190 h 2671072"/>
+                <a:gd name="connsiteX63" fmla="*/ 1412112 w 5370654"/>
+                <a:gd name="connsiteY63" fmla="*/ 2268638 h 2671072"/>
+                <a:gd name="connsiteX64" fmla="*/ 520861 w 5370654"/>
+                <a:gd name="connsiteY64" fmla="*/ 2199190 h 2671072"/>
+                <a:gd name="connsiteX65" fmla="*/ 497712 w 5370654"/>
+                <a:gd name="connsiteY65" fmla="*/ 2176040 h 2671072"/>
+                <a:gd name="connsiteX66" fmla="*/ 555585 w 5370654"/>
+                <a:gd name="connsiteY66" fmla="*/ 2164466 h 2671072"/>
+              </a:gdLst>
+              <a:ahLst/>
+              <a:cxnLst>
+                <a:cxn ang="0">
+                  <a:pos x="connsiteX0" y="connsiteY0"/>
+                </a:cxn>
+                <a:cxn ang="0">
+                  <a:pos x="connsiteX1" y="connsiteY1"/>
+                </a:cxn>
+                <a:cxn ang="0">
+                  <a:pos x="connsiteX2" y="connsiteY2"/>
+                </a:cxn>
+                <a:cxn ang="0">
+                  <a:pos x="connsiteX3" y="connsiteY3"/>
+                </a:cxn>
+                <a:cxn ang="0">
+                  <a:pos x="connsiteX4" y="connsiteY4"/>
+                </a:cxn>
+                <a:cxn ang="0">
+                  <a:pos x="connsiteX5" y="connsiteY5"/>
+                </a:cxn>
+                <a:cxn ang="0">
+                  <a:pos x="connsiteX6" y="connsiteY6"/>
+                </a:cxn>
+                <a:cxn ang="0">
+                  <a:pos x="connsiteX7" y="connsiteY7"/>
+                </a:cxn>
+                <a:cxn ang="0">
+                  <a:pos x="connsiteX8" y="connsiteY8"/>
+                </a:cxn>
+                <a:cxn ang="0">
+                  <a:pos x="connsiteX9" y="connsiteY9"/>
+                </a:cxn>
+                <a:cxn ang="0">
+                  <a:pos x="connsiteX10" y="connsiteY10"/>
+                </a:cxn>
+                <a:cxn ang="0">
+                  <a:pos x="connsiteX11" y="connsiteY11"/>
+                </a:cxn>
+                <a:cxn ang="0">
+                  <a:pos x="connsiteX12" y="connsiteY12"/>
+                </a:cxn>
+                <a:cxn ang="0">
+                  <a:pos x="connsiteX13" y="connsiteY13"/>
+                </a:cxn>
+                <a:cxn ang="0">
+                  <a:pos x="connsiteX14" y="connsiteY14"/>
+                </a:cxn>
+                <a:cxn ang="0">
+                  <a:pos x="connsiteX15" y="connsiteY15"/>
+                </a:cxn>
+                <a:cxn ang="0">
+                  <a:pos x="connsiteX16" y="connsiteY16"/>
+                </a:cxn>
+                <a:cxn ang="0">
+                  <a:pos x="connsiteX17" y="connsiteY17"/>
+                </a:cxn>
+                <a:cxn ang="0">
+                  <a:pos x="connsiteX18" y="connsiteY18"/>
+                </a:cxn>
+                <a:cxn ang="0">
+                  <a:pos x="connsiteX19" y="connsiteY19"/>
+                </a:cxn>
+                <a:cxn ang="0">
+                  <a:pos x="connsiteX20" y="connsiteY20"/>
+                </a:cxn>
+                <a:cxn ang="0">
+                  <a:pos x="connsiteX21" y="connsiteY21"/>
+                </a:cxn>
+                <a:cxn ang="0">
+                  <a:pos x="connsiteX22" y="connsiteY22"/>
+                </a:cxn>
+                <a:cxn ang="0">
+                  <a:pos x="connsiteX23" y="connsiteY23"/>
+                </a:cxn>
+                <a:cxn ang="0">
+                  <a:pos x="connsiteX24" y="connsiteY24"/>
+                </a:cxn>
+                <a:cxn ang="0">
+                  <a:pos x="connsiteX25" y="connsiteY25"/>
+                </a:cxn>
+                <a:cxn ang="0">
+                  <a:pos x="connsiteX26" y="connsiteY26"/>
+                </a:cxn>
+                <a:cxn ang="0">
+                  <a:pos x="connsiteX27" y="connsiteY27"/>
+                </a:cxn>
+                <a:cxn ang="0">
+                  <a:pos x="connsiteX28" y="connsiteY28"/>
+                </a:cxn>
+                <a:cxn ang="0">
+                  <a:pos x="connsiteX29" y="connsiteY29"/>
+                </a:cxn>
+                <a:cxn ang="0">
+                  <a:pos x="connsiteX30" y="connsiteY30"/>
+                </a:cxn>
+                <a:cxn ang="0">
+                  <a:pos x="connsiteX31" y="connsiteY31"/>
+                </a:cxn>
+                <a:cxn ang="0">
+                  <a:pos x="connsiteX32" y="connsiteY32"/>
+                </a:cxn>
+                <a:cxn ang="0">
+                  <a:pos x="connsiteX33" y="connsiteY33"/>
+                </a:cxn>
+                <a:cxn ang="0">
+                  <a:pos x="connsiteX34" y="connsiteY34"/>
+                </a:cxn>
+                <a:cxn ang="0">
+                  <a:pos x="connsiteX35" y="connsiteY35"/>
+                </a:cxn>
+                <a:cxn ang="0">
+                  <a:pos x="connsiteX36" y="connsiteY36"/>
+                </a:cxn>
+                <a:cxn ang="0">
+                  <a:pos x="connsiteX37" y="connsiteY37"/>
+                </a:cxn>
+                <a:cxn ang="0">
+                  <a:pos x="connsiteX38" y="connsiteY38"/>
+                </a:cxn>
+                <a:cxn ang="0">
+                  <a:pos x="connsiteX39" y="connsiteY39"/>
+                </a:cxn>
+                <a:cxn ang="0">
+                  <a:pos x="connsiteX40" y="connsiteY40"/>
+                </a:cxn>
+                <a:cxn ang="0">
+                  <a:pos x="connsiteX41" y="connsiteY41"/>
+                </a:cxn>
+                <a:cxn ang="0">
+                  <a:pos x="connsiteX42" y="connsiteY42"/>
+                </a:cxn>
+                <a:cxn ang="0">
+                  <a:pos x="connsiteX43" y="connsiteY43"/>
+                </a:cxn>
+                <a:cxn ang="0">
+                  <a:pos x="connsiteX44" y="connsiteY44"/>
+                </a:cxn>
+                <a:cxn ang="0">
+                  <a:pos x="connsiteX45" y="connsiteY45"/>
+                </a:cxn>
+                <a:cxn ang="0">
+                  <a:pos x="connsiteX46" y="connsiteY46"/>
+                </a:cxn>
+                <a:cxn ang="0">
+                  <a:pos x="connsiteX47" y="connsiteY47"/>
+                </a:cxn>
+                <a:cxn ang="0">
+                  <a:pos x="connsiteX48" y="connsiteY48"/>
+                </a:cxn>
+                <a:cxn ang="0">
+                  <a:pos x="connsiteX49" y="connsiteY49"/>
+                </a:cxn>
+                <a:cxn ang="0">
+                  <a:pos x="connsiteX50" y="connsiteY50"/>
+                </a:cxn>
+                <a:cxn ang="0">
+                  <a:pos x="connsiteX51" y="connsiteY51"/>
+                </a:cxn>
+                <a:cxn ang="0">
+                  <a:pos x="connsiteX52" y="connsiteY52"/>
+                </a:cxn>
+                <a:cxn ang="0">
+                  <a:pos x="connsiteX53" y="connsiteY53"/>
+                </a:cxn>
+                <a:cxn ang="0">
+                  <a:pos x="connsiteX54" y="connsiteY54"/>
+                </a:cxn>
+                <a:cxn ang="0">
+                  <a:pos x="connsiteX55" y="connsiteY55"/>
+                </a:cxn>
+                <a:cxn ang="0">
+                  <a:pos x="connsiteX56" y="connsiteY56"/>
+                </a:cxn>
+                <a:cxn ang="0">
+                  <a:pos x="connsiteX57" y="connsiteY57"/>
+                </a:cxn>
+                <a:cxn ang="0">
+                  <a:pos x="connsiteX58" y="connsiteY58"/>
+                </a:cxn>
+                <a:cxn ang="0">
+                  <a:pos x="connsiteX59" y="connsiteY59"/>
+                </a:cxn>
+                <a:cxn ang="0">
+                  <a:pos x="connsiteX60" y="connsiteY60"/>
+                </a:cxn>
+                <a:cxn ang="0">
+                  <a:pos x="connsiteX61" y="connsiteY61"/>
+                </a:cxn>
+                <a:cxn ang="0">
+                  <a:pos x="connsiteX62" y="connsiteY62"/>
+                </a:cxn>
+                <a:cxn ang="0">
+                  <a:pos x="connsiteX63" y="connsiteY63"/>
+                </a:cxn>
+                <a:cxn ang="0">
+                  <a:pos x="connsiteX64" y="connsiteY64"/>
+                </a:cxn>
+                <a:cxn ang="0">
+                  <a:pos x="connsiteX65" y="connsiteY65"/>
+                </a:cxn>
+                <a:cxn ang="0">
+                  <a:pos x="connsiteX66" y="connsiteY66"/>
+                </a:cxn>
+              </a:cxnLst>
+              <a:rect l="l" t="t" r="r" b="b"/>
+              <a:pathLst>
+                <a:path w="5370654" h="2671072">
+                  <a:moveTo>
+                    <a:pt x="0" y="1481559"/>
+                  </a:moveTo>
+                  <a:cubicBezTo>
+                    <a:pt x="34724" y="1450693"/>
+                    <a:pt x="60599" y="1372845"/>
+                    <a:pt x="104173" y="1388962"/>
+                  </a:cubicBezTo>
+                  <a:cubicBezTo>
+                    <a:pt x="669974" y="1598231"/>
+                    <a:pt x="721299" y="1677697"/>
+                    <a:pt x="1041722" y="1979271"/>
+                  </a:cubicBezTo>
+                  <a:cubicBezTo>
+                    <a:pt x="1161327" y="1813367"/>
+                    <a:pt x="1270424" y="1639356"/>
+                    <a:pt x="1400537" y="1481559"/>
+                  </a:cubicBezTo>
+                  <a:cubicBezTo>
+                    <a:pt x="1452721" y="1418272"/>
+                    <a:pt x="1511057" y="1285571"/>
+                    <a:pt x="1585732" y="1319514"/>
+                  </a:cubicBezTo>
+                  <a:cubicBezTo>
+                    <a:pt x="1703803" y="1373183"/>
+                    <a:pt x="1716912" y="1543291"/>
+                    <a:pt x="1782502" y="1655180"/>
+                  </a:cubicBezTo>
+                  <a:cubicBezTo>
+                    <a:pt x="1878958" y="1624314"/>
+                    <a:pt x="1979375" y="1603829"/>
+                    <a:pt x="2071869" y="1562582"/>
+                  </a:cubicBezTo>
+                  <a:cubicBezTo>
+                    <a:pt x="3208651" y="1055638"/>
+                    <a:pt x="2356390" y="1379203"/>
+                    <a:pt x="2731626" y="1238491"/>
+                  </a:cubicBezTo>
+                  <a:cubicBezTo>
+                    <a:pt x="3307065" y="1603404"/>
+                    <a:pt x="3109944" y="1662303"/>
+                    <a:pt x="3761773" y="1296364"/>
+                  </a:cubicBezTo>
+                  <a:cubicBezTo>
+                    <a:pt x="3809589" y="1269520"/>
+                    <a:pt x="3831221" y="1211483"/>
+                    <a:pt x="3865945" y="1169043"/>
+                  </a:cubicBezTo>
+                  <a:cubicBezTo>
+                    <a:pt x="4099006" y="1825853"/>
+                    <a:pt x="3890626" y="1589480"/>
+                    <a:pt x="4676173" y="914400"/>
+                  </a:cubicBezTo>
+                  <a:cubicBezTo>
+                    <a:pt x="4691931" y="900858"/>
+                    <a:pt x="4714755" y="898967"/>
+                    <a:pt x="4734046" y="891250"/>
+                  </a:cubicBezTo>
+                  <a:cubicBezTo>
+                    <a:pt x="4718613" y="983848"/>
+                    <a:pt x="4603783" y="1127060"/>
+                    <a:pt x="4687747" y="1169043"/>
+                  </a:cubicBezTo>
+                  <a:cubicBezTo>
+                    <a:pt x="4770855" y="1210598"/>
+                    <a:pt x="4872942" y="960699"/>
+                    <a:pt x="4872942" y="960699"/>
+                  </a:cubicBezTo>
+                  <a:cubicBezTo>
+                    <a:pt x="4884517" y="968415"/>
+                    <a:pt x="4908145" y="969945"/>
+                    <a:pt x="4907666" y="983848"/>
+                  </a:cubicBezTo>
+                  <a:cubicBezTo>
+                    <a:pt x="4904037" y="1089094"/>
+                    <a:pt x="4885297" y="1193810"/>
+                    <a:pt x="4861368" y="1296364"/>
+                  </a:cubicBezTo>
+                  <a:cubicBezTo>
+                    <a:pt x="4857648" y="1312305"/>
+                    <a:pt x="4840978" y="1323184"/>
+                    <a:pt x="4826643" y="1331088"/>
+                  </a:cubicBezTo>
+                  <a:cubicBezTo>
+                    <a:pt x="4427563" y="1551142"/>
+                    <a:pt x="4024132" y="1763210"/>
+                    <a:pt x="3622876" y="1979271"/>
+                  </a:cubicBezTo>
+                  <a:cubicBezTo>
+                    <a:pt x="3561144" y="2048719"/>
+                    <a:pt x="3530599" y="2187615"/>
+                    <a:pt x="3437681" y="2187615"/>
+                  </a:cubicBezTo>
+                  <a:cubicBezTo>
+                    <a:pt x="3363166" y="2187615"/>
+                    <a:pt x="3526243" y="2053403"/>
+                    <a:pt x="3518704" y="1979271"/>
+                  </a:cubicBezTo>
+                  <a:cubicBezTo>
+                    <a:pt x="3467096" y="1471790"/>
+                    <a:pt x="3489454" y="1528953"/>
+                    <a:pt x="3194613" y="1469985"/>
+                  </a:cubicBezTo>
+                  <a:cubicBezTo>
+                    <a:pt x="3183038" y="1423686"/>
+                    <a:pt x="3207592" y="1329685"/>
+                    <a:pt x="3159889" y="1331088"/>
+                  </a:cubicBezTo>
+                  <a:cubicBezTo>
+                    <a:pt x="2879375" y="1339338"/>
+                    <a:pt x="2798077" y="1485017"/>
+                    <a:pt x="2650603" y="1655180"/>
+                  </a:cubicBezTo>
+                  <a:cubicBezTo>
+                    <a:pt x="2604304" y="1597306"/>
+                    <a:pt x="2585740" y="1485029"/>
+                    <a:pt x="2511707" y="1481559"/>
+                  </a:cubicBezTo>
+                  <a:cubicBezTo>
+                    <a:pt x="2046645" y="1459759"/>
+                    <a:pt x="1994929" y="1547508"/>
+                    <a:pt x="1747778" y="1759352"/>
+                  </a:cubicBezTo>
+                  <a:cubicBezTo>
+                    <a:pt x="1782502" y="1620456"/>
+                    <a:pt x="1900104" y="1477493"/>
+                    <a:pt x="1851950" y="1342663"/>
+                  </a:cubicBezTo>
+                  <a:cubicBezTo>
+                    <a:pt x="1825198" y="1267757"/>
+                    <a:pt x="1691815" y="1382798"/>
+                    <a:pt x="1632031" y="1435261"/>
+                  </a:cubicBezTo>
+                  <a:cubicBezTo>
+                    <a:pt x="1498350" y="1552573"/>
+                    <a:pt x="1400537" y="1705337"/>
+                    <a:pt x="1284790" y="1840375"/>
+                  </a:cubicBezTo>
+                  <a:cubicBezTo>
+                    <a:pt x="1280932" y="1678329"/>
+                    <a:pt x="1418195" y="1426728"/>
+                    <a:pt x="1273216" y="1354238"/>
+                  </a:cubicBezTo>
+                  <a:cubicBezTo>
+                    <a:pt x="1077364" y="1256312"/>
+                    <a:pt x="827715" y="1409393"/>
+                    <a:pt x="636608" y="1516283"/>
+                  </a:cubicBezTo>
+                  <a:cubicBezTo>
+                    <a:pt x="571227" y="1552852"/>
+                    <a:pt x="521266" y="1765272"/>
+                    <a:pt x="590309" y="1736202"/>
+                  </a:cubicBezTo>
+                  <a:cubicBezTo>
+                    <a:pt x="716430" y="1683099"/>
+                    <a:pt x="767788" y="1527858"/>
+                    <a:pt x="856527" y="1423686"/>
+                  </a:cubicBezTo>
+                  <a:cubicBezTo>
+                    <a:pt x="829519" y="1404395"/>
+                    <a:pt x="794644" y="1338698"/>
+                    <a:pt x="775504" y="1365813"/>
+                  </a:cubicBezTo>
+                  <a:cubicBezTo>
+                    <a:pt x="680845" y="1499914"/>
+                    <a:pt x="447419" y="1718739"/>
+                    <a:pt x="578735" y="1817225"/>
+                  </a:cubicBezTo>
+                  <a:cubicBezTo>
+                    <a:pt x="706521" y="1913064"/>
+                    <a:pt x="771646" y="1562582"/>
+                    <a:pt x="868102" y="1435261"/>
+                  </a:cubicBezTo>
+                  <a:cubicBezTo>
+                    <a:pt x="955194" y="912706"/>
+                    <a:pt x="792620" y="1486443"/>
+                    <a:pt x="1145894" y="1365813"/>
+                  </a:cubicBezTo>
+                  <a:cubicBezTo>
+                    <a:pt x="1265664" y="1324916"/>
+                    <a:pt x="1264190" y="1121470"/>
+                    <a:pt x="1377388" y="1064871"/>
+                  </a:cubicBezTo>
+                  <a:cubicBezTo>
+                    <a:pt x="1575026" y="966052"/>
+                    <a:pt x="1809509" y="972274"/>
+                    <a:pt x="2025570" y="925975"/>
+                  </a:cubicBezTo>
+                  <a:cubicBezTo>
+                    <a:pt x="1983130" y="1180618"/>
+                    <a:pt x="1707723" y="1515709"/>
+                    <a:pt x="1898249" y="1689904"/>
+                  </a:cubicBezTo>
+                  <a:cubicBezTo>
+                    <a:pt x="2148382" y="1918597"/>
+                    <a:pt x="2641386" y="932425"/>
+                    <a:pt x="2685327" y="856526"/>
+                  </a:cubicBezTo>
+                  <a:cubicBezTo>
+                    <a:pt x="2747059" y="949124"/>
+                    <a:pt x="2759914" y="1122029"/>
+                    <a:pt x="2870522" y="1134319"/>
+                  </a:cubicBezTo>
+                  <a:cubicBezTo>
+                    <a:pt x="3022336" y="1151187"/>
+                    <a:pt x="3216608" y="663675"/>
+                    <a:pt x="3252487" y="601883"/>
+                  </a:cubicBezTo>
+                  <a:cubicBezTo>
+                    <a:pt x="3266186" y="578290"/>
+                    <a:pt x="3291069" y="563301"/>
+                    <a:pt x="3310360" y="544010"/>
+                  </a:cubicBezTo>
+                  <a:cubicBezTo>
+                    <a:pt x="3329651" y="814086"/>
+                    <a:pt x="3149020" y="1195308"/>
+                    <a:pt x="3368233" y="1354238"/>
+                  </a:cubicBezTo>
+                  <a:cubicBezTo>
+                    <a:pt x="3536621" y="1476320"/>
+                    <a:pt x="3654272" y="1050203"/>
+                    <a:pt x="3773347" y="879676"/>
+                  </a:cubicBezTo>
+                  <a:cubicBezTo>
+                    <a:pt x="4409423" y="-31247"/>
+                    <a:pt x="3980250" y="120089"/>
+                    <a:pt x="4340507" y="0"/>
+                  </a:cubicBezTo>
+                  <a:cubicBezTo>
+                    <a:pt x="4363656" y="111889"/>
+                    <a:pt x="4350073" y="238357"/>
+                    <a:pt x="4409955" y="335666"/>
+                  </a:cubicBezTo>
+                  <a:cubicBezTo>
+                    <a:pt x="4431066" y="369972"/>
+                    <a:pt x="4518774" y="261261"/>
+                    <a:pt x="4525702" y="300942"/>
+                  </a:cubicBezTo>
+                  <a:cubicBezTo>
+                    <a:pt x="4569506" y="551819"/>
+                    <a:pt x="4533418" y="810228"/>
+                    <a:pt x="4537276" y="1064871"/>
+                  </a:cubicBezTo>
+                  <a:cubicBezTo>
+                    <a:pt x="4629874" y="906684"/>
+                    <a:pt x="4720764" y="747484"/>
+                    <a:pt x="4815069" y="590309"/>
+                  </a:cubicBezTo>
+                  <a:cubicBezTo>
+                    <a:pt x="4836541" y="554523"/>
+                    <a:pt x="4884517" y="444404"/>
+                    <a:pt x="4884517" y="486137"/>
+                  </a:cubicBezTo>
+                  <a:cubicBezTo>
+                    <a:pt x="4884517" y="764892"/>
+                    <a:pt x="4563392" y="1199668"/>
+                    <a:pt x="4815069" y="1319514"/>
+                  </a:cubicBezTo>
+                  <a:cubicBezTo>
+                    <a:pt x="5061583" y="1436901"/>
+                    <a:pt x="5370654" y="717630"/>
+                    <a:pt x="5370654" y="717630"/>
+                  </a:cubicBezTo>
+                  <a:cubicBezTo>
+                    <a:pt x="4649119" y="2637645"/>
+                    <a:pt x="4892378" y="3148751"/>
+                    <a:pt x="4583575" y="2222339"/>
+                  </a:cubicBezTo>
+                  <a:cubicBezTo>
+                    <a:pt x="4471686" y="2314936"/>
+                    <a:pt x="4377106" y="2433787"/>
+                    <a:pt x="4247909" y="2500131"/>
+                  </a:cubicBezTo>
+                  <a:cubicBezTo>
+                    <a:pt x="4215530" y="2516758"/>
+                    <a:pt x="4167393" y="2476593"/>
+                    <a:pt x="4155312" y="2442258"/>
+                  </a:cubicBezTo>
+                  <a:cubicBezTo>
+                    <a:pt x="4091002" y="2259484"/>
+                    <a:pt x="4070431" y="2064152"/>
+                    <a:pt x="4027990" y="1875099"/>
+                  </a:cubicBezTo>
+                  <a:cubicBezTo>
+                    <a:pt x="3811929" y="1932972"/>
+                    <a:pt x="3587211" y="1964960"/>
+                    <a:pt x="3379808" y="2048719"/>
+                  </a:cubicBezTo>
+                  <a:cubicBezTo>
+                    <a:pt x="3182785" y="2128286"/>
+                    <a:pt x="3036454" y="2350882"/>
+                    <a:pt x="2824223" y="2361235"/>
+                  </a:cubicBezTo>
+                  <a:cubicBezTo>
+                    <a:pt x="2724177" y="2366115"/>
+                    <a:pt x="3005257" y="2066312"/>
+                    <a:pt x="2905246" y="2071868"/>
+                  </a:cubicBezTo>
+                  <a:cubicBezTo>
+                    <a:pt x="2514111" y="2093598"/>
+                    <a:pt x="1782502" y="2419109"/>
+                    <a:pt x="1782502" y="2419109"/>
+                  </a:cubicBezTo>
+                  <a:cubicBezTo>
+                    <a:pt x="1817226" y="2372810"/>
+                    <a:pt x="1857677" y="2330298"/>
+                    <a:pt x="1886674" y="2280213"/>
+                  </a:cubicBezTo>
+                  <a:cubicBezTo>
+                    <a:pt x="1900747" y="2255905"/>
+                    <a:pt x="1937903" y="2199875"/>
+                    <a:pt x="1909823" y="2199190"/>
+                  </a:cubicBezTo>
+                  <a:cubicBezTo>
+                    <a:pt x="1742362" y="2195105"/>
+                    <a:pt x="1578016" y="2245489"/>
+                    <a:pt x="1412112" y="2268638"/>
+                  </a:cubicBezTo>
+                  <a:cubicBezTo>
+                    <a:pt x="1155442" y="2011968"/>
+                    <a:pt x="1405425" y="2235051"/>
+                    <a:pt x="520861" y="2199190"/>
+                  </a:cubicBezTo>
+                  <a:cubicBezTo>
+                    <a:pt x="509957" y="2198748"/>
+                    <a:pt x="489995" y="2183757"/>
+                    <a:pt x="497712" y="2176040"/>
+                  </a:cubicBezTo>
+                  <a:cubicBezTo>
+                    <a:pt x="511623" y="2162129"/>
+                    <a:pt x="536294" y="2168324"/>
+                    <a:pt x="555585" y="2164466"/>
+                  </a:cubicBezTo>
+                </a:path>
+              </a:pathLst>
+            </a:custGeom>
+            <a:noFill/>
+          </p:spPr>
+          <p:style>
+            <a:lnRef idx="2">
+              <a:schemeClr val="accent1">
+                <a:shade val="15000"/>
+              </a:schemeClr>
+            </a:lnRef>
+            <a:fillRef idx="1">
+              <a:schemeClr val="accent1"/>
+            </a:fillRef>
+            <a:effectRef idx="0">
+              <a:schemeClr val="accent1"/>
+            </a:effectRef>
+            <a:fontRef idx="minor">
+              <a:schemeClr val="lt1"/>
+            </a:fontRef>
+          </p:style>
+          <p:txBody>
+            <a:bodyPr rtlCol="0" anchor="ctr"/>
+            <a:lstStyle/>
+            <a:p>
+              <a:pPr algn="ctr"/>
+              <a:endParaRPr lang="en-GB"/>
+            </a:p>
+          </p:txBody>
+        </p:sp>
+      </p:grpSp>
+    </p:spTree>
+    <p:extLst>
+      <p:ext uri="{BB962C8B-B14F-4D97-AF65-F5344CB8AC3E}">
+        <p14:creationId xmlns:p14="http://schemas.microsoft.com/office/powerpoint/2010/main" val="2730671664"/>
+      </p:ext>
+    </p:extLst>
+  </p:cSld>
+  <p:clrMapOvr>
+    <a:masterClrMapping/>
+  </p:clrMapOvr>
+</p:sld>
+</file>
+
+<file path=ppt/slides/slide5.xml><?xml version="1.0" encoding="utf-8"?>
+<p:sld xmlns:a="http://schemas.openxmlformats.org/drawingml/2006/main" xmlns:r="http://schemas.openxmlformats.org/officeDocument/2006/relationships" xmlns:p="http://schemas.openxmlformats.org/presentationml/2006/main">
+  <p:cSld>
+    <p:spTree>
+      <p:nvGrpSpPr>
+        <p:cNvPr id="1" name=""/>
+        <p:cNvGrpSpPr/>
+        <p:nvPr/>
+      </p:nvGrpSpPr>
+      <p:grpSpPr>
+        <a:xfrm>
+          <a:off x="0" y="0"/>
+          <a:ext cx="0" cy="0"/>
+          <a:chOff x="0" y="0"/>
+          <a:chExt cx="0" cy="0"/>
+        </a:xfrm>
+      </p:grpSpPr>
+      <p:sp>
+        <p:nvSpPr>
+          <p:cNvPr id="4" name="Rectangle 3">
+            <a:extLst>
+              <a:ext uri="{FF2B5EF4-FFF2-40B4-BE49-F238E27FC236}">
+                <a16:creationId xmlns:a16="http://schemas.microsoft.com/office/drawing/2014/main" id="{142A527C-196C-EBD1-D4DB-718CB68D4261}"/>
+              </a:ext>
+            </a:extLst>
+          </p:cNvPr>
+          <p:cNvSpPr/>
+          <p:nvPr/>
+        </p:nvSpPr>
+        <p:spPr>
+          <a:xfrm>
+            <a:off x="636608" y="972273"/>
+            <a:ext cx="1689903" cy="335666"/>
+          </a:xfrm>
+          <a:prstGeom prst="rect">
+            <a:avLst/>
+          </a:prstGeom>
+        </p:spPr>
+        <p:style>
+          <a:lnRef idx="2">
+            <a:schemeClr val="accent1">
+              <a:shade val="15000"/>
+            </a:schemeClr>
+          </a:lnRef>
+          <a:fillRef idx="1">
+            <a:schemeClr val="accent1"/>
+          </a:fillRef>
+          <a:effectRef idx="0">
+            <a:schemeClr val="accent1"/>
+          </a:effectRef>
+          <a:fontRef idx="minor">
+            <a:schemeClr val="lt1"/>
+          </a:fontRef>
+        </p:style>
+        <p:txBody>
+          <a:bodyPr rtlCol="0" anchor="ctr"/>
+          <a:lstStyle/>
+          <a:p>
+            <a:pPr algn="ctr"/>
+            <a:endParaRPr lang="en-GB"/>
+          </a:p>
+        </p:txBody>
+      </p:sp>
+      <p:sp>
+        <p:nvSpPr>
+          <p:cNvPr id="5" name="Rectangle 4">
+            <a:extLst>
+              <a:ext uri="{FF2B5EF4-FFF2-40B4-BE49-F238E27FC236}">
+                <a16:creationId xmlns:a16="http://schemas.microsoft.com/office/drawing/2014/main" id="{D2557179-3C11-8BAE-E4BC-1D3EC87A20E7}"/>
+              </a:ext>
+            </a:extLst>
+          </p:cNvPr>
+          <p:cNvSpPr/>
+          <p:nvPr/>
+        </p:nvSpPr>
+        <p:spPr>
+          <a:xfrm>
+            <a:off x="2478911" y="972273"/>
+            <a:ext cx="1689903" cy="335666"/>
+          </a:xfrm>
+          <a:prstGeom prst="rect">
+            <a:avLst/>
+          </a:prstGeom>
+        </p:spPr>
+        <p:style>
+          <a:lnRef idx="2">
+            <a:schemeClr val="accent1">
+              <a:shade val="15000"/>
+            </a:schemeClr>
+          </a:lnRef>
+          <a:fillRef idx="1">
+            <a:schemeClr val="accent1"/>
+          </a:fillRef>
+          <a:effectRef idx="0">
+            <a:schemeClr val="accent1"/>
+          </a:effectRef>
+          <a:fontRef idx="minor">
+            <a:schemeClr val="lt1"/>
+          </a:fontRef>
+        </p:style>
+        <p:txBody>
+          <a:bodyPr rtlCol="0" anchor="ctr"/>
+          <a:lstStyle/>
+          <a:p>
+            <a:pPr algn="ctr"/>
+            <a:endParaRPr lang="en-GB"/>
+          </a:p>
+        </p:txBody>
+      </p:sp>
+      <p:sp>
+        <p:nvSpPr>
+          <p:cNvPr id="6" name="Rectangle 5">
+            <a:extLst>
+              <a:ext uri="{FF2B5EF4-FFF2-40B4-BE49-F238E27FC236}">
+                <a16:creationId xmlns:a16="http://schemas.microsoft.com/office/drawing/2014/main" id="{0C5251D3-9B97-1E42-A419-22B9D2796386}"/>
+              </a:ext>
+            </a:extLst>
+          </p:cNvPr>
+          <p:cNvSpPr/>
+          <p:nvPr/>
+        </p:nvSpPr>
+        <p:spPr>
+          <a:xfrm>
+            <a:off x="4321214" y="972273"/>
+            <a:ext cx="1689903" cy="335666"/>
+          </a:xfrm>
+          <a:prstGeom prst="rect">
+            <a:avLst/>
+          </a:prstGeom>
+        </p:spPr>
+        <p:style>
+          <a:lnRef idx="2">
+            <a:schemeClr val="accent1">
+              <a:shade val="15000"/>
+            </a:schemeClr>
+          </a:lnRef>
+          <a:fillRef idx="1">
+            <a:schemeClr val="accent1"/>
+          </a:fillRef>
+          <a:effectRef idx="0">
+            <a:schemeClr val="accent1"/>
+          </a:effectRef>
+          <a:fontRef idx="minor">
+            <a:schemeClr val="lt1"/>
+          </a:fontRef>
+        </p:style>
+        <p:txBody>
+          <a:bodyPr rtlCol="0" anchor="ctr"/>
+          <a:lstStyle/>
+          <a:p>
+            <a:pPr algn="ctr"/>
+            <a:endParaRPr lang="en-GB"/>
+          </a:p>
+        </p:txBody>
+      </p:sp>
+      <p:sp>
+        <p:nvSpPr>
+          <p:cNvPr id="7" name="Rectangle 6">
+            <a:extLst>
+              <a:ext uri="{FF2B5EF4-FFF2-40B4-BE49-F238E27FC236}">
+                <a16:creationId xmlns:a16="http://schemas.microsoft.com/office/drawing/2014/main" id="{76D21DBE-FD9D-096D-BB5C-53D22323FB17}"/>
+              </a:ext>
+            </a:extLst>
+          </p:cNvPr>
+          <p:cNvSpPr/>
+          <p:nvPr/>
+        </p:nvSpPr>
+        <p:spPr>
+          <a:xfrm>
+            <a:off x="6163517" y="972273"/>
+            <a:ext cx="1689903" cy="335666"/>
+          </a:xfrm>
+          <a:prstGeom prst="rect">
+            <a:avLst/>
+          </a:prstGeom>
+        </p:spPr>
+        <p:style>
+          <a:lnRef idx="2">
+            <a:schemeClr val="accent1">
+              <a:shade val="15000"/>
+            </a:schemeClr>
+          </a:lnRef>
+          <a:fillRef idx="1">
+            <a:schemeClr val="accent1"/>
+          </a:fillRef>
+          <a:effectRef idx="0">
+            <a:schemeClr val="accent1"/>
+          </a:effectRef>
+          <a:fontRef idx="minor">
+            <a:schemeClr val="lt1"/>
+          </a:fontRef>
+        </p:style>
+        <p:txBody>
+          <a:bodyPr rtlCol="0" anchor="ctr"/>
+          <a:lstStyle/>
+          <a:p>
+            <a:pPr algn="ctr"/>
+            <a:endParaRPr lang="en-GB"/>
+          </a:p>
+        </p:txBody>
+      </p:sp>
+      <p:sp>
+        <p:nvSpPr>
+          <p:cNvPr id="8" name="Rectangle 7">
+            <a:extLst>
+              <a:ext uri="{FF2B5EF4-FFF2-40B4-BE49-F238E27FC236}">
+                <a16:creationId xmlns:a16="http://schemas.microsoft.com/office/drawing/2014/main" id="{0CB2665C-36B5-EE1F-CB69-0013B77A004B}"/>
+              </a:ext>
+            </a:extLst>
+          </p:cNvPr>
+          <p:cNvSpPr/>
+          <p:nvPr/>
+        </p:nvSpPr>
+        <p:spPr>
+          <a:xfrm>
+            <a:off x="636607" y="1448763"/>
+            <a:ext cx="11174995" cy="4894163"/>
+          </a:xfrm>
+          <a:prstGeom prst="rect">
+            <a:avLst/>
+          </a:prstGeom>
+        </p:spPr>
+        <p:style>
+          <a:lnRef idx="2">
+            <a:schemeClr val="accent1">
+              <a:shade val="15000"/>
+            </a:schemeClr>
+          </a:lnRef>
+          <a:fillRef idx="1">
+            <a:schemeClr val="accent1"/>
+          </a:fillRef>
+          <a:effectRef idx="0">
+            <a:schemeClr val="accent1"/>
+          </a:effectRef>
+          <a:fontRef idx="minor">
+            <a:schemeClr val="lt1"/>
+          </a:fontRef>
+        </p:style>
+        <p:txBody>
+          <a:bodyPr rtlCol="0" anchor="ctr"/>
+          <a:lstStyle/>
+          <a:p>
+            <a:pPr algn="ctr"/>
+            <a:endParaRPr lang="en-GB"/>
+          </a:p>
+        </p:txBody>
+      </p:sp>
+      <p:sp>
+        <p:nvSpPr>
+          <p:cNvPr id="9" name="TextBox 8">
+            <a:extLst>
+              <a:ext uri="{FF2B5EF4-FFF2-40B4-BE49-F238E27FC236}">
+                <a16:creationId xmlns:a16="http://schemas.microsoft.com/office/drawing/2014/main" id="{7608AFAA-4526-1E03-3518-89913512A0D0}"/>
+              </a:ext>
+            </a:extLst>
+          </p:cNvPr>
+          <p:cNvSpPr txBox="1"/>
+          <p:nvPr/>
+        </p:nvSpPr>
+        <p:spPr>
+          <a:xfrm>
+            <a:off x="3323862" y="134167"/>
+            <a:ext cx="1744645" cy="369332"/>
+          </a:xfrm>
+          <a:prstGeom prst="rect">
+            <a:avLst/>
+          </a:prstGeom>
+          <a:noFill/>
+        </p:spPr>
+        <p:txBody>
+          <a:bodyPr wrap="none" rtlCol="0">
+            <a:spAutoFit/>
+          </a:bodyPr>
+          <a:lstStyle/>
+          <a:p>
+            <a:r>
+              <a:rPr lang="en-GB" dirty="0"/>
+              <a:t>Simulation tabs</a:t>
+            </a:r>
+          </a:p>
+        </p:txBody>
+      </p:sp>
+      <p:cxnSp>
+        <p:nvCxnSpPr>
+          <p:cNvPr id="11" name="Straight Arrow Connector 10">
+            <a:extLst>
+              <a:ext uri="{FF2B5EF4-FFF2-40B4-BE49-F238E27FC236}">
+                <a16:creationId xmlns:a16="http://schemas.microsoft.com/office/drawing/2014/main" id="{48598AED-D795-E4A0-5A2E-413B5C0F3910}"/>
+              </a:ext>
+            </a:extLst>
+          </p:cNvPr>
+          <p:cNvCxnSpPr>
+            <a:stCxn id="9" idx="2"/>
+          </p:cNvCxnSpPr>
+          <p:nvPr/>
+        </p:nvCxnSpPr>
+        <p:spPr>
+          <a:xfrm flipH="1">
+            <a:off x="2048719" y="503499"/>
+            <a:ext cx="2147466" cy="327950"/>
+          </a:xfrm>
+          <a:prstGeom prst="straightConnector1">
+            <a:avLst/>
+          </a:prstGeom>
+          <a:ln>
+            <a:tailEnd type="triangle"/>
+          </a:ln>
+        </p:spPr>
+        <p:style>
+          <a:lnRef idx="2">
+            <a:schemeClr val="accent1"/>
+          </a:lnRef>
+          <a:fillRef idx="0">
+            <a:schemeClr val="accent1"/>
+          </a:fillRef>
+          <a:effectRef idx="1">
+            <a:schemeClr val="accent1"/>
+          </a:effectRef>
+          <a:fontRef idx="minor">
+            <a:schemeClr val="tx1"/>
+          </a:fontRef>
+        </p:style>
+      </p:cxnSp>
+      <p:cxnSp>
+        <p:nvCxnSpPr>
+          <p:cNvPr id="12" name="Straight Arrow Connector 11">
+            <a:extLst>
+              <a:ext uri="{FF2B5EF4-FFF2-40B4-BE49-F238E27FC236}">
+                <a16:creationId xmlns:a16="http://schemas.microsoft.com/office/drawing/2014/main" id="{D3430A1B-41DB-BA21-41CD-30E2F921B338}"/>
+              </a:ext>
+            </a:extLst>
+          </p:cNvPr>
+          <p:cNvCxnSpPr>
+            <a:cxnSpLocks/>
+          </p:cNvCxnSpPr>
+          <p:nvPr/>
+        </p:nvCxnSpPr>
+        <p:spPr>
+          <a:xfrm flipH="1">
+            <a:off x="3970117" y="503499"/>
+            <a:ext cx="283942" cy="327950"/>
+          </a:xfrm>
+          <a:prstGeom prst="straightConnector1">
+            <a:avLst/>
+          </a:prstGeom>
+          <a:ln>
+            <a:tailEnd type="triangle"/>
+          </a:ln>
+        </p:spPr>
+        <p:style>
+          <a:lnRef idx="2">
+            <a:schemeClr val="accent1"/>
+          </a:lnRef>
+          <a:fillRef idx="0">
+            <a:schemeClr val="accent1"/>
+          </a:fillRef>
+          <a:effectRef idx="1">
+            <a:schemeClr val="accent1"/>
+          </a:effectRef>
+          <a:fontRef idx="minor">
+            <a:schemeClr val="tx1"/>
+          </a:fontRef>
+        </p:style>
+      </p:cxnSp>
+      <p:cxnSp>
+        <p:nvCxnSpPr>
+          <p:cNvPr id="15" name="Straight Arrow Connector 14">
+            <a:extLst>
+              <a:ext uri="{FF2B5EF4-FFF2-40B4-BE49-F238E27FC236}">
+                <a16:creationId xmlns:a16="http://schemas.microsoft.com/office/drawing/2014/main" id="{7E63B199-4BBF-1579-9686-4578AED7630D}"/>
+              </a:ext>
+            </a:extLst>
+          </p:cNvPr>
+          <p:cNvCxnSpPr>
+            <a:cxnSpLocks/>
+          </p:cNvCxnSpPr>
+          <p:nvPr/>
+        </p:nvCxnSpPr>
+        <p:spPr>
+          <a:xfrm>
+            <a:off x="4254059" y="503499"/>
+            <a:ext cx="341091" cy="327950"/>
+          </a:xfrm>
+          <a:prstGeom prst="straightConnector1">
+            <a:avLst/>
+          </a:prstGeom>
+          <a:ln>
+            <a:tailEnd type="triangle"/>
+          </a:ln>
+        </p:spPr>
+        <p:style>
+          <a:lnRef idx="2">
+            <a:schemeClr val="accent1"/>
+          </a:lnRef>
+          <a:fillRef idx="0">
+            <a:schemeClr val="accent1"/>
+          </a:fillRef>
+          <a:effectRef idx="1">
+            <a:schemeClr val="accent1"/>
+          </a:effectRef>
+          <a:fontRef idx="minor">
+            <a:schemeClr val="tx1"/>
+          </a:fontRef>
+        </p:style>
+      </p:cxnSp>
+      <p:cxnSp>
+        <p:nvCxnSpPr>
+          <p:cNvPr id="19" name="Straight Arrow Connector 18">
+            <a:extLst>
+              <a:ext uri="{FF2B5EF4-FFF2-40B4-BE49-F238E27FC236}">
+                <a16:creationId xmlns:a16="http://schemas.microsoft.com/office/drawing/2014/main" id="{33C0FB00-4878-8102-BDE5-84083E58444F}"/>
+              </a:ext>
+            </a:extLst>
+          </p:cNvPr>
+          <p:cNvCxnSpPr>
+            <a:cxnSpLocks/>
+            <a:stCxn id="9" idx="2"/>
+          </p:cNvCxnSpPr>
+          <p:nvPr/>
+        </p:nvCxnSpPr>
+        <p:spPr>
+          <a:xfrm>
+            <a:off x="4196185" y="503499"/>
+            <a:ext cx="2505557" cy="327950"/>
+          </a:xfrm>
+          <a:prstGeom prst="straightConnector1">
+            <a:avLst/>
+          </a:prstGeom>
+          <a:ln>
+            <a:tailEnd type="triangle"/>
+          </a:ln>
+        </p:spPr>
+        <p:style>
+          <a:lnRef idx="2">
+            <a:schemeClr val="accent1"/>
+          </a:lnRef>
+          <a:fillRef idx="0">
+            <a:schemeClr val="accent1"/>
+          </a:fillRef>
+          <a:effectRef idx="1">
+            <a:schemeClr val="accent1"/>
+          </a:effectRef>
+          <a:fontRef idx="minor">
+            <a:schemeClr val="tx1"/>
+          </a:fontRef>
+        </p:style>
+      </p:cxnSp>
+    </p:spTree>
+    <p:extLst>
+      <p:ext uri="{BB962C8B-B14F-4D97-AF65-F5344CB8AC3E}">
+        <p14:creationId xmlns:p14="http://schemas.microsoft.com/office/powerpoint/2010/main" val="3544689767"/>
       </p:ext>
     </p:extLst>
   </p:cSld>

</xml_diff>

<commit_message>
exploring simpler ways for the charts and layout
</commit_message>
<xml_diff>
--- a/WellDetailDialog.pptx
+++ b/WellDetailDialog.pptx
@@ -10,6 +10,7 @@
     <p:sldId id="259" r:id="rId4"/>
     <p:sldId id="258" r:id="rId5"/>
     <p:sldId id="260" r:id="rId6"/>
+    <p:sldId id="261" r:id="rId7"/>
   </p:sldIdLst>
   <p:sldSz cx="12192000" cy="6858000"/>
   <p:notesSz cx="6858000" cy="9144000"/>
@@ -265,7 +266,7 @@
           <a:p>
             <a:fld id="{ECF8B273-0B2B-4199-B6F0-058FC251F2E7}" type="datetimeFigureOut">
               <a:rPr lang="en-GB" smtClean="0"/>
-              <a:t>01/04/2025</a:t>
+              <a:t>03/04/2025</a:t>
             </a:fld>
             <a:endParaRPr lang="en-GB"/>
           </a:p>
@@ -465,7 +466,7 @@
           <a:p>
             <a:fld id="{ECF8B273-0B2B-4199-B6F0-058FC251F2E7}" type="datetimeFigureOut">
               <a:rPr lang="en-GB" smtClean="0"/>
-              <a:t>01/04/2025</a:t>
+              <a:t>03/04/2025</a:t>
             </a:fld>
             <a:endParaRPr lang="en-GB"/>
           </a:p>
@@ -675,7 +676,7 @@
           <a:p>
             <a:fld id="{ECF8B273-0B2B-4199-B6F0-058FC251F2E7}" type="datetimeFigureOut">
               <a:rPr lang="en-GB" smtClean="0"/>
-              <a:t>01/04/2025</a:t>
+              <a:t>03/04/2025</a:t>
             </a:fld>
             <a:endParaRPr lang="en-GB"/>
           </a:p>
@@ -875,7 +876,7 @@
           <a:p>
             <a:fld id="{ECF8B273-0B2B-4199-B6F0-058FC251F2E7}" type="datetimeFigureOut">
               <a:rPr lang="en-GB" smtClean="0"/>
-              <a:t>01/04/2025</a:t>
+              <a:t>03/04/2025</a:t>
             </a:fld>
             <a:endParaRPr lang="en-GB"/>
           </a:p>
@@ -1151,7 +1152,7 @@
           <a:p>
             <a:fld id="{ECF8B273-0B2B-4199-B6F0-058FC251F2E7}" type="datetimeFigureOut">
               <a:rPr lang="en-GB" smtClean="0"/>
-              <a:t>01/04/2025</a:t>
+              <a:t>03/04/2025</a:t>
             </a:fld>
             <a:endParaRPr lang="en-GB"/>
           </a:p>
@@ -1419,7 +1420,7 @@
           <a:p>
             <a:fld id="{ECF8B273-0B2B-4199-B6F0-058FC251F2E7}" type="datetimeFigureOut">
               <a:rPr lang="en-GB" smtClean="0"/>
-              <a:t>01/04/2025</a:t>
+              <a:t>03/04/2025</a:t>
             </a:fld>
             <a:endParaRPr lang="en-GB"/>
           </a:p>
@@ -1834,7 +1835,7 @@
           <a:p>
             <a:fld id="{ECF8B273-0B2B-4199-B6F0-058FC251F2E7}" type="datetimeFigureOut">
               <a:rPr lang="en-GB" smtClean="0"/>
-              <a:t>01/04/2025</a:t>
+              <a:t>03/04/2025</a:t>
             </a:fld>
             <a:endParaRPr lang="en-GB"/>
           </a:p>
@@ -1976,7 +1977,7 @@
           <a:p>
             <a:fld id="{ECF8B273-0B2B-4199-B6F0-058FC251F2E7}" type="datetimeFigureOut">
               <a:rPr lang="en-GB" smtClean="0"/>
-              <a:t>01/04/2025</a:t>
+              <a:t>03/04/2025</a:t>
             </a:fld>
             <a:endParaRPr lang="en-GB"/>
           </a:p>
@@ -2089,7 +2090,7 @@
           <a:p>
             <a:fld id="{ECF8B273-0B2B-4199-B6F0-058FC251F2E7}" type="datetimeFigureOut">
               <a:rPr lang="en-GB" smtClean="0"/>
-              <a:t>01/04/2025</a:t>
+              <a:t>03/04/2025</a:t>
             </a:fld>
             <a:endParaRPr lang="en-GB"/>
           </a:p>
@@ -2402,7 +2403,7 @@
           <a:p>
             <a:fld id="{ECF8B273-0B2B-4199-B6F0-058FC251F2E7}" type="datetimeFigureOut">
               <a:rPr lang="en-GB" smtClean="0"/>
-              <a:t>01/04/2025</a:t>
+              <a:t>03/04/2025</a:t>
             </a:fld>
             <a:endParaRPr lang="en-GB"/>
           </a:p>
@@ -2691,7 +2692,7 @@
           <a:p>
             <a:fld id="{ECF8B273-0B2B-4199-B6F0-058FC251F2E7}" type="datetimeFigureOut">
               <a:rPr lang="en-GB" smtClean="0"/>
-              <a:t>01/04/2025</a:t>
+              <a:t>03/04/2025</a:t>
             </a:fld>
             <a:endParaRPr lang="en-GB"/>
           </a:p>
@@ -2934,7 +2935,7 @@
           <a:p>
             <a:fld id="{ECF8B273-0B2B-4199-B6F0-058FC251F2E7}" type="datetimeFigureOut">
               <a:rPr lang="en-GB" smtClean="0"/>
-              <a:t>01/04/2025</a:t>
+              <a:t>03/04/2025</a:t>
             </a:fld>
             <a:endParaRPr lang="en-GB"/>
           </a:p>
@@ -9276,6 +9277,1146 @@
 </p:sld>
 </file>
 
+<file path=ppt/slides/slide6.xml><?xml version="1.0" encoding="utf-8"?>
+<p:sld xmlns:a="http://schemas.openxmlformats.org/drawingml/2006/main" xmlns:r="http://schemas.openxmlformats.org/officeDocument/2006/relationships" xmlns:p="http://schemas.openxmlformats.org/presentationml/2006/main">
+  <p:cSld>
+    <p:spTree>
+      <p:nvGrpSpPr>
+        <p:cNvPr id="1" name=""/>
+        <p:cNvGrpSpPr/>
+        <p:nvPr/>
+      </p:nvGrpSpPr>
+      <p:grpSpPr>
+        <a:xfrm>
+          <a:off x="0" y="0"/>
+          <a:ext cx="0" cy="0"/>
+          <a:chOff x="0" y="0"/>
+          <a:chExt cx="0" cy="0"/>
+        </a:xfrm>
+      </p:grpSpPr>
+      <p:sp>
+        <p:nvSpPr>
+          <p:cNvPr id="8" name="Rectangle 7">
+            <a:extLst>
+              <a:ext uri="{FF2B5EF4-FFF2-40B4-BE49-F238E27FC236}">
+                <a16:creationId xmlns:a16="http://schemas.microsoft.com/office/drawing/2014/main" id="{9A210D33-E37B-0CC5-DFA6-D62A9BD5C5A6}"/>
+              </a:ext>
+            </a:extLst>
+          </p:cNvPr>
+          <p:cNvSpPr/>
+          <p:nvPr/>
+        </p:nvSpPr>
+        <p:spPr>
+          <a:xfrm>
+            <a:off x="3631940" y="2640528"/>
+            <a:ext cx="994073" cy="844952"/>
+          </a:xfrm>
+          <a:prstGeom prst="rect">
+            <a:avLst/>
+          </a:prstGeom>
+          <a:solidFill>
+            <a:schemeClr val="tx2"/>
+          </a:solidFill>
+          <a:ln>
+            <a:solidFill>
+              <a:schemeClr val="tx1"/>
+            </a:solidFill>
+          </a:ln>
+        </p:spPr>
+        <p:style>
+          <a:lnRef idx="2">
+            <a:schemeClr val="accent1">
+              <a:shade val="15000"/>
+            </a:schemeClr>
+          </a:lnRef>
+          <a:fillRef idx="1">
+            <a:schemeClr val="accent1"/>
+          </a:fillRef>
+          <a:effectRef idx="0">
+            <a:schemeClr val="accent1"/>
+          </a:effectRef>
+          <a:fontRef idx="minor">
+            <a:schemeClr val="lt1"/>
+          </a:fontRef>
+        </p:style>
+        <p:txBody>
+          <a:bodyPr rtlCol="0" anchor="ctr"/>
+          <a:lstStyle/>
+          <a:p>
+            <a:pPr algn="ctr"/>
+            <a:endParaRPr lang="en-GB"/>
+          </a:p>
+        </p:txBody>
+      </p:sp>
+      <p:pic>
+        <p:nvPicPr>
+          <p:cNvPr id="10" name="Graphic 9" descr="Database with solid fill">
+            <a:extLst>
+              <a:ext uri="{FF2B5EF4-FFF2-40B4-BE49-F238E27FC236}">
+                <a16:creationId xmlns:a16="http://schemas.microsoft.com/office/drawing/2014/main" id="{C99700FA-0863-CB2A-ED4E-4D8391BE162D}"/>
+              </a:ext>
+            </a:extLst>
+          </p:cNvPr>
+          <p:cNvPicPr>
+            <a:picLocks noChangeAspect="1"/>
+          </p:cNvPicPr>
+          <p:nvPr/>
+        </p:nvPicPr>
+        <p:blipFill>
+          <a:blip r:embed="rId2">
+            <a:extLst>
+              <a:ext uri="{96DAC541-7B7A-43D3-8B79-37D633B846F1}">
+                <asvg:svgBlip xmlns:asvg="http://schemas.microsoft.com/office/drawing/2016/SVG/main" r:embed="rId3"/>
+              </a:ext>
+            </a:extLst>
+          </a:blip>
+          <a:stretch>
+            <a:fillRect/>
+          </a:stretch>
+        </p:blipFill>
+        <p:spPr>
+          <a:xfrm>
+            <a:off x="5036909" y="2685328"/>
+            <a:ext cx="914400" cy="914400"/>
+          </a:xfrm>
+          <a:prstGeom prst="rect">
+            <a:avLst/>
+          </a:prstGeom>
+        </p:spPr>
+      </p:pic>
+      <p:pic>
+        <p:nvPicPr>
+          <p:cNvPr id="14" name="Graphic 13" descr="Programmer female with solid fill">
+            <a:extLst>
+              <a:ext uri="{FF2B5EF4-FFF2-40B4-BE49-F238E27FC236}">
+                <a16:creationId xmlns:a16="http://schemas.microsoft.com/office/drawing/2014/main" id="{F98299D6-B98A-9AD4-C433-788FCEA5FA07}"/>
+              </a:ext>
+            </a:extLst>
+          </p:cNvPr>
+          <p:cNvPicPr>
+            <a:picLocks noChangeAspect="1"/>
+          </p:cNvPicPr>
+          <p:nvPr/>
+        </p:nvPicPr>
+        <p:blipFill>
+          <a:blip r:embed="rId4">
+            <a:extLst>
+              <a:ext uri="{96DAC541-7B7A-43D3-8B79-37D633B846F1}">
+                <asvg:svgBlip xmlns:asvg="http://schemas.microsoft.com/office/drawing/2016/SVG/main" r:embed="rId5"/>
+              </a:ext>
+            </a:extLst>
+          </a:blip>
+          <a:stretch>
+            <a:fillRect/>
+          </a:stretch>
+        </p:blipFill>
+        <p:spPr>
+          <a:xfrm>
+            <a:off x="2137111" y="2542752"/>
+            <a:ext cx="914400" cy="914400"/>
+          </a:xfrm>
+          <a:prstGeom prst="rect">
+            <a:avLst/>
+          </a:prstGeom>
+        </p:spPr>
+      </p:pic>
+      <p:cxnSp>
+        <p:nvCxnSpPr>
+          <p:cNvPr id="18" name="Connector: Curved 17">
+            <a:extLst>
+              <a:ext uri="{FF2B5EF4-FFF2-40B4-BE49-F238E27FC236}">
+                <a16:creationId xmlns:a16="http://schemas.microsoft.com/office/drawing/2014/main" id="{A87BDCF5-2E98-F77B-6C22-83C0B7EF61BB}"/>
+              </a:ext>
+            </a:extLst>
+          </p:cNvPr>
+          <p:cNvCxnSpPr>
+            <a:cxnSpLocks/>
+          </p:cNvCxnSpPr>
+          <p:nvPr/>
+        </p:nvCxnSpPr>
+        <p:spPr>
+          <a:xfrm rot="16200000" flipH="1">
+            <a:off x="5100323" y="1689908"/>
+            <a:ext cx="1808062" cy="858934"/>
+          </a:xfrm>
+          <a:prstGeom prst="curvedConnector2">
+            <a:avLst/>
+          </a:prstGeom>
+          <a:ln>
+            <a:tailEnd type="triangle"/>
+          </a:ln>
+        </p:spPr>
+        <p:style>
+          <a:lnRef idx="2">
+            <a:schemeClr val="accent1"/>
+          </a:lnRef>
+          <a:fillRef idx="0">
+            <a:schemeClr val="accent1"/>
+          </a:fillRef>
+          <a:effectRef idx="1">
+            <a:schemeClr val="accent1"/>
+          </a:effectRef>
+          <a:fontRef idx="minor">
+            <a:schemeClr val="tx1"/>
+          </a:fontRef>
+        </p:style>
+      </p:cxnSp>
+      <p:cxnSp>
+        <p:nvCxnSpPr>
+          <p:cNvPr id="24" name="Straight Arrow Connector 23">
+            <a:extLst>
+              <a:ext uri="{FF2B5EF4-FFF2-40B4-BE49-F238E27FC236}">
+                <a16:creationId xmlns:a16="http://schemas.microsoft.com/office/drawing/2014/main" id="{24FDC91D-D131-36BA-3D31-E4C3BADA2AD4}"/>
+              </a:ext>
+            </a:extLst>
+          </p:cNvPr>
+          <p:cNvCxnSpPr>
+            <a:cxnSpLocks/>
+          </p:cNvCxnSpPr>
+          <p:nvPr/>
+        </p:nvCxnSpPr>
+        <p:spPr>
+          <a:xfrm flipH="1">
+            <a:off x="5774072" y="3268886"/>
+            <a:ext cx="507108" cy="0"/>
+          </a:xfrm>
+          <a:prstGeom prst="straightConnector1">
+            <a:avLst/>
+          </a:prstGeom>
+          <a:ln>
+            <a:tailEnd type="triangle"/>
+          </a:ln>
+        </p:spPr>
+        <p:style>
+          <a:lnRef idx="2">
+            <a:schemeClr val="accent1"/>
+          </a:lnRef>
+          <a:fillRef idx="0">
+            <a:schemeClr val="accent1"/>
+          </a:fillRef>
+          <a:effectRef idx="1">
+            <a:schemeClr val="accent1"/>
+          </a:effectRef>
+          <a:fontRef idx="minor">
+            <a:schemeClr val="tx1"/>
+          </a:fontRef>
+        </p:style>
+      </p:cxnSp>
+      <p:cxnSp>
+        <p:nvCxnSpPr>
+          <p:cNvPr id="25" name="Straight Arrow Connector 24">
+            <a:extLst>
+              <a:ext uri="{FF2B5EF4-FFF2-40B4-BE49-F238E27FC236}">
+                <a16:creationId xmlns:a16="http://schemas.microsoft.com/office/drawing/2014/main" id="{3E6A7199-5358-EC7C-BDE0-20C458659688}"/>
+              </a:ext>
+            </a:extLst>
+          </p:cNvPr>
+          <p:cNvCxnSpPr>
+            <a:cxnSpLocks/>
+          </p:cNvCxnSpPr>
+          <p:nvPr/>
+        </p:nvCxnSpPr>
+        <p:spPr>
+          <a:xfrm>
+            <a:off x="5800119" y="3142528"/>
+            <a:ext cx="562086" cy="0"/>
+          </a:xfrm>
+          <a:prstGeom prst="straightConnector1">
+            <a:avLst/>
+          </a:prstGeom>
+          <a:ln>
+            <a:tailEnd type="triangle"/>
+          </a:ln>
+        </p:spPr>
+        <p:style>
+          <a:lnRef idx="2">
+            <a:schemeClr val="accent1"/>
+          </a:lnRef>
+          <a:fillRef idx="0">
+            <a:schemeClr val="accent1"/>
+          </a:fillRef>
+          <a:effectRef idx="1">
+            <a:schemeClr val="accent1"/>
+          </a:effectRef>
+          <a:fontRef idx="minor">
+            <a:schemeClr val="tx1"/>
+          </a:fontRef>
+        </p:style>
+      </p:cxnSp>
+      <p:cxnSp>
+        <p:nvCxnSpPr>
+          <p:cNvPr id="29" name="Straight Arrow Connector 28">
+            <a:extLst>
+              <a:ext uri="{FF2B5EF4-FFF2-40B4-BE49-F238E27FC236}">
+                <a16:creationId xmlns:a16="http://schemas.microsoft.com/office/drawing/2014/main" id="{B326E1B0-7193-CB7D-B07F-3068651B2ACF}"/>
+              </a:ext>
+            </a:extLst>
+          </p:cNvPr>
+          <p:cNvCxnSpPr>
+            <a:cxnSpLocks/>
+          </p:cNvCxnSpPr>
+          <p:nvPr/>
+        </p:nvCxnSpPr>
+        <p:spPr>
+          <a:xfrm>
+            <a:off x="5708845" y="3568715"/>
+            <a:ext cx="309378" cy="267667"/>
+          </a:xfrm>
+          <a:prstGeom prst="straightConnector1">
+            <a:avLst/>
+          </a:prstGeom>
+          <a:ln>
+            <a:tailEnd type="triangle"/>
+          </a:ln>
+        </p:spPr>
+        <p:style>
+          <a:lnRef idx="2">
+            <a:schemeClr val="accent1"/>
+          </a:lnRef>
+          <a:fillRef idx="0">
+            <a:schemeClr val="accent1"/>
+          </a:fillRef>
+          <a:effectRef idx="1">
+            <a:schemeClr val="accent1"/>
+          </a:effectRef>
+          <a:fontRef idx="minor">
+            <a:schemeClr val="tx1"/>
+          </a:fontRef>
+        </p:style>
+      </p:cxnSp>
+      <p:cxnSp>
+        <p:nvCxnSpPr>
+          <p:cNvPr id="31" name="Straight Arrow Connector 30">
+            <a:extLst>
+              <a:ext uri="{FF2B5EF4-FFF2-40B4-BE49-F238E27FC236}">
+                <a16:creationId xmlns:a16="http://schemas.microsoft.com/office/drawing/2014/main" id="{FE7E03DC-2994-C840-0A8E-64CF99E8BC83}"/>
+              </a:ext>
+            </a:extLst>
+          </p:cNvPr>
+          <p:cNvCxnSpPr>
+            <a:cxnSpLocks/>
+          </p:cNvCxnSpPr>
+          <p:nvPr/>
+        </p:nvCxnSpPr>
+        <p:spPr>
+          <a:xfrm>
+            <a:off x="3069838" y="3034436"/>
+            <a:ext cx="397401" cy="0"/>
+          </a:xfrm>
+          <a:prstGeom prst="straightConnector1">
+            <a:avLst/>
+          </a:prstGeom>
+          <a:ln>
+            <a:tailEnd type="triangle"/>
+          </a:ln>
+        </p:spPr>
+        <p:style>
+          <a:lnRef idx="2">
+            <a:schemeClr val="accent1"/>
+          </a:lnRef>
+          <a:fillRef idx="0">
+            <a:schemeClr val="accent1"/>
+          </a:fillRef>
+          <a:effectRef idx="1">
+            <a:schemeClr val="accent1"/>
+          </a:effectRef>
+          <a:fontRef idx="minor">
+            <a:schemeClr val="tx1"/>
+          </a:fontRef>
+        </p:style>
+      </p:cxnSp>
+      <p:cxnSp>
+        <p:nvCxnSpPr>
+          <p:cNvPr id="33" name="Straight Arrow Connector 32">
+            <a:extLst>
+              <a:ext uri="{FF2B5EF4-FFF2-40B4-BE49-F238E27FC236}">
+                <a16:creationId xmlns:a16="http://schemas.microsoft.com/office/drawing/2014/main" id="{A7B380A0-5A8E-8D07-CC94-60E6CFA705CF}"/>
+              </a:ext>
+            </a:extLst>
+          </p:cNvPr>
+          <p:cNvCxnSpPr>
+            <a:cxnSpLocks/>
+          </p:cNvCxnSpPr>
+          <p:nvPr/>
+        </p:nvCxnSpPr>
+        <p:spPr>
+          <a:xfrm flipH="1" flipV="1">
+            <a:off x="5803729" y="3493387"/>
+            <a:ext cx="300221" cy="255366"/>
+          </a:xfrm>
+          <a:prstGeom prst="straightConnector1">
+            <a:avLst/>
+          </a:prstGeom>
+          <a:ln>
+            <a:tailEnd type="triangle"/>
+          </a:ln>
+        </p:spPr>
+        <p:style>
+          <a:lnRef idx="2">
+            <a:schemeClr val="accent1"/>
+          </a:lnRef>
+          <a:fillRef idx="0">
+            <a:schemeClr val="accent1"/>
+          </a:fillRef>
+          <a:effectRef idx="1">
+            <a:schemeClr val="accent1"/>
+          </a:effectRef>
+          <a:fontRef idx="minor">
+            <a:schemeClr val="tx1"/>
+          </a:fontRef>
+        </p:style>
+      </p:cxnSp>
+      <p:cxnSp>
+        <p:nvCxnSpPr>
+          <p:cNvPr id="36" name="Straight Arrow Connector 35">
+            <a:extLst>
+              <a:ext uri="{FF2B5EF4-FFF2-40B4-BE49-F238E27FC236}">
+                <a16:creationId xmlns:a16="http://schemas.microsoft.com/office/drawing/2014/main" id="{7BFA061A-BDDC-B3BA-B46F-903A0DD0DD05}"/>
+              </a:ext>
+            </a:extLst>
+          </p:cNvPr>
+          <p:cNvCxnSpPr>
+            <a:cxnSpLocks/>
+          </p:cNvCxnSpPr>
+          <p:nvPr/>
+        </p:nvCxnSpPr>
+        <p:spPr>
+          <a:xfrm flipH="1">
+            <a:off x="6483866" y="3268886"/>
+            <a:ext cx="203634" cy="479867"/>
+          </a:xfrm>
+          <a:prstGeom prst="straightConnector1">
+            <a:avLst/>
+          </a:prstGeom>
+          <a:ln>
+            <a:tailEnd type="triangle"/>
+          </a:ln>
+        </p:spPr>
+        <p:style>
+          <a:lnRef idx="2">
+            <a:schemeClr val="accent1"/>
+          </a:lnRef>
+          <a:fillRef idx="0">
+            <a:schemeClr val="accent1"/>
+          </a:fillRef>
+          <a:effectRef idx="1">
+            <a:schemeClr val="accent1"/>
+          </a:effectRef>
+          <a:fontRef idx="minor">
+            <a:schemeClr val="tx1"/>
+          </a:fontRef>
+        </p:style>
+      </p:cxnSp>
+      <p:cxnSp>
+        <p:nvCxnSpPr>
+          <p:cNvPr id="38" name="Straight Arrow Connector 37">
+            <a:extLst>
+              <a:ext uri="{FF2B5EF4-FFF2-40B4-BE49-F238E27FC236}">
+                <a16:creationId xmlns:a16="http://schemas.microsoft.com/office/drawing/2014/main" id="{2F577580-E985-F580-FE44-0D4292067052}"/>
+              </a:ext>
+            </a:extLst>
+          </p:cNvPr>
+          <p:cNvCxnSpPr>
+            <a:cxnSpLocks/>
+          </p:cNvCxnSpPr>
+          <p:nvPr/>
+        </p:nvCxnSpPr>
+        <p:spPr>
+          <a:xfrm flipV="1">
+            <a:off x="6517743" y="3484947"/>
+            <a:ext cx="209315" cy="527612"/>
+          </a:xfrm>
+          <a:prstGeom prst="straightConnector1">
+            <a:avLst/>
+          </a:prstGeom>
+          <a:ln>
+            <a:tailEnd type="triangle"/>
+          </a:ln>
+        </p:spPr>
+        <p:style>
+          <a:lnRef idx="2">
+            <a:schemeClr val="accent1"/>
+          </a:lnRef>
+          <a:fillRef idx="0">
+            <a:schemeClr val="accent1"/>
+          </a:fillRef>
+          <a:effectRef idx="1">
+            <a:schemeClr val="accent1"/>
+          </a:effectRef>
+          <a:fontRef idx="minor">
+            <a:schemeClr val="tx1"/>
+          </a:fontRef>
+        </p:style>
+      </p:cxnSp>
+      <p:sp>
+        <p:nvSpPr>
+          <p:cNvPr id="40" name="TextBox 39">
+            <a:extLst>
+              <a:ext uri="{FF2B5EF4-FFF2-40B4-BE49-F238E27FC236}">
+                <a16:creationId xmlns:a16="http://schemas.microsoft.com/office/drawing/2014/main" id="{ACEA249A-D5E2-3E13-6504-5B74A78F5F1E}"/>
+              </a:ext>
+            </a:extLst>
+          </p:cNvPr>
+          <p:cNvSpPr txBox="1"/>
+          <p:nvPr/>
+        </p:nvSpPr>
+        <p:spPr>
+          <a:xfrm>
+            <a:off x="4091609" y="1834858"/>
+            <a:ext cx="1402500" cy="523220"/>
+          </a:xfrm>
+          <a:prstGeom prst="rect">
+            <a:avLst/>
+          </a:prstGeom>
+          <a:noFill/>
+        </p:spPr>
+        <p:txBody>
+          <a:bodyPr wrap="none" rtlCol="0">
+            <a:spAutoFit/>
+          </a:bodyPr>
+          <a:lstStyle/>
+          <a:p>
+            <a:pPr algn="ctr"/>
+            <a:r>
+              <a:rPr lang="en-GB" sz="1400" dirty="0"/>
+              <a:t>Fetch/transmit  </a:t>
+            </a:r>
+          </a:p>
+          <a:p>
+            <a:pPr algn="ctr"/>
+            <a:r>
+              <a:rPr lang="en-GB" sz="1400" dirty="0"/>
+              <a:t>data</a:t>
+            </a:r>
+          </a:p>
+        </p:txBody>
+      </p:sp>
+      <p:cxnSp>
+        <p:nvCxnSpPr>
+          <p:cNvPr id="43" name="Connector: Curved 42">
+            <a:extLst>
+              <a:ext uri="{FF2B5EF4-FFF2-40B4-BE49-F238E27FC236}">
+                <a16:creationId xmlns:a16="http://schemas.microsoft.com/office/drawing/2014/main" id="{E68FD641-2E36-CF70-7BF6-DBD6C65B2531}"/>
+              </a:ext>
+            </a:extLst>
+          </p:cNvPr>
+          <p:cNvCxnSpPr>
+            <a:cxnSpLocks/>
+          </p:cNvCxnSpPr>
+          <p:nvPr/>
+        </p:nvCxnSpPr>
+        <p:spPr>
+          <a:xfrm rot="5400000">
+            <a:off x="5294204" y="2427064"/>
+            <a:ext cx="459130" cy="246456"/>
+          </a:xfrm>
+          <a:prstGeom prst="curvedConnector3">
+            <a:avLst>
+              <a:gd name="adj1" fmla="val 50000"/>
+            </a:avLst>
+          </a:prstGeom>
+          <a:ln>
+            <a:tailEnd type="triangle"/>
+          </a:ln>
+        </p:spPr>
+        <p:style>
+          <a:lnRef idx="2">
+            <a:schemeClr val="accent1"/>
+          </a:lnRef>
+          <a:fillRef idx="0">
+            <a:schemeClr val="accent1"/>
+          </a:fillRef>
+          <a:effectRef idx="1">
+            <a:schemeClr val="accent1"/>
+          </a:effectRef>
+          <a:fontRef idx="minor">
+            <a:schemeClr val="tx1"/>
+          </a:fontRef>
+        </p:style>
+      </p:cxnSp>
+      <p:cxnSp>
+        <p:nvCxnSpPr>
+          <p:cNvPr id="56" name="Straight Arrow Connector 55">
+            <a:extLst>
+              <a:ext uri="{FF2B5EF4-FFF2-40B4-BE49-F238E27FC236}">
+                <a16:creationId xmlns:a16="http://schemas.microsoft.com/office/drawing/2014/main" id="{FAAA23D8-B4F1-8309-161F-48710E3D7A7D}"/>
+              </a:ext>
+            </a:extLst>
+          </p:cNvPr>
+          <p:cNvCxnSpPr>
+            <a:cxnSpLocks/>
+          </p:cNvCxnSpPr>
+          <p:nvPr/>
+        </p:nvCxnSpPr>
+        <p:spPr>
+          <a:xfrm flipH="1">
+            <a:off x="3033186" y="3209021"/>
+            <a:ext cx="470703" cy="0"/>
+          </a:xfrm>
+          <a:prstGeom prst="straightConnector1">
+            <a:avLst/>
+          </a:prstGeom>
+          <a:ln>
+            <a:tailEnd type="triangle"/>
+          </a:ln>
+        </p:spPr>
+        <p:style>
+          <a:lnRef idx="2">
+            <a:schemeClr val="accent1"/>
+          </a:lnRef>
+          <a:fillRef idx="0">
+            <a:schemeClr val="accent1"/>
+          </a:fillRef>
+          <a:effectRef idx="1">
+            <a:schemeClr val="accent1"/>
+          </a:effectRef>
+          <a:fontRef idx="minor">
+            <a:schemeClr val="tx1"/>
+          </a:fontRef>
+        </p:style>
+      </p:cxnSp>
+      <p:sp>
+        <p:nvSpPr>
+          <p:cNvPr id="59" name="TextBox 58">
+            <a:extLst>
+              <a:ext uri="{FF2B5EF4-FFF2-40B4-BE49-F238E27FC236}">
+                <a16:creationId xmlns:a16="http://schemas.microsoft.com/office/drawing/2014/main" id="{CF0AA7FD-FCE9-81C7-E11D-1F31F99AE419}"/>
+              </a:ext>
+            </a:extLst>
+          </p:cNvPr>
+          <p:cNvSpPr txBox="1"/>
+          <p:nvPr/>
+        </p:nvSpPr>
+        <p:spPr>
+          <a:xfrm>
+            <a:off x="3777700" y="2892041"/>
+            <a:ext cx="634404" cy="338554"/>
+          </a:xfrm>
+          <a:prstGeom prst="rect">
+            <a:avLst/>
+          </a:prstGeom>
+          <a:noFill/>
+        </p:spPr>
+        <p:txBody>
+          <a:bodyPr wrap="none" rtlCol="0">
+            <a:spAutoFit/>
+          </a:bodyPr>
+          <a:lstStyle/>
+          <a:p>
+            <a:pPr algn="ctr"/>
+            <a:r>
+              <a:rPr lang="en-GB" sz="1600" b="1" dirty="0">
+                <a:solidFill>
+                  <a:schemeClr val="bg2"/>
+                </a:solidFill>
+              </a:rPr>
+              <a:t>View</a:t>
+            </a:r>
+          </a:p>
+        </p:txBody>
+      </p:sp>
+      <p:sp>
+        <p:nvSpPr>
+          <p:cNvPr id="61" name="Oval 60">
+            <a:extLst>
+              <a:ext uri="{FF2B5EF4-FFF2-40B4-BE49-F238E27FC236}">
+                <a16:creationId xmlns:a16="http://schemas.microsoft.com/office/drawing/2014/main" id="{5D9BD065-EA19-6CB1-44A9-2686B9DCA102}"/>
+              </a:ext>
+            </a:extLst>
+          </p:cNvPr>
+          <p:cNvSpPr/>
+          <p:nvPr/>
+        </p:nvSpPr>
+        <p:spPr>
+          <a:xfrm>
+            <a:off x="5409716" y="1823016"/>
+            <a:ext cx="474562" cy="497711"/>
+          </a:xfrm>
+          <a:prstGeom prst="ellipse">
+            <a:avLst/>
+          </a:prstGeom>
+          <a:solidFill>
+            <a:schemeClr val="tx2"/>
+          </a:solidFill>
+          <a:ln>
+            <a:solidFill>
+              <a:schemeClr val="tx1"/>
+            </a:solidFill>
+          </a:ln>
+        </p:spPr>
+        <p:style>
+          <a:lnRef idx="2">
+            <a:schemeClr val="accent1">
+              <a:shade val="15000"/>
+            </a:schemeClr>
+          </a:lnRef>
+          <a:fillRef idx="1">
+            <a:schemeClr val="accent1"/>
+          </a:fillRef>
+          <a:effectRef idx="0">
+            <a:schemeClr val="accent1"/>
+          </a:effectRef>
+          <a:fontRef idx="minor">
+            <a:schemeClr val="lt1"/>
+          </a:fontRef>
+        </p:style>
+        <p:txBody>
+          <a:bodyPr rtlCol="0" anchor="ctr"/>
+          <a:lstStyle/>
+          <a:p>
+            <a:pPr algn="ctr"/>
+            <a:endParaRPr lang="en-GB"/>
+          </a:p>
+        </p:txBody>
+      </p:sp>
+      <p:sp>
+        <p:nvSpPr>
+          <p:cNvPr id="62" name="Oval 61">
+            <a:extLst>
+              <a:ext uri="{FF2B5EF4-FFF2-40B4-BE49-F238E27FC236}">
+                <a16:creationId xmlns:a16="http://schemas.microsoft.com/office/drawing/2014/main" id="{18633FDD-CCCE-4824-CC22-592EB921DEBB}"/>
+              </a:ext>
+            </a:extLst>
+          </p:cNvPr>
+          <p:cNvSpPr/>
+          <p:nvPr/>
+        </p:nvSpPr>
+        <p:spPr>
+          <a:xfrm>
+            <a:off x="6103950" y="3749235"/>
+            <a:ext cx="601877" cy="567160"/>
+          </a:xfrm>
+          <a:prstGeom prst="ellipse">
+            <a:avLst/>
+          </a:prstGeom>
+          <a:solidFill>
+            <a:schemeClr val="tx2"/>
+          </a:solidFill>
+          <a:ln>
+            <a:solidFill>
+              <a:schemeClr val="tx1"/>
+            </a:solidFill>
+          </a:ln>
+        </p:spPr>
+        <p:style>
+          <a:lnRef idx="2">
+            <a:schemeClr val="accent1">
+              <a:shade val="15000"/>
+            </a:schemeClr>
+          </a:lnRef>
+          <a:fillRef idx="1">
+            <a:schemeClr val="accent1"/>
+          </a:fillRef>
+          <a:effectRef idx="0">
+            <a:schemeClr val="accent1"/>
+          </a:effectRef>
+          <a:fontRef idx="minor">
+            <a:schemeClr val="lt1"/>
+          </a:fontRef>
+        </p:style>
+        <p:txBody>
+          <a:bodyPr rtlCol="0" anchor="ctr"/>
+          <a:lstStyle/>
+          <a:p>
+            <a:pPr algn="ctr"/>
+            <a:r>
+              <a:rPr lang="en-GB" sz="1400" dirty="0"/>
+              <a:t>HF</a:t>
+            </a:r>
+          </a:p>
+        </p:txBody>
+      </p:sp>
+      <p:sp>
+        <p:nvSpPr>
+          <p:cNvPr id="63" name="Rectangle 62">
+            <a:extLst>
+              <a:ext uri="{FF2B5EF4-FFF2-40B4-BE49-F238E27FC236}">
+                <a16:creationId xmlns:a16="http://schemas.microsoft.com/office/drawing/2014/main" id="{B59B9E4D-E153-5BB0-7821-390CF2D63864}"/>
+              </a:ext>
+            </a:extLst>
+          </p:cNvPr>
+          <p:cNvSpPr/>
+          <p:nvPr/>
+        </p:nvSpPr>
+        <p:spPr>
+          <a:xfrm>
+            <a:off x="6433821" y="2577476"/>
+            <a:ext cx="1169043" cy="844952"/>
+          </a:xfrm>
+          <a:prstGeom prst="rect">
+            <a:avLst/>
+          </a:prstGeom>
+          <a:solidFill>
+            <a:schemeClr val="tx2"/>
+          </a:solidFill>
+          <a:ln>
+            <a:solidFill>
+              <a:schemeClr val="tx1"/>
+            </a:solidFill>
+          </a:ln>
+        </p:spPr>
+        <p:style>
+          <a:lnRef idx="2">
+            <a:schemeClr val="accent1">
+              <a:shade val="15000"/>
+            </a:schemeClr>
+          </a:lnRef>
+          <a:fillRef idx="1">
+            <a:schemeClr val="accent1"/>
+          </a:fillRef>
+          <a:effectRef idx="0">
+            <a:schemeClr val="accent1"/>
+          </a:effectRef>
+          <a:fontRef idx="minor">
+            <a:schemeClr val="lt1"/>
+          </a:fontRef>
+        </p:style>
+        <p:txBody>
+          <a:bodyPr rtlCol="0" anchor="ctr"/>
+          <a:lstStyle/>
+          <a:p>
+            <a:pPr algn="ctr"/>
+            <a:endParaRPr lang="en-GB"/>
+          </a:p>
+        </p:txBody>
+      </p:sp>
+      <p:sp>
+        <p:nvSpPr>
+          <p:cNvPr id="64" name="TextBox 63">
+            <a:extLst>
+              <a:ext uri="{FF2B5EF4-FFF2-40B4-BE49-F238E27FC236}">
+                <a16:creationId xmlns:a16="http://schemas.microsoft.com/office/drawing/2014/main" id="{F8E03AA1-8D80-FA60-9F28-3C2841B0DAFF}"/>
+              </a:ext>
+            </a:extLst>
+          </p:cNvPr>
+          <p:cNvSpPr txBox="1"/>
+          <p:nvPr/>
+        </p:nvSpPr>
+        <p:spPr>
+          <a:xfrm>
+            <a:off x="6549581" y="2731017"/>
+            <a:ext cx="968215" cy="584775"/>
+          </a:xfrm>
+          <a:prstGeom prst="rect">
+            <a:avLst/>
+          </a:prstGeom>
+          <a:noFill/>
+        </p:spPr>
+        <p:txBody>
+          <a:bodyPr wrap="none" rtlCol="0">
+            <a:spAutoFit/>
+          </a:bodyPr>
+          <a:lstStyle/>
+          <a:p>
+            <a:pPr algn="ctr"/>
+            <a:r>
+              <a:rPr lang="en-GB" sz="1600" b="1" dirty="0">
+                <a:solidFill>
+                  <a:schemeClr val="bg2"/>
+                </a:solidFill>
+              </a:rPr>
+              <a:t>Insights </a:t>
+            </a:r>
+          </a:p>
+          <a:p>
+            <a:pPr algn="ctr"/>
+            <a:r>
+              <a:rPr lang="en-GB" sz="1600" b="1" dirty="0">
+                <a:solidFill>
+                  <a:schemeClr val="bg2"/>
+                </a:solidFill>
+              </a:rPr>
+              <a:t>engine</a:t>
+            </a:r>
+          </a:p>
+        </p:txBody>
+      </p:sp>
+      <p:cxnSp>
+        <p:nvCxnSpPr>
+          <p:cNvPr id="66" name="Straight Arrow Connector 65">
+            <a:extLst>
+              <a:ext uri="{FF2B5EF4-FFF2-40B4-BE49-F238E27FC236}">
+                <a16:creationId xmlns:a16="http://schemas.microsoft.com/office/drawing/2014/main" id="{28DAC827-072D-87C4-68EF-D21BC0211CAF}"/>
+              </a:ext>
+            </a:extLst>
+          </p:cNvPr>
+          <p:cNvCxnSpPr>
+            <a:cxnSpLocks/>
+          </p:cNvCxnSpPr>
+          <p:nvPr/>
+        </p:nvCxnSpPr>
+        <p:spPr>
+          <a:xfrm flipH="1">
+            <a:off x="4682692" y="3075726"/>
+            <a:ext cx="470703" cy="0"/>
+          </a:xfrm>
+          <a:prstGeom prst="straightConnector1">
+            <a:avLst/>
+          </a:prstGeom>
+          <a:ln>
+            <a:tailEnd type="triangle"/>
+          </a:ln>
+        </p:spPr>
+        <p:style>
+          <a:lnRef idx="2">
+            <a:schemeClr val="accent1"/>
+          </a:lnRef>
+          <a:fillRef idx="0">
+            <a:schemeClr val="accent1"/>
+          </a:fillRef>
+          <a:effectRef idx="1">
+            <a:schemeClr val="accent1"/>
+          </a:effectRef>
+          <a:fontRef idx="minor">
+            <a:schemeClr val="tx1"/>
+          </a:fontRef>
+        </p:style>
+      </p:cxnSp>
+      <p:sp>
+        <p:nvSpPr>
+          <p:cNvPr id="67" name="Rectangle 66">
+            <a:extLst>
+              <a:ext uri="{FF2B5EF4-FFF2-40B4-BE49-F238E27FC236}">
+                <a16:creationId xmlns:a16="http://schemas.microsoft.com/office/drawing/2014/main" id="{7BCB98D9-104E-2D18-1AAC-67EA97625A0F}"/>
+              </a:ext>
+            </a:extLst>
+          </p:cNvPr>
+          <p:cNvSpPr/>
+          <p:nvPr/>
+        </p:nvSpPr>
+        <p:spPr>
+          <a:xfrm>
+            <a:off x="4861366" y="494819"/>
+            <a:ext cx="1574157" cy="844952"/>
+          </a:xfrm>
+          <a:prstGeom prst="rect">
+            <a:avLst/>
+          </a:prstGeom>
+          <a:solidFill>
+            <a:schemeClr val="tx2"/>
+          </a:solidFill>
+          <a:ln>
+            <a:solidFill>
+              <a:schemeClr val="tx1"/>
+            </a:solidFill>
+          </a:ln>
+        </p:spPr>
+        <p:style>
+          <a:lnRef idx="2">
+            <a:schemeClr val="accent1">
+              <a:shade val="15000"/>
+            </a:schemeClr>
+          </a:lnRef>
+          <a:fillRef idx="1">
+            <a:schemeClr val="accent1"/>
+          </a:fillRef>
+          <a:effectRef idx="0">
+            <a:schemeClr val="accent1"/>
+          </a:effectRef>
+          <a:fontRef idx="minor">
+            <a:schemeClr val="lt1"/>
+          </a:fontRef>
+        </p:style>
+        <p:txBody>
+          <a:bodyPr rtlCol="0" anchor="ctr"/>
+          <a:lstStyle/>
+          <a:p>
+            <a:pPr algn="ctr"/>
+            <a:r>
+              <a:rPr lang="en-GB" dirty="0"/>
+              <a:t>Monitoring</a:t>
+            </a:r>
+          </a:p>
+        </p:txBody>
+      </p:sp>
+      <p:sp>
+        <p:nvSpPr>
+          <p:cNvPr id="68" name="TextBox 67">
+            <a:extLst>
+              <a:ext uri="{FF2B5EF4-FFF2-40B4-BE49-F238E27FC236}">
+                <a16:creationId xmlns:a16="http://schemas.microsoft.com/office/drawing/2014/main" id="{03C213B1-50B1-F466-DEE0-DA1FA64B247E}"/>
+              </a:ext>
+            </a:extLst>
+          </p:cNvPr>
+          <p:cNvSpPr txBox="1"/>
+          <p:nvPr/>
+        </p:nvSpPr>
+        <p:spPr>
+          <a:xfrm>
+            <a:off x="4487546" y="1019014"/>
+            <a:ext cx="308098" cy="369332"/>
+          </a:xfrm>
+          <a:prstGeom prst="rect">
+            <a:avLst/>
+          </a:prstGeom>
+          <a:noFill/>
+        </p:spPr>
+        <p:txBody>
+          <a:bodyPr wrap="none" rtlCol="0">
+            <a:spAutoFit/>
+          </a:bodyPr>
+          <a:lstStyle/>
+          <a:p>
+            <a:r>
+              <a:rPr lang="en-GB" dirty="0"/>
+              <a:t>1</a:t>
+            </a:r>
+          </a:p>
+        </p:txBody>
+      </p:sp>
+      <p:sp>
+        <p:nvSpPr>
+          <p:cNvPr id="69" name="TextBox 68">
+            <a:extLst>
+              <a:ext uri="{FF2B5EF4-FFF2-40B4-BE49-F238E27FC236}">
+                <a16:creationId xmlns:a16="http://schemas.microsoft.com/office/drawing/2014/main" id="{CEBA4413-02FB-8981-7D20-58A8FDD2CF30}"/>
+              </a:ext>
+            </a:extLst>
+          </p:cNvPr>
+          <p:cNvSpPr txBox="1"/>
+          <p:nvPr/>
+        </p:nvSpPr>
+        <p:spPr>
+          <a:xfrm>
+            <a:off x="5917040" y="1820119"/>
+            <a:ext cx="308098" cy="369332"/>
+          </a:xfrm>
+          <a:prstGeom prst="rect">
+            <a:avLst/>
+          </a:prstGeom>
+          <a:noFill/>
+        </p:spPr>
+        <p:txBody>
+          <a:bodyPr wrap="none" rtlCol="0">
+            <a:spAutoFit/>
+          </a:bodyPr>
+          <a:lstStyle/>
+          <a:p>
+            <a:r>
+              <a:rPr lang="en-GB" dirty="0"/>
+              <a:t>2</a:t>
+            </a:r>
+          </a:p>
+        </p:txBody>
+      </p:sp>
+      <p:sp>
+        <p:nvSpPr>
+          <p:cNvPr id="70" name="TextBox 69">
+            <a:extLst>
+              <a:ext uri="{FF2B5EF4-FFF2-40B4-BE49-F238E27FC236}">
+                <a16:creationId xmlns:a16="http://schemas.microsoft.com/office/drawing/2014/main" id="{574E6F2B-79B7-D2A0-8F95-21F2B02BD38E}"/>
+              </a:ext>
+            </a:extLst>
+          </p:cNvPr>
+          <p:cNvSpPr txBox="1"/>
+          <p:nvPr/>
+        </p:nvSpPr>
+        <p:spPr>
+          <a:xfrm>
+            <a:off x="6067843" y="2500662"/>
+            <a:ext cx="308098" cy="369332"/>
+          </a:xfrm>
+          <a:prstGeom prst="rect">
+            <a:avLst/>
+          </a:prstGeom>
+          <a:noFill/>
+        </p:spPr>
+        <p:txBody>
+          <a:bodyPr wrap="none" rtlCol="0">
+            <a:spAutoFit/>
+          </a:bodyPr>
+          <a:lstStyle/>
+          <a:p>
+            <a:r>
+              <a:rPr lang="en-GB" dirty="0"/>
+              <a:t>3</a:t>
+            </a:r>
+          </a:p>
+        </p:txBody>
+      </p:sp>
+      <p:sp>
+        <p:nvSpPr>
+          <p:cNvPr id="71" name="TextBox 70">
+            <a:extLst>
+              <a:ext uri="{FF2B5EF4-FFF2-40B4-BE49-F238E27FC236}">
+                <a16:creationId xmlns:a16="http://schemas.microsoft.com/office/drawing/2014/main" id="{A1B86B33-4F8F-E975-AAD8-DF2F1017F0EC}"/>
+              </a:ext>
+            </a:extLst>
+          </p:cNvPr>
+          <p:cNvSpPr txBox="1"/>
+          <p:nvPr/>
+        </p:nvSpPr>
+        <p:spPr>
+          <a:xfrm>
+            <a:off x="4740567" y="2522709"/>
+            <a:ext cx="308098" cy="369332"/>
+          </a:xfrm>
+          <a:prstGeom prst="rect">
+            <a:avLst/>
+          </a:prstGeom>
+          <a:noFill/>
+        </p:spPr>
+        <p:txBody>
+          <a:bodyPr wrap="none" rtlCol="0">
+            <a:spAutoFit/>
+          </a:bodyPr>
+          <a:lstStyle/>
+          <a:p>
+            <a:r>
+              <a:rPr lang="en-GB" dirty="0"/>
+              <a:t>4</a:t>
+            </a:r>
+          </a:p>
+        </p:txBody>
+      </p:sp>
+      <p:sp>
+        <p:nvSpPr>
+          <p:cNvPr id="73" name="TextBox 72">
+            <a:extLst>
+              <a:ext uri="{FF2B5EF4-FFF2-40B4-BE49-F238E27FC236}">
+                <a16:creationId xmlns:a16="http://schemas.microsoft.com/office/drawing/2014/main" id="{1C27D8F3-1A08-C27B-0A12-CB9014130B0A}"/>
+              </a:ext>
+            </a:extLst>
+          </p:cNvPr>
+          <p:cNvSpPr txBox="1"/>
+          <p:nvPr/>
+        </p:nvSpPr>
+        <p:spPr>
+          <a:xfrm>
+            <a:off x="3062397" y="2524399"/>
+            <a:ext cx="308098" cy="369332"/>
+          </a:xfrm>
+          <a:prstGeom prst="rect">
+            <a:avLst/>
+          </a:prstGeom>
+          <a:noFill/>
+        </p:spPr>
+        <p:txBody>
+          <a:bodyPr wrap="none" rtlCol="0">
+            <a:spAutoFit/>
+          </a:bodyPr>
+          <a:lstStyle/>
+          <a:p>
+            <a:r>
+              <a:rPr lang="en-GB" dirty="0"/>
+              <a:t>5</a:t>
+            </a:r>
+          </a:p>
+        </p:txBody>
+      </p:sp>
+    </p:spTree>
+    <p:extLst>
+      <p:ext uri="{BB962C8B-B14F-4D97-AF65-F5344CB8AC3E}">
+        <p14:creationId xmlns:p14="http://schemas.microsoft.com/office/powerpoint/2010/main" val="400256046"/>
+      </p:ext>
+    </p:extLst>
+  </p:cSld>
+  <p:clrMapOvr>
+    <a:masterClrMapping/>
+  </p:clrMapOvr>
+</p:sld>
+</file>
+
 <file path=ppt/theme/theme1.xml><?xml version="1.0" encoding="utf-8"?>
 <a:theme xmlns:a="http://schemas.openxmlformats.org/drawingml/2006/main" name="Office Theme">
   <a:themeElements>

</xml_diff>